<commit_message>
Update the script (v2)
</commit_message>
<xml_diff>
--- a/main-520-project/CS_520_Paper_Review_Group23.pptx
+++ b/main-520-project/CS_520_Paper_Review_Group23.pptx
@@ -223,7 +223,7 @@
           <a:p>
             <a:fld id="{2BB3078B-6193-415B-82C4-EBAFB2447FF1}" type="datetimeFigureOut">
               <a:rPr lang="en-US" smtClean="0"/>
-              <a:t>11/27/2023</a:t>
+              <a:t>11/30/2023</a:t>
             </a:fld>
             <a:endParaRPr lang="en-US"/>
           </a:p>
@@ -534,10 +534,29 @@
           <a:bodyPr/>
           <a:lstStyle/>
           <a:p>
-            <a:r>
-              <a:rPr lang="en-US" dirty="0"/>
-              <a:t>Good morning(afternoon), everyone! We are CS520 Group 23 who reviewed and going to give a presentation about the paper named 'Computing Rule-Based Explanations by Leveraging Counterfactuals'. As today’s presenter, my name is 000.</a:t>
-            </a:r>
+            <a:pPr>
+              <a:lnSpc>
+                <a:spcPct val="107000"/>
+              </a:lnSpc>
+              <a:spcAft>
+                <a:spcPts val="800"/>
+              </a:spcAft>
+            </a:pPr>
+            <a:r>
+              <a:rPr lang="en-US" sz="1800" kern="100" dirty="0">
+                <a:effectLst/>
+                <a:latin typeface="Calibri" panose="020F0502020204030204" pitchFamily="34" charset="0"/>
+                <a:ea typeface="맑은 고딕" panose="020B0503020000020004" pitchFamily="34" charset="-127"/>
+                <a:cs typeface="Calibri" panose="020F0502020204030204" pitchFamily="34" charset="0"/>
+              </a:rPr>
+              <a:t>[Slide 1] Good afternoon, everyone! We are CS520 Group 23, presenting on 'Computing Rule-Based Explanations by Leveraging Counterfactuals.'</a:t>
+            </a:r>
+            <a:endParaRPr lang="en-US" sz="1800" kern="100" dirty="0">
+              <a:effectLst/>
+              <a:latin typeface="Calibri" panose="020F0502020204030204" pitchFamily="34" charset="0"/>
+              <a:ea typeface="맑은 고딕" panose="020B0503020000020004" pitchFamily="34" charset="-127"/>
+              <a:cs typeface="Times New Roman" panose="02020603050405020304" pitchFamily="18" charset="0"/>
+            </a:endParaRPr>
           </a:p>
         </p:txBody>
       </p:sp>
@@ -621,10 +640,134 @@
           <a:bodyPr/>
           <a:lstStyle/>
           <a:p>
-            <a:r>
-              <a:rPr lang="en-US" dirty="0"/>
-              <a:t>In the first case, the system extracts the most common (i.e., minimum number of) features from customers who have already been rejected for a loan and checks whether the loan applicant meets the conditions. Although it doesn't confirm how customers get approved for a loan, the reasons for being rejected are clear and logical. This system judges the value of new data based on a set of the most common rules. Such a system can be said to be a Rule-Based Explanation system. </a:t>
-            </a:r>
+            <a:pPr>
+              <a:lnSpc>
+                <a:spcPct val="107000"/>
+              </a:lnSpc>
+              <a:spcAft>
+                <a:spcPts val="800"/>
+              </a:spcAft>
+            </a:pPr>
+            <a:r>
+              <a:rPr lang="en-US" sz="1800" kern="100" dirty="0">
+                <a:effectLst/>
+                <a:latin typeface="Calibri" panose="020F0502020204030204" pitchFamily="34" charset="0"/>
+                <a:ea typeface="맑은 고딕" panose="020B0503020000020004" pitchFamily="34" charset="-127"/>
+                <a:cs typeface="Calibri" panose="020F0502020204030204" pitchFamily="34" charset="0"/>
+              </a:rPr>
+              <a:t>[Slide 10] In the first case, the system extracts the most </a:t>
+            </a:r>
+            <a:r>
+              <a:rPr lang="en-US" sz="1800" kern="100" dirty="0">
+                <a:solidFill>
+                  <a:srgbClr val="000000"/>
+                </a:solidFill>
+                <a:effectLst/>
+                <a:latin typeface="Calibri" panose="020F0502020204030204" pitchFamily="34" charset="0"/>
+                <a:ea typeface="맑은 고딕" panose="020B0503020000020004" pitchFamily="34" charset="-127"/>
+                <a:cs typeface="Calibri" panose="020F0502020204030204" pitchFamily="34" charset="0"/>
+              </a:rPr>
+              <a:t>common features</a:t>
+            </a:r>
+            <a:r>
+              <a:rPr lang="en-US" sz="1800" kern="100" dirty="0">
+                <a:effectLst/>
+                <a:latin typeface="Calibri" panose="020F0502020204030204" pitchFamily="34" charset="0"/>
+                <a:ea typeface="맑은 고딕" panose="020B0503020000020004" pitchFamily="34" charset="-127"/>
+                <a:cs typeface="Calibri" panose="020F0502020204030204" pitchFamily="34" charset="0"/>
+              </a:rPr>
+              <a:t> (i.e., minimum number of) of features of customers who have already been rejected for a loan and checks whether the loan applicant meets the conditions. Although it </a:t>
+            </a:r>
+            <a:r>
+              <a:rPr lang="en-US" sz="1800" kern="100" dirty="0">
+                <a:solidFill>
+                  <a:srgbClr val="000000"/>
+                </a:solidFill>
+                <a:effectLst/>
+                <a:latin typeface="Calibri" panose="020F0502020204030204" pitchFamily="34" charset="0"/>
+                <a:ea typeface="맑은 고딕" panose="020B0503020000020004" pitchFamily="34" charset="-127"/>
+                <a:cs typeface="Calibri" panose="020F0502020204030204" pitchFamily="34" charset="0"/>
+              </a:rPr>
+              <a:t>does not</a:t>
+            </a:r>
+            <a:r>
+              <a:rPr lang="en-US" sz="1800" kern="100" dirty="0">
+                <a:effectLst/>
+                <a:latin typeface="Calibri" panose="020F0502020204030204" pitchFamily="34" charset="0"/>
+                <a:ea typeface="맑은 고딕" panose="020B0503020000020004" pitchFamily="34" charset="-127"/>
+                <a:cs typeface="Calibri" panose="020F0502020204030204" pitchFamily="34" charset="0"/>
+              </a:rPr>
+              <a:t> confirm how customers </a:t>
+            </a:r>
+            <a:r>
+              <a:rPr lang="en-US" sz="1800" kern="100" dirty="0">
+                <a:solidFill>
+                  <a:srgbClr val="000000"/>
+                </a:solidFill>
+                <a:effectLst/>
+                <a:latin typeface="Calibri" panose="020F0502020204030204" pitchFamily="34" charset="0"/>
+                <a:ea typeface="맑은 고딕" panose="020B0503020000020004" pitchFamily="34" charset="-127"/>
+                <a:cs typeface="Calibri" panose="020F0502020204030204" pitchFamily="34" charset="0"/>
+              </a:rPr>
+              <a:t>are</a:t>
+            </a:r>
+            <a:r>
+              <a:rPr lang="en-US" sz="1800" kern="100" dirty="0">
+                <a:effectLst/>
+                <a:latin typeface="Calibri" panose="020F0502020204030204" pitchFamily="34" charset="0"/>
+                <a:ea typeface="맑은 고딕" panose="020B0503020000020004" pitchFamily="34" charset="-127"/>
+                <a:cs typeface="Calibri" panose="020F0502020204030204" pitchFamily="34" charset="0"/>
+              </a:rPr>
+              <a:t> approved for a loan, the reasons for being rejected are clear and logical. This system judges the value of new data based on a set of the most common rules. </a:t>
+            </a:r>
+            <a:r>
+              <a:rPr lang="en-US" sz="1800" kern="100" dirty="0">
+                <a:solidFill>
+                  <a:srgbClr val="000000"/>
+                </a:solidFill>
+                <a:effectLst/>
+                <a:latin typeface="Calibri" panose="020F0502020204030204" pitchFamily="34" charset="0"/>
+                <a:ea typeface="맑은 고딕" panose="020B0503020000020004" pitchFamily="34" charset="-127"/>
+                <a:cs typeface="Calibri" panose="020F0502020204030204" pitchFamily="34" charset="0"/>
+              </a:rPr>
+              <a:t>This</a:t>
+            </a:r>
+            <a:r>
+              <a:rPr lang="en-US" sz="1800" kern="100" dirty="0">
+                <a:effectLst/>
+                <a:latin typeface="Calibri" panose="020F0502020204030204" pitchFamily="34" charset="0"/>
+                <a:ea typeface="맑은 고딕" panose="020B0503020000020004" pitchFamily="34" charset="-127"/>
+                <a:cs typeface="Calibri" panose="020F0502020204030204" pitchFamily="34" charset="0"/>
+              </a:rPr>
+              <a:t> system can be said to be a </a:t>
+            </a:r>
+            <a:r>
+              <a:rPr lang="en-US" sz="1800" kern="100" dirty="0">
+                <a:solidFill>
+                  <a:srgbClr val="000000"/>
+                </a:solidFill>
+                <a:effectLst/>
+                <a:latin typeface="Calibri" panose="020F0502020204030204" pitchFamily="34" charset="0"/>
+                <a:ea typeface="맑은 고딕" panose="020B0503020000020004" pitchFamily="34" charset="-127"/>
+                <a:cs typeface="Calibri" panose="020F0502020204030204" pitchFamily="34" charset="0"/>
+              </a:rPr>
+              <a:t>rule-based explanation</a:t>
+            </a:r>
+            <a:r>
+              <a:rPr lang="en-US" sz="1800" kern="100" dirty="0">
+                <a:effectLst/>
+                <a:latin typeface="Calibri" panose="020F0502020204030204" pitchFamily="34" charset="0"/>
+                <a:ea typeface="맑은 고딕" panose="020B0503020000020004" pitchFamily="34" charset="-127"/>
+                <a:cs typeface="Calibri" panose="020F0502020204030204" pitchFamily="34" charset="0"/>
+              </a:rPr>
+              <a:t> system. </a:t>
+            </a:r>
+            <a:endParaRPr lang="en-US" sz="1800" kern="100" dirty="0">
+              <a:effectLst/>
+              <a:latin typeface="Calibri" panose="020F0502020204030204" pitchFamily="34" charset="0"/>
+              <a:ea typeface="맑은 고딕" panose="020B0503020000020004" pitchFamily="34" charset="-127"/>
+              <a:cs typeface="Times New Roman" panose="02020603050405020304" pitchFamily="18" charset="0"/>
+            </a:endParaRPr>
           </a:p>
         </p:txBody>
       </p:sp>
@@ -708,16 +851,54 @@
           <a:bodyPr/>
           <a:lstStyle/>
           <a:p>
-            <a:r>
-              <a:rPr lang="en-US" dirty="0"/>
-              <a:t>According to the Rule-Based Explanation system, when the three properties of Relevance, Global Consistency, and Interpretability are satisfied for a specific instance, it becomes a system that can explain that instance. Relevance means that the instance must be relevant to the rule, which means that the rule must already contain the same value as the instance. Global Consistency means that all instances corresponding to the rule must be consistent. For example, in a loan review system, this means that all instances included in the rule must have been rejected for loans. Finally, Interpretability states that rules should be the most common and simple, and therefore have small cardinality. In other words, the redundant rule should be excluded as much as possible.</a:t>
-            </a:r>
+            <a:pPr>
+              <a:lnSpc>
+                <a:spcPct val="107000"/>
+              </a:lnSpc>
+              <a:spcAft>
+                <a:spcPts val="800"/>
+              </a:spcAft>
+            </a:pPr>
+            <a:r>
+              <a:rPr lang="en-US" sz="1800" kern="100" dirty="0">
+                <a:effectLst/>
+                <a:latin typeface="Calibri" panose="020F0502020204030204" pitchFamily="34" charset="0"/>
+                <a:ea typeface="맑은 고딕" panose="020B0503020000020004" pitchFamily="34" charset="-127"/>
+                <a:cs typeface="Calibri" panose="020F0502020204030204" pitchFamily="34" charset="0"/>
+              </a:rPr>
+              <a:t>[Slide 11] According to the rule-based explanation system, when the three properties of Relevance, Global Consistency, and Interpretability are satisfied for a specific instance, it becomes a system that can explain that instance. Relevance means that the instance must be relevant to the rule, which means that the rule must already contain the same value as the instance. Global consistency means that all instances corresponding to the rule must be consistent. For example, in a loan review system, this means that all instances included in the rule must have been rejected for loans. Finally, Interpretability states that rules should be the most common and simple and, therefore, have a small cardinality. In other words, the redundant rule should be excluded as much as possible.</a:t>
+            </a:r>
+            <a:endParaRPr lang="en-US" sz="1800" kern="100" dirty="0">
+              <a:effectLst/>
+              <a:latin typeface="Calibri" panose="020F0502020204030204" pitchFamily="34" charset="0"/>
+              <a:ea typeface="맑은 고딕" panose="020B0503020000020004" pitchFamily="34" charset="-127"/>
+              <a:cs typeface="Times New Roman" panose="02020603050405020304" pitchFamily="18" charset="0"/>
+            </a:endParaRPr>
           </a:p>
           <a:p>
-            <a:r>
-              <a:rPr lang="en-US" dirty="0"/>
-              <a:t>One more concept that should be mentioned is data consistency. In general, because it is realistically difficult to check all characteristics, the scope of consistency checking in the paper is limited to the database, and this property is referred to as data consistency.</a:t>
-            </a:r>
+            <a:pPr>
+              <a:lnSpc>
+                <a:spcPct val="107000"/>
+              </a:lnSpc>
+              <a:spcAft>
+                <a:spcPts val="800"/>
+              </a:spcAft>
+            </a:pPr>
+            <a:r>
+              <a:rPr lang="en-US" sz="1800" kern="100" dirty="0">
+                <a:effectLst/>
+                <a:latin typeface="Calibri" panose="020F0502020204030204" pitchFamily="34" charset="0"/>
+                <a:ea typeface="맑은 고딕" panose="020B0503020000020004" pitchFamily="34" charset="-127"/>
+                <a:cs typeface="Calibri" panose="020F0502020204030204" pitchFamily="34" charset="0"/>
+              </a:rPr>
+              <a:t>One more concept that should be mentioned is the consistency of the data. In general, because it is realistically difficult to check all features, the scope of consistency checking in the paper is limited to the database, and this property is called data consistency.</a:t>
+            </a:r>
+            <a:endParaRPr lang="en-US" sz="1800" kern="100" dirty="0">
+              <a:effectLst/>
+              <a:latin typeface="Calibri" panose="020F0502020204030204" pitchFamily="34" charset="0"/>
+              <a:ea typeface="맑은 고딕" panose="020B0503020000020004" pitchFamily="34" charset="-127"/>
+              <a:cs typeface="Times New Roman" panose="02020603050405020304" pitchFamily="18" charset="0"/>
+            </a:endParaRPr>
           </a:p>
         </p:txBody>
       </p:sp>
@@ -801,20 +982,29 @@
           <a:bodyPr/>
           <a:lstStyle/>
           <a:p>
-            <a:r>
-              <a:rPr lang="en-US" b="0" i="0" dirty="0">
-                <a:solidFill>
-                  <a:srgbClr val="E8EAED"/>
-                </a:solidFill>
+            <a:pPr>
+              <a:lnSpc>
+                <a:spcPct val="107000"/>
+              </a:lnSpc>
+              <a:spcAft>
+                <a:spcPts val="800"/>
+              </a:spcAft>
+            </a:pPr>
+            <a:r>
+              <a:rPr lang="en-US" sz="1800" kern="100" dirty="0">
                 <a:effectLst/>
-                <a:latin typeface="Apple SD Gothic Neo"/>
-              </a:rPr>
-              <a:t>On the other hand, the Counterfactual Explanation system is an explanation system with a more purposeful nature. Like the second case in the previous example, through counterexamples, i.e. cases where the screening was passed, you can specify the features that a specific customer needs to change in order to pass the screening next time. </a:t>
-            </a:r>
-            <a:r>
-              <a:rPr lang="en-US" dirty="0"/>
-              <a:t>The main purpose of the counterfactual explanation system is to identify counterfactual instances by checking whether the judgment result changes when the value of the instance included in the existing rule is changed. Therefore, a customer may be judged as unable to pass the loan screening unless he or she has an exception value for that feature, that is, a counterfactual instance.</a:t>
-            </a:r>
+                <a:latin typeface="Calibri" panose="020F0502020204030204" pitchFamily="34" charset="0"/>
+                <a:ea typeface="맑은 고딕" panose="020B0503020000020004" pitchFamily="34" charset="-127"/>
+                <a:cs typeface="Calibri" panose="020F0502020204030204" pitchFamily="34" charset="0"/>
+              </a:rPr>
+              <a:t>[Slide 12] On the other hand, the counterfactual explanation system is an explanation system of a more purposeful nature. Like the second case in the previous example, through counterexamples, i.e., cases where the screening was passed, you can specify the features that a specific customer needs to change to pass the screening next time. The main purpose of the counterfactual explanation system is to identify counterfactual instances by checking whether the judgment result changes when the value of the instance included in the existing rule is changed. Therefore, a customer may be judged as unable to pass the loan screening unless he or she has an exception value for that feature, that is, a counterfactual instance.</a:t>
+            </a:r>
+            <a:endParaRPr lang="en-US" sz="1800" kern="100" dirty="0">
+              <a:effectLst/>
+              <a:latin typeface="Calibri" panose="020F0502020204030204" pitchFamily="34" charset="0"/>
+              <a:ea typeface="맑은 고딕" panose="020B0503020000020004" pitchFamily="34" charset="-127"/>
+              <a:cs typeface="Times New Roman" panose="02020603050405020304" pitchFamily="18" charset="0"/>
+            </a:endParaRPr>
           </a:p>
         </p:txBody>
       </p:sp>
@@ -898,10 +1088,29 @@
           <a:bodyPr/>
           <a:lstStyle/>
           <a:p>
-            <a:r>
-              <a:rPr lang="en-US" dirty="0"/>
-              <a:t>In order to be the counterfactual instance, it is necessary to satisfy two properties. First, the instance must be feasible and plausible with respect to the original instance value. Feasibility imposes constraints on the new values while plausibility imposes constraints on how the new values in the counterfactual instance differs from the target instance. The authors propose to express these two features as PLAF predicates, which are composed of a conjunction of predicates for each feature of an instance. Second, using function that calculates the difference from old value to new value of each feature respect to the target instance, PLAF constrains are scored and ranked by their distance from the target instance.</a:t>
-            </a:r>
+            <a:pPr>
+              <a:lnSpc>
+                <a:spcPct val="107000"/>
+              </a:lnSpc>
+              <a:spcAft>
+                <a:spcPts val="800"/>
+              </a:spcAft>
+            </a:pPr>
+            <a:r>
+              <a:rPr lang="en-US" sz="1800" kern="100" dirty="0">
+                <a:effectLst/>
+                <a:latin typeface="Calibri" panose="020F0502020204030204" pitchFamily="34" charset="0"/>
+                <a:ea typeface="맑은 고딕" panose="020B0503020000020004" pitchFamily="34" charset="-127"/>
+                <a:cs typeface="Calibri" panose="020F0502020204030204" pitchFamily="34" charset="0"/>
+              </a:rPr>
+              <a:t>[Slide 13] To be the counterfactual instance, it is necessary to satisfy two properties. First, the instance must be feasible and plausible with respect to the original instance value. Feasibility imposes constraints on the new values, while plausibility imposes constraints on how the new values in the counterfactual instance differ from the target instance. The authors propose to express these two features as PLAF predicates, which are composed of a conjunction of predicates for each feature of an instance. Second, using a function that calculates the difference from the old value to the new value of each feature with respect to the target instance, PLAF constraints are scored and ranked by their distance from the target instance.</a:t>
+            </a:r>
+            <a:endParaRPr lang="en-US" sz="1800" kern="100" dirty="0">
+              <a:effectLst/>
+              <a:latin typeface="Calibri" panose="020F0502020204030204" pitchFamily="34" charset="0"/>
+              <a:ea typeface="맑은 고딕" panose="020B0503020000020004" pitchFamily="34" charset="-127"/>
+              <a:cs typeface="Times New Roman" panose="02020603050405020304" pitchFamily="18" charset="0"/>
+            </a:endParaRPr>
           </a:p>
         </p:txBody>
       </p:sp>
@@ -985,10 +1194,50 @@
           <a:bodyPr/>
           <a:lstStyle/>
           <a:p>
-            <a:r>
-              <a:rPr lang="en-US" dirty="0"/>
-              <a:t>As seen earlier, the two explanation systems have their own pros and cons. The authors offer a new approach that integrates the two systems, but a rationale would be needed to make it possible. In the paper, the author introduced 'Duality and Duality Theorem' and proved the validity of the algorithm to be presented in the future by proving that the two systems have 'Duality' that complements each other. So, what does ‘Duality’ mean? In a mathematical sense, 'dual' is close to meaning a symmetrical relationship. In this regard, the author devoted part of the space to explaining the concepts of 'duality' and 'duality Theorem' to prove that rule-based explanations and counterfactual explanations are in fact symmetrical and combinable systems.</a:t>
-            </a:r>
+            <a:pPr>
+              <a:lnSpc>
+                <a:spcPct val="107000"/>
+              </a:lnSpc>
+              <a:spcAft>
+                <a:spcPts val="800"/>
+              </a:spcAft>
+            </a:pPr>
+            <a:r>
+              <a:rPr lang="en-US" sz="1800" kern="100" dirty="0">
+                <a:effectLst/>
+                <a:latin typeface="Calibri" panose="020F0502020204030204" pitchFamily="34" charset="0"/>
+                <a:ea typeface="맑은 고딕" panose="020B0503020000020004" pitchFamily="34" charset="-127"/>
+                <a:cs typeface="Calibri" panose="020F0502020204030204" pitchFamily="34" charset="0"/>
+              </a:rPr>
+              <a:t>[Slide 14] As seen earlier, the two explanation systems have their own pros and cons. The authors offer a new approach that integrates the two systems, but a rationale is needed to make it possible. In the paper, the author introduced the "Duality and Duality Theorem" and proved the validity of the algorithm to be presented in the future by proving that the two systems have "Duality" that complements each other. </a:t>
+            </a:r>
+            <a:r>
+              <a:rPr lang="en-US" sz="1800" kern="100" dirty="0">
+                <a:solidFill>
+                  <a:srgbClr val="000000"/>
+                </a:solidFill>
+                <a:effectLst/>
+                <a:latin typeface="Calibri" panose="020F0502020204030204" pitchFamily="34" charset="0"/>
+                <a:ea typeface="맑은 고딕" panose="020B0503020000020004" pitchFamily="34" charset="-127"/>
+                <a:cs typeface="Calibri" panose="020F0502020204030204" pitchFamily="34" charset="0"/>
+              </a:rPr>
+              <a:t>So</a:t>
+            </a:r>
+            <a:r>
+              <a:rPr lang="en-US" sz="1800" kern="100" dirty="0">
+                <a:effectLst/>
+                <a:latin typeface="Calibri" panose="020F0502020204030204" pitchFamily="34" charset="0"/>
+                <a:ea typeface="맑은 고딕" panose="020B0503020000020004" pitchFamily="34" charset="-127"/>
+                <a:cs typeface="Calibri" panose="020F0502020204030204" pitchFamily="34" charset="0"/>
+              </a:rPr>
+              <a:t> what does ‘Duality’ mean? In a mathematical sense, the term 'dual' is close to meaning a symmetrical relationship. In this regard, the author devoted part of the space to explaining the concepts of 'duality' and 'duality Theorem' to prove that rule-based explanations and counterfactual explanations are, in fact, symmetrical and combinable systems.</a:t>
+            </a:r>
+            <a:endParaRPr lang="en-US" sz="1800" kern="100" dirty="0">
+              <a:effectLst/>
+              <a:latin typeface="Calibri" panose="020F0502020204030204" pitchFamily="34" charset="0"/>
+              <a:ea typeface="맑은 고딕" panose="020B0503020000020004" pitchFamily="34" charset="-127"/>
+              <a:cs typeface="Times New Roman" panose="02020603050405020304" pitchFamily="18" charset="0"/>
+            </a:endParaRPr>
           </a:p>
         </p:txBody>
       </p:sp>
@@ -1072,17 +1321,71 @@
           <a:bodyPr/>
           <a:lstStyle/>
           <a:p>
-            <a:r>
-              <a:rPr lang="en-US" b="0" i="0" dirty="0">
+            <a:pPr>
+              <a:lnSpc>
+                <a:spcPct val="107000"/>
+              </a:lnSpc>
+              <a:spcAft>
+                <a:spcPts val="800"/>
+              </a:spcAft>
+            </a:pPr>
+            <a:r>
+              <a:rPr lang="en-US" sz="1800" kern="100" dirty="0">
+                <a:effectLst/>
+                <a:latin typeface="Calibri" panose="020F0502020204030204" pitchFamily="34" charset="0"/>
+                <a:ea typeface="맑은 고딕" panose="020B0503020000020004" pitchFamily="34" charset="-127"/>
+                <a:cs typeface="Calibri" panose="020F0502020204030204" pitchFamily="34" charset="0"/>
+              </a:rPr>
+              <a:t>[Slide 15] In the paper, the duality of the two systems is </a:t>
+            </a:r>
+            <a:r>
+              <a:rPr lang="en-US" sz="1800" kern="100" dirty="0">
                 <a:solidFill>
-                  <a:srgbClr val="E8EAED"/>
+                  <a:srgbClr val="000000"/>
                 </a:solidFill>
                 <a:effectLst/>
-                <a:latin typeface="Apple SD Gothic Neo"/>
-              </a:rPr>
-              <a:t>In the paper, the duality of the two systems is proven by proving the related Lemmas and Theorem. However, we can check Duality in a more intuitive way.</a:t>
-            </a:r>
-            <a:endParaRPr lang="en-US" dirty="0"/>
+                <a:latin typeface="Calibri" panose="020F0502020204030204" pitchFamily="34" charset="0"/>
+                <a:ea typeface="맑은 고딕" panose="020B0503020000020004" pitchFamily="34" charset="-127"/>
+                <a:cs typeface="Calibri" panose="020F0502020204030204" pitchFamily="34" charset="0"/>
+              </a:rPr>
+              <a:t>proved</a:t>
+            </a:r>
+            <a:r>
+              <a:rPr lang="en-US" sz="1800" kern="100" dirty="0">
+                <a:effectLst/>
+                <a:latin typeface="Calibri" panose="020F0502020204030204" pitchFamily="34" charset="0"/>
+                <a:ea typeface="맑은 고딕" panose="020B0503020000020004" pitchFamily="34" charset="-127"/>
+                <a:cs typeface="Calibri" panose="020F0502020204030204" pitchFamily="34" charset="0"/>
+              </a:rPr>
+              <a:t> by proving the related lemmas </a:t>
+            </a:r>
+            <a:r>
+              <a:rPr lang="en-US" sz="1800" kern="100" dirty="0">
+                <a:solidFill>
+                  <a:srgbClr val="000000"/>
+                </a:solidFill>
+                <a:effectLst/>
+                <a:latin typeface="Calibri" panose="020F0502020204030204" pitchFamily="34" charset="0"/>
+                <a:ea typeface="맑은 고딕" panose="020B0503020000020004" pitchFamily="34" charset="-127"/>
+                <a:cs typeface="Calibri" panose="020F0502020204030204" pitchFamily="34" charset="0"/>
+              </a:rPr>
+              <a:t>and the</a:t>
+            </a:r>
+            <a:r>
+              <a:rPr lang="en-US" sz="1800" kern="100" dirty="0">
+                <a:effectLst/>
+                <a:latin typeface="Calibri" panose="020F0502020204030204" pitchFamily="34" charset="0"/>
+                <a:ea typeface="맑은 고딕" panose="020B0503020000020004" pitchFamily="34" charset="-127"/>
+                <a:cs typeface="Calibri" panose="020F0502020204030204" pitchFamily="34" charset="0"/>
+              </a:rPr>
+              <a:t> Theorem. However, we can check duality in a more intuitive way.</a:t>
+            </a:r>
+            <a:endParaRPr lang="en-US" sz="1800" kern="100" dirty="0">
+              <a:effectLst/>
+              <a:latin typeface="Calibri" panose="020F0502020204030204" pitchFamily="34" charset="0"/>
+              <a:ea typeface="맑은 고딕" panose="020B0503020000020004" pitchFamily="34" charset="-127"/>
+              <a:cs typeface="Times New Roman" panose="02020603050405020304" pitchFamily="18" charset="0"/>
+            </a:endParaRPr>
           </a:p>
         </p:txBody>
       </p:sp>
@@ -1166,32 +1469,29 @@
           <a:bodyPr/>
           <a:lstStyle/>
           <a:p>
-            <a:r>
-              <a:rPr lang="en-US" dirty="0"/>
-              <a:t>Through the data consistency mentioned by the author and the properties that a counterfactual instance must have, we were able to confirm that the corresponding instances only consist of common features. This means that despite the differences between some features, the two corresponding instances are symmetrical, and each feature forms a one-to-one relationship. </a:t>
-            </a:r>
-            <a:r>
-              <a:rPr lang="en-US" b="0" i="0" dirty="0">
-                <a:solidFill>
-                  <a:srgbClr val="E8EAED"/>
-                </a:solidFill>
+            <a:pPr>
+              <a:lnSpc>
+                <a:spcPct val="107000"/>
+              </a:lnSpc>
+              <a:spcAft>
+                <a:spcPts val="800"/>
+              </a:spcAft>
+            </a:pPr>
+            <a:r>
+              <a:rPr lang="en-US" sz="1800" kern="100" dirty="0">
                 <a:effectLst/>
-                <a:latin typeface="Apple SD Gothic Neo"/>
-              </a:rPr>
-              <a:t>Since we know that a one-to-one relationship has an inverse function, we can easily verify that two instances, or two systems, are a dual relationship. Assume you are matching different data schemas. Schemas that have the same characteristics in a one-to-one relationship are virtually identical and can be combined in any direction to produce equivalent results. </a:t>
-            </a:r>
-            <a:r>
-              <a:rPr lang="en-US" dirty="0"/>
-              <a:t>In conclusion, the rule-based explanation system and </a:t>
-            </a:r>
-            <a:r>
-              <a:rPr lang="en-US" dirty="0" err="1"/>
-              <a:t>counterfacutal</a:t>
-            </a:r>
-            <a:r>
-              <a:rPr lang="en-US" dirty="0"/>
-              <a:t> explanation system are dual relationships, so they can be used in combination.</a:t>
-            </a:r>
+                <a:latin typeface="Calibri" panose="020F0502020204030204" pitchFamily="34" charset="0"/>
+                <a:ea typeface="맑은 고딕" panose="020B0503020000020004" pitchFamily="34" charset="-127"/>
+                <a:cs typeface="Calibri" panose="020F0502020204030204" pitchFamily="34" charset="0"/>
+              </a:rPr>
+              <a:t>[Slide 16] Through the data consistency mentioned by the author and the properties that a counterfactual instance must have, we were able to confirm that the corresponding instances consist only of common features. This means that despite the differences between some features, the two corresponding instances are symmetric, and each feature forms a one-to-one relationship. Since we know that a one-to-one relationship has an inverse function, we can easily verify that two instances, or two systems, are a dual relationship. Assume that you are matching different data schemas. Schemas that have the same characteristics in a one-to-one relationship are virtually identical and can be combined in any direction to produce equivalent results. In conclusion, the rule-based explanation system and counterfactual explanation system are dual relationships, so they can be used in combination.</a:t>
+            </a:r>
+            <a:endParaRPr lang="en-US" sz="1800" kern="100" dirty="0">
+              <a:effectLst/>
+              <a:latin typeface="Calibri" panose="020F0502020204030204" pitchFamily="34" charset="0"/>
+              <a:ea typeface="맑은 고딕" panose="020B0503020000020004" pitchFamily="34" charset="-127"/>
+              <a:cs typeface="Times New Roman" panose="02020603050405020304" pitchFamily="18" charset="0"/>
+            </a:endParaRPr>
           </a:p>
         </p:txBody>
       </p:sp>
@@ -1275,85 +1575,122 @@
           <a:bodyPr/>
           <a:lstStyle/>
           <a:p>
-            <a:r>
-              <a:rPr lang="en-US" dirty="0"/>
-              <a:t>Following the aforementioned discussion, the paper introduces three algorithms, </a:t>
-            </a:r>
-            <a:r>
-              <a:rPr lang="en-US" dirty="0" err="1"/>
-              <a:t>GeneticRule</a:t>
-            </a:r>
-            <a:r>
-              <a:rPr lang="en-US" dirty="0"/>
-              <a:t>, </a:t>
-            </a:r>
-            <a:r>
-              <a:rPr lang="en-US" dirty="0" err="1"/>
-              <a:t>GeneticCF</a:t>
-            </a:r>
-            <a:r>
-              <a:rPr lang="en-US" dirty="0"/>
-              <a:t>, and </a:t>
-            </a:r>
-            <a:r>
-              <a:rPr lang="en-US" dirty="0" err="1"/>
-              <a:t>GreedyCF</a:t>
-            </a:r>
-            <a:r>
-              <a:rPr lang="en-US" dirty="0"/>
-              <a:t>. </a:t>
-            </a:r>
-            <a:r>
-              <a:rPr lang="en-US" b="0" i="0" dirty="0">
+            <a:pPr>
+              <a:lnSpc>
+                <a:spcPct val="107000"/>
+              </a:lnSpc>
+              <a:spcAft>
+                <a:spcPts val="800"/>
+              </a:spcAft>
+            </a:pPr>
+            <a:r>
+              <a:rPr lang="en-US" sz="1800" kern="100" dirty="0">
+                <a:effectLst/>
+                <a:latin typeface="Calibri" panose="020F0502020204030204" pitchFamily="34" charset="0"/>
+                <a:ea typeface="맑은 고딕" panose="020B0503020000020004" pitchFamily="34" charset="-127"/>
+                <a:cs typeface="Calibri" panose="020F0502020204030204" pitchFamily="34" charset="0"/>
+              </a:rPr>
+              <a:t>[Slide 17] Following the discussion, we introduce three </a:t>
+            </a:r>
+            <a:r>
+              <a:rPr lang="en-US" sz="1800" kern="100" dirty="0">
                 <a:solidFill>
-                  <a:srgbClr val="E8EAED"/>
+                  <a:srgbClr val="000000"/>
                 </a:solidFill>
                 <a:effectLst/>
-                <a:latin typeface="Apple SD Gothic Neo"/>
-              </a:rPr>
-              <a:t>The postfix in each name suggests the system the algorithm is using. In other words, the </a:t>
-            </a:r>
-            <a:r>
-              <a:rPr lang="en-US" b="0" i="0" dirty="0" err="1">
-                <a:solidFill>
-                  <a:srgbClr val="E8EAED"/>
-                </a:solidFill>
+                <a:latin typeface="Calibri" panose="020F0502020204030204" pitchFamily="34" charset="0"/>
+                <a:ea typeface="맑은 고딕" panose="020B0503020000020004" pitchFamily="34" charset="-127"/>
+                <a:cs typeface="Calibri" panose="020F0502020204030204" pitchFamily="34" charset="0"/>
+              </a:rPr>
+              <a:t>algorithms,</a:t>
+            </a:r>
+            <a:r>
+              <a:rPr lang="en-US" sz="1800" kern="100" dirty="0">
                 <a:effectLst/>
-                <a:latin typeface="Apple SD Gothic Neo"/>
+                <a:latin typeface="Calibri" panose="020F0502020204030204" pitchFamily="34" charset="0"/>
+                <a:ea typeface="맑은 고딕" panose="020B0503020000020004" pitchFamily="34" charset="-127"/>
+                <a:cs typeface="Calibri" panose="020F0502020204030204" pitchFamily="34" charset="0"/>
+              </a:rPr>
+              <a:t> </a:t>
+            </a:r>
+            <a:r>
+              <a:rPr lang="en-US" sz="1800" kern="100" dirty="0" err="1">
+                <a:effectLst/>
+                <a:latin typeface="Calibri" panose="020F0502020204030204" pitchFamily="34" charset="0"/>
+                <a:ea typeface="맑은 고딕" panose="020B0503020000020004" pitchFamily="34" charset="-127"/>
+                <a:cs typeface="Calibri" panose="020F0502020204030204" pitchFamily="34" charset="0"/>
               </a:rPr>
               <a:t>GeneticRule</a:t>
             </a:r>
             <a:r>
-              <a:rPr lang="en-US" b="0" i="0" dirty="0">
-                <a:solidFill>
-                  <a:srgbClr val="E8EAED"/>
-                </a:solidFill>
+              <a:rPr lang="en-US" sz="1800" kern="100" dirty="0">
                 <a:effectLst/>
-                <a:latin typeface="Apple SD Gothic Neo"/>
-              </a:rPr>
-              <a:t> algorithm applies only Rule-Based, and the other two algorithms apply Counterfactual. Of these, </a:t>
-            </a:r>
-            <a:r>
-              <a:rPr lang="en-US" b="0" i="0" dirty="0" err="1">
-                <a:solidFill>
-                  <a:srgbClr val="E8EAED"/>
-                </a:solidFill>
+                <a:latin typeface="Calibri" panose="020F0502020204030204" pitchFamily="34" charset="0"/>
+                <a:ea typeface="맑은 고딕" panose="020B0503020000020004" pitchFamily="34" charset="-127"/>
+                <a:cs typeface="Calibri" panose="020F0502020204030204" pitchFamily="34" charset="0"/>
+              </a:rPr>
+              <a:t>, </a:t>
+            </a:r>
+            <a:r>
+              <a:rPr lang="en-US" sz="1800" kern="100" dirty="0" err="1">
                 <a:effectLst/>
-                <a:latin typeface="Apple SD Gothic Neo"/>
+                <a:latin typeface="Calibri" panose="020F0502020204030204" pitchFamily="34" charset="0"/>
+                <a:ea typeface="맑은 고딕" panose="020B0503020000020004" pitchFamily="34" charset="-127"/>
+                <a:cs typeface="Calibri" panose="020F0502020204030204" pitchFamily="34" charset="0"/>
+              </a:rPr>
+              <a:t>GeneticCF</a:t>
+            </a:r>
+            <a:r>
+              <a:rPr lang="en-US" sz="1800" kern="100" dirty="0">
+                <a:effectLst/>
+                <a:latin typeface="Calibri" panose="020F0502020204030204" pitchFamily="34" charset="0"/>
+                <a:ea typeface="맑은 고딕" panose="020B0503020000020004" pitchFamily="34" charset="-127"/>
+                <a:cs typeface="Calibri" panose="020F0502020204030204" pitchFamily="34" charset="0"/>
+              </a:rPr>
+              <a:t>, and </a:t>
+            </a:r>
+            <a:r>
+              <a:rPr lang="en-US" sz="1800" kern="100" dirty="0" err="1">
+                <a:effectLst/>
+                <a:latin typeface="Calibri" panose="020F0502020204030204" pitchFamily="34" charset="0"/>
+                <a:ea typeface="맑은 고딕" panose="020B0503020000020004" pitchFamily="34" charset="-127"/>
+                <a:cs typeface="Calibri" panose="020F0502020204030204" pitchFamily="34" charset="0"/>
+              </a:rPr>
+              <a:t>GreedyCF</a:t>
+            </a:r>
+            <a:r>
+              <a:rPr lang="en-US" sz="1800" kern="100" dirty="0">
+                <a:effectLst/>
+                <a:latin typeface="Calibri" panose="020F0502020204030204" pitchFamily="34" charset="0"/>
+                <a:ea typeface="맑은 고딕" panose="020B0503020000020004" pitchFamily="34" charset="-127"/>
+                <a:cs typeface="Calibri" panose="020F0502020204030204" pitchFamily="34" charset="0"/>
+              </a:rPr>
+              <a:t>. </a:t>
+            </a:r>
+            <a:r>
+              <a:rPr lang="en-US" sz="1800" kern="100" dirty="0" err="1">
+                <a:effectLst/>
+                <a:latin typeface="Calibri" panose="020F0502020204030204" pitchFamily="34" charset="0"/>
+                <a:ea typeface="맑은 고딕" panose="020B0503020000020004" pitchFamily="34" charset="-127"/>
+                <a:cs typeface="Calibri" panose="020F0502020204030204" pitchFamily="34" charset="0"/>
               </a:rPr>
               <a:t>GeneticRule</a:t>
             </a:r>
             <a:r>
-              <a:rPr lang="en-US" b="0" i="0" dirty="0">
-                <a:solidFill>
-                  <a:srgbClr val="E8EAED"/>
-                </a:solidFill>
+              <a:rPr lang="en-US" sz="1800" kern="100" dirty="0">
                 <a:effectLst/>
-                <a:latin typeface="Apple SD Gothic Neo"/>
-              </a:rPr>
-              <a:t> was introduced as the base algorithm for the other two algorithms.</a:t>
-            </a:r>
-            <a:endParaRPr lang="en-US" dirty="0"/>
+                <a:latin typeface="Calibri" panose="020F0502020204030204" pitchFamily="34" charset="0"/>
+                <a:ea typeface="맑은 고딕" panose="020B0503020000020004" pitchFamily="34" charset="-127"/>
+                <a:cs typeface="Calibri" panose="020F0502020204030204" pitchFamily="34" charset="0"/>
+              </a:rPr>
+              <a:t> is the base, and the others extend it with counterfactual explanations. </a:t>
+            </a:r>
+            <a:endParaRPr lang="en-US" sz="1800" kern="100" dirty="0">
+              <a:effectLst/>
+              <a:latin typeface="Calibri" panose="020F0502020204030204" pitchFamily="34" charset="0"/>
+              <a:ea typeface="맑은 고딕" panose="020B0503020000020004" pitchFamily="34" charset="-127"/>
+              <a:cs typeface="Times New Roman" panose="02020603050405020304" pitchFamily="18" charset="0"/>
+            </a:endParaRPr>
           </a:p>
         </p:txBody>
       </p:sp>
@@ -1437,84 +1774,251 @@
           <a:bodyPr/>
           <a:lstStyle/>
           <a:p>
-            <a:r>
-              <a:rPr lang="en-US" dirty="0"/>
-              <a:t>The explanation of individual algorithms cannot be covered here due to time constraints, but if you are interested, please refer to the summary that we will upload later. First of all, the way each algorithm works is the pseudo-code included in this slide. </a:t>
-            </a:r>
+            <a:pPr>
+              <a:lnSpc>
+                <a:spcPct val="107000"/>
+              </a:lnSpc>
+              <a:spcAft>
+                <a:spcPts val="800"/>
+              </a:spcAft>
+            </a:pPr>
+            <a:r>
+              <a:rPr lang="en-US" sz="1800" kern="100" dirty="0">
+                <a:effectLst/>
+                <a:latin typeface="Calibri" panose="020F0502020204030204" pitchFamily="34" charset="0"/>
+                <a:ea typeface="맑은 고딕" panose="020B0503020000020004" pitchFamily="34" charset="-127"/>
+                <a:cs typeface="Calibri" panose="020F0502020204030204" pitchFamily="34" charset="0"/>
+              </a:rPr>
+              <a:t>[Slide 18] Due to time constraints, we recommend that you refer to our report for a detailed explanation, and only a brief explanation of each algorithm will be provided here. </a:t>
+            </a:r>
+            <a:endParaRPr lang="en-US" sz="1800" kern="100" dirty="0">
+              <a:effectLst/>
+              <a:latin typeface="Calibri" panose="020F0502020204030204" pitchFamily="34" charset="0"/>
+              <a:ea typeface="맑은 고딕" panose="020B0503020000020004" pitchFamily="34" charset="-127"/>
+              <a:cs typeface="Times New Roman" panose="02020603050405020304" pitchFamily="18" charset="0"/>
+            </a:endParaRPr>
           </a:p>
           <a:p>
-            <a:r>
-              <a:rPr lang="en-US" dirty="0"/>
-              <a:t> First, </a:t>
-            </a:r>
-            <a:r>
-              <a:rPr lang="en-US" dirty="0" err="1"/>
+            <a:pPr>
+              <a:lnSpc>
+                <a:spcPct val="107000"/>
+              </a:lnSpc>
+              <a:spcAft>
+                <a:spcPts val="800"/>
+              </a:spcAft>
+            </a:pPr>
+            <a:r>
+              <a:rPr lang="en-US" sz="1800" kern="100" dirty="0">
+                <a:effectLst/>
+                <a:latin typeface="Calibri" panose="020F0502020204030204" pitchFamily="34" charset="0"/>
+                <a:ea typeface="맑은 고딕" panose="020B0503020000020004" pitchFamily="34" charset="-127"/>
+                <a:cs typeface="Calibri" panose="020F0502020204030204" pitchFamily="34" charset="0"/>
+              </a:rPr>
+              <a:t>First, </a:t>
+            </a:r>
+            <a:r>
+              <a:rPr lang="en-US" sz="1800" kern="100" dirty="0" err="1">
+                <a:effectLst/>
+                <a:latin typeface="Calibri" panose="020F0502020204030204" pitchFamily="34" charset="0"/>
+                <a:ea typeface="맑은 고딕" panose="020B0503020000020004" pitchFamily="34" charset="-127"/>
+                <a:cs typeface="Calibri" panose="020F0502020204030204" pitchFamily="34" charset="0"/>
+              </a:rPr>
               <a:t>GeneticRule</a:t>
             </a:r>
             <a:r>
-              <a:rPr lang="en-US" dirty="0"/>
-              <a:t> is the base-line algorithm of the other two algorithms and is responsible for finding rule combinations from a given data set. Repeats crossover ,mutation, and sort by fitness score, until finding K candidates that are consistent on both the dataset D and s samples from the more general INST space.</a:t>
-            </a:r>
+              <a:rPr lang="en-US" sz="1800" kern="100" dirty="0">
+                <a:effectLst/>
+                <a:latin typeface="Calibri" panose="020F0502020204030204" pitchFamily="34" charset="0"/>
+                <a:ea typeface="맑은 고딕" panose="020B0503020000020004" pitchFamily="34" charset="-127"/>
+                <a:cs typeface="Calibri" panose="020F0502020204030204" pitchFamily="34" charset="0"/>
+              </a:rPr>
+              <a:t> is the base algorithm of the other two algorithms and is responsible for finding rule combinations from a given data set. Repeat crossover, mutation, and sorting by fitness score until you find K candidates that are consistent on both the D and s samples of the data set from the more general INST space.</a:t>
+            </a:r>
+            <a:endParaRPr lang="en-US" sz="1800" kern="100" dirty="0">
+              <a:effectLst/>
+              <a:latin typeface="Calibri" panose="020F0502020204030204" pitchFamily="34" charset="0"/>
+              <a:ea typeface="맑은 고딕" panose="020B0503020000020004" pitchFamily="34" charset="-127"/>
+              <a:cs typeface="Times New Roman" panose="02020603050405020304" pitchFamily="18" charset="0"/>
+            </a:endParaRPr>
           </a:p>
           <a:p>
-            <a:r>
-              <a:rPr lang="en-US" dirty="0"/>
-              <a:t>The other two algorithms are basically extension algorithms to Genetic Rule and show an advanced form that includes new rules in existing rules by introducing a counterfactual explanation system through the </a:t>
-            </a:r>
-            <a:r>
-              <a:rPr lang="en-US" dirty="0" err="1"/>
+            <a:pPr>
+              <a:lnSpc>
+                <a:spcPct val="107000"/>
+              </a:lnSpc>
+              <a:spcAft>
+                <a:spcPts val="800"/>
+              </a:spcAft>
+            </a:pPr>
+            <a:r>
+              <a:rPr lang="en-US" sz="1800" kern="100" dirty="0">
+                <a:effectLst/>
+                <a:latin typeface="Calibri" panose="020F0502020204030204" pitchFamily="34" charset="0"/>
+                <a:ea typeface="맑은 고딕" panose="020B0503020000020004" pitchFamily="34" charset="-127"/>
+                <a:cs typeface="Calibri" panose="020F0502020204030204" pitchFamily="34" charset="0"/>
+              </a:rPr>
+              <a:t> The other two algorithms are basically extension algorithms to genetic rules and show an advanced form that includes new rules in existing rules by introducing a counterfactual explanation system through the </a:t>
+            </a:r>
+            <a:r>
+              <a:rPr lang="en-US" sz="1800" kern="100" dirty="0" err="1">
+                <a:effectLst/>
+                <a:latin typeface="Calibri" panose="020F0502020204030204" pitchFamily="34" charset="0"/>
+                <a:ea typeface="맑은 고딕" panose="020B0503020000020004" pitchFamily="34" charset="-127"/>
+                <a:cs typeface="Calibri" panose="020F0502020204030204" pitchFamily="34" charset="0"/>
+              </a:rPr>
               <a:t>CFRules</a:t>
             </a:r>
             <a:r>
-              <a:rPr lang="en-US" dirty="0"/>
-              <a:t> function and </a:t>
-            </a:r>
-            <a:r>
-              <a:rPr lang="en-US" dirty="0" err="1"/>
+              <a:rPr lang="en-US" sz="1800" kern="100" dirty="0">
+                <a:effectLst/>
+                <a:latin typeface="Calibri" panose="020F0502020204030204" pitchFamily="34" charset="0"/>
+                <a:ea typeface="맑은 고딕" panose="020B0503020000020004" pitchFamily="34" charset="-127"/>
+                <a:cs typeface="Calibri" panose="020F0502020204030204" pitchFamily="34" charset="0"/>
+              </a:rPr>
+              <a:t> function </a:t>
+            </a:r>
+            <a:r>
+              <a:rPr lang="en-US" sz="1800" kern="100" dirty="0">
+                <a:solidFill>
+                  <a:srgbClr val="000000"/>
+                </a:solidFill>
+                <a:effectLst/>
+                <a:latin typeface="Calibri" panose="020F0502020204030204" pitchFamily="34" charset="0"/>
+                <a:ea typeface="맑은 고딕" panose="020B0503020000020004" pitchFamily="34" charset="-127"/>
+                <a:cs typeface="Calibri" panose="020F0502020204030204" pitchFamily="34" charset="0"/>
+              </a:rPr>
+              <a:t>and the</a:t>
+            </a:r>
+            <a:r>
+              <a:rPr lang="en-US" sz="1800" kern="100" dirty="0">
+                <a:effectLst/>
+                <a:latin typeface="Calibri" panose="020F0502020204030204" pitchFamily="34" charset="0"/>
+                <a:ea typeface="맑은 고딕" panose="020B0503020000020004" pitchFamily="34" charset="-127"/>
+                <a:cs typeface="Calibri" panose="020F0502020204030204" pitchFamily="34" charset="0"/>
+              </a:rPr>
+              <a:t> </a:t>
+            </a:r>
+            <a:r>
+              <a:rPr lang="en-US" sz="1800" kern="100" dirty="0" err="1">
+                <a:effectLst/>
+                <a:latin typeface="Calibri" panose="020F0502020204030204" pitchFamily="34" charset="0"/>
+                <a:ea typeface="맑은 고딕" panose="020B0503020000020004" pitchFamily="34" charset="-127"/>
+                <a:cs typeface="Calibri" panose="020F0502020204030204" pitchFamily="34" charset="0"/>
+              </a:rPr>
               <a:t>consistentCF</a:t>
             </a:r>
             <a:r>
-              <a:rPr lang="en-US" dirty="0"/>
+              <a:rPr lang="en-US" sz="1800" kern="100" dirty="0">
+                <a:effectLst/>
+                <a:latin typeface="Calibri" panose="020F0502020204030204" pitchFamily="34" charset="0"/>
+                <a:ea typeface="맑은 고딕" panose="020B0503020000020004" pitchFamily="34" charset="-127"/>
+                <a:cs typeface="Calibri" panose="020F0502020204030204" pitchFamily="34" charset="0"/>
+              </a:rPr>
               <a:t> function. The difference lies in the cardinality of the candidate rules. </a:t>
             </a:r>
             <a:r>
-              <a:rPr lang="en-US" dirty="0" err="1"/>
+              <a:rPr lang="en-US" sz="1800" kern="100" dirty="0" err="1">
+                <a:effectLst/>
+                <a:latin typeface="Calibri" panose="020F0502020204030204" pitchFamily="34" charset="0"/>
+                <a:ea typeface="맑은 고딕" panose="020B0503020000020004" pitchFamily="34" charset="-127"/>
+                <a:cs typeface="Calibri" panose="020F0502020204030204" pitchFamily="34" charset="0"/>
+              </a:rPr>
               <a:t>GreedyRuleCF</a:t>
             </a:r>
             <a:r>
-              <a:rPr lang="en-US" dirty="0"/>
+              <a:rPr lang="en-US" sz="1800" kern="100" dirty="0">
+                <a:effectLst/>
+                <a:latin typeface="Calibri" panose="020F0502020204030204" pitchFamily="34" charset="0"/>
+                <a:ea typeface="맑은 고딕" panose="020B0503020000020004" pitchFamily="34" charset="-127"/>
+                <a:cs typeface="Calibri" panose="020F0502020204030204" pitchFamily="34" charset="0"/>
+              </a:rPr>
               <a:t> differs from </a:t>
             </a:r>
             <a:r>
-              <a:rPr lang="en-US" dirty="0" err="1"/>
+              <a:rPr lang="en-US" sz="1800" kern="100" dirty="0" err="1">
+                <a:effectLst/>
+                <a:latin typeface="Calibri" panose="020F0502020204030204" pitchFamily="34" charset="0"/>
+                <a:ea typeface="맑은 고딕" panose="020B0503020000020004" pitchFamily="34" charset="-127"/>
+                <a:cs typeface="Calibri" panose="020F0502020204030204" pitchFamily="34" charset="0"/>
+              </a:rPr>
               <a:t>GeneticRuleCF</a:t>
             </a:r>
             <a:r>
-              <a:rPr lang="en-US" dirty="0"/>
-              <a:t> in that it tries to achieve the minimum cardinality by including only the optimal fit among candidates.</a:t>
-            </a:r>
+              <a:rPr lang="en-US" sz="1800" kern="100" dirty="0">
+                <a:effectLst/>
+                <a:latin typeface="Calibri" panose="020F0502020204030204" pitchFamily="34" charset="0"/>
+                <a:ea typeface="맑은 고딕" panose="020B0503020000020004" pitchFamily="34" charset="-127"/>
+                <a:cs typeface="Calibri" panose="020F0502020204030204" pitchFamily="34" charset="0"/>
+              </a:rPr>
+              <a:t> in that it tries to achieve minimum cardinality by including only the optimal fit among candidates.</a:t>
+            </a:r>
+            <a:endParaRPr lang="en-US" sz="1800" kern="100" dirty="0">
+              <a:effectLst/>
+              <a:latin typeface="Calibri" panose="020F0502020204030204" pitchFamily="34" charset="0"/>
+              <a:ea typeface="맑은 고딕" panose="020B0503020000020004" pitchFamily="34" charset="-127"/>
+              <a:cs typeface="Times New Roman" panose="02020603050405020304" pitchFamily="18" charset="0"/>
+            </a:endParaRPr>
           </a:p>
           <a:p>
-            <a:r>
-              <a:rPr lang="en-US" dirty="0"/>
-              <a:t>Here, there is a </a:t>
-            </a:r>
-            <a:r>
-              <a:rPr lang="en-US" dirty="0" err="1"/>
+            <a:pPr>
+              <a:lnSpc>
+                <a:spcPct val="107000"/>
+              </a:lnSpc>
+              <a:spcAft>
+                <a:spcPts val="800"/>
+              </a:spcAft>
+            </a:pPr>
+            <a:r>
+              <a:rPr lang="en-US" sz="1800" kern="100" dirty="0">
+                <a:effectLst/>
+                <a:latin typeface="Calibri" panose="020F0502020204030204" pitchFamily="34" charset="0"/>
+                <a:ea typeface="맑은 고딕" panose="020B0503020000020004" pitchFamily="34" charset="-127"/>
+                <a:cs typeface="Calibri" panose="020F0502020204030204" pitchFamily="34" charset="0"/>
+              </a:rPr>
+              <a:t>Here, a </a:t>
+            </a:r>
+            <a:r>
+              <a:rPr lang="en-US" sz="1800" kern="100" dirty="0" err="1">
+                <a:effectLst/>
+                <a:latin typeface="Calibri" panose="020F0502020204030204" pitchFamily="34" charset="0"/>
+                <a:ea typeface="맑은 고딕" panose="020B0503020000020004" pitchFamily="34" charset="-127"/>
+                <a:cs typeface="Calibri" panose="020F0502020204030204" pitchFamily="34" charset="0"/>
+              </a:rPr>
               <a:t>selectFittest</a:t>
             </a:r>
             <a:r>
-              <a:rPr lang="en-US" dirty="0"/>
-              <a:t> function used to rank the candidates, which is used in each algorithm to sort the candidates according to the degree of consistency and leave the optimal combination. However, in the case of the </a:t>
-            </a:r>
-            <a:r>
-              <a:rPr lang="en-US" dirty="0" err="1"/>
+              <a:rPr lang="en-US" sz="1800" kern="100" dirty="0">
+                <a:effectLst/>
+                <a:latin typeface="Calibri" panose="020F0502020204030204" pitchFamily="34" charset="0"/>
+                <a:ea typeface="맑은 고딕" panose="020B0503020000020004" pitchFamily="34" charset="-127"/>
+                <a:cs typeface="Calibri" panose="020F0502020204030204" pitchFamily="34" charset="0"/>
+              </a:rPr>
+              <a:t> function is used to classify the candidates, which is used in each algorithm to classify the candidates according to the degree of consistency and leave the optimal combination. However, in the case of the </a:t>
+            </a:r>
+            <a:r>
+              <a:rPr lang="en-US" sz="1800" kern="100" dirty="0" err="1">
+                <a:effectLst/>
+                <a:latin typeface="Calibri" panose="020F0502020204030204" pitchFamily="34" charset="0"/>
+                <a:ea typeface="맑은 고딕" panose="020B0503020000020004" pitchFamily="34" charset="-127"/>
+                <a:cs typeface="Calibri" panose="020F0502020204030204" pitchFamily="34" charset="0"/>
+              </a:rPr>
               <a:t>GreedyCF</a:t>
             </a:r>
             <a:r>
-              <a:rPr lang="en-US" dirty="0"/>
+              <a:rPr lang="en-US" sz="1800" kern="100" dirty="0">
+                <a:effectLst/>
+                <a:latin typeface="Calibri" panose="020F0502020204030204" pitchFamily="34" charset="0"/>
+                <a:ea typeface="맑은 고딕" panose="020B0503020000020004" pitchFamily="34" charset="-127"/>
+                <a:cs typeface="Calibri" panose="020F0502020204030204" pitchFamily="34" charset="0"/>
+              </a:rPr>
               <a:t> algorithm, it does not use this method because it uses a method of sorting according to cardinality.</a:t>
             </a:r>
+            <a:endParaRPr lang="en-US" sz="1800" kern="100" dirty="0">
+              <a:effectLst/>
+              <a:latin typeface="Calibri" panose="020F0502020204030204" pitchFamily="34" charset="0"/>
+              <a:ea typeface="맑은 고딕" panose="020B0503020000020004" pitchFamily="34" charset="-127"/>
+              <a:cs typeface="Times New Roman" panose="02020603050405020304" pitchFamily="18" charset="0"/>
+            </a:endParaRPr>
           </a:p>
         </p:txBody>
       </p:sp>
@@ -1598,17 +2102,29 @@
           <a:bodyPr/>
           <a:lstStyle/>
           <a:p>
-            <a:r>
-              <a:rPr lang="en-US" b="0" i="0" dirty="0">
-                <a:solidFill>
-                  <a:srgbClr val="E8EAED"/>
-                </a:solidFill>
+            <a:pPr>
+              <a:lnSpc>
+                <a:spcPct val="107000"/>
+              </a:lnSpc>
+              <a:spcAft>
+                <a:spcPts val="800"/>
+              </a:spcAft>
+            </a:pPr>
+            <a:r>
+              <a:rPr lang="en-US" sz="1800" kern="100" dirty="0">
                 <a:effectLst/>
-                <a:latin typeface="Apple SD Gothic Neo"/>
-              </a:rPr>
-              <a:t>In the paper, the authors mentioned the details and results of the experiments they conducted to verify the effectiveness of the algorithm they developed. As in the case of algorithms, it is difficult to describe the specific details of individual experiments here, so only the results of the experiments will be described.</a:t>
-            </a:r>
-            <a:endParaRPr lang="en-US" dirty="0"/>
+                <a:latin typeface="Calibri" panose="020F0502020204030204" pitchFamily="34" charset="0"/>
+                <a:ea typeface="맑은 고딕" panose="020B0503020000020004" pitchFamily="34" charset="-127"/>
+                <a:cs typeface="Calibri" panose="020F0502020204030204" pitchFamily="34" charset="0"/>
+              </a:rPr>
+              <a:t>[Slide 19] In the paper, the authors mentioned the details and results of the experiments they conducted to verify the effectiveness of the algorithm they developed. As in the case of algorithms, it is difficult to describe the specific details of individual experiments here, so only the results of the experiments will be described.</a:t>
+            </a:r>
+            <a:endParaRPr lang="en-US" sz="1800" kern="100" dirty="0">
+              <a:effectLst/>
+              <a:latin typeface="Calibri" panose="020F0502020204030204" pitchFamily="34" charset="0"/>
+              <a:ea typeface="맑은 고딕" panose="020B0503020000020004" pitchFamily="34" charset="-127"/>
+              <a:cs typeface="Times New Roman" panose="02020603050405020304" pitchFamily="18" charset="0"/>
+            </a:endParaRPr>
           </a:p>
         </p:txBody>
       </p:sp>
@@ -1692,10 +2208,29 @@
           <a:bodyPr/>
           <a:lstStyle/>
           <a:p>
-            <a:r>
-              <a:rPr lang="en-US" dirty="0"/>
-              <a:t>The paper our group reviewed is related to 'Data Provenance', one of the topics we studied in class, and aims to introduce a new advanced explanation system that can be applied to sophisticated machine learning models used for high-stakes decisions. We will proceed with our presentation in the order of the index presented here in this slide. This order is similar to the way the paper is developed. It proceeds in the following order: motivation, which presents the need for the algorithm, terminology, which establishes the main concepts, algorithm, which introduces the algorithm, evaluation, which introduces the results of evaluating the algorithm, and limitation, which specifies the limitations of the paper. In the conclusion, we will briefly talk about our group's impressions and conclusions about the paper.</a:t>
-            </a:r>
+            <a:pPr>
+              <a:lnSpc>
+                <a:spcPct val="107000"/>
+              </a:lnSpc>
+              <a:spcAft>
+                <a:spcPts val="800"/>
+              </a:spcAft>
+            </a:pPr>
+            <a:r>
+              <a:rPr lang="en-US" sz="1800" kern="100" dirty="0">
+                <a:effectLst/>
+                <a:latin typeface="Calibri" panose="020F0502020204030204" pitchFamily="34" charset="0"/>
+                <a:ea typeface="맑은 고딕" panose="020B0503020000020004" pitchFamily="34" charset="-127"/>
+                <a:cs typeface="Calibri" panose="020F0502020204030204" pitchFamily="34" charset="0"/>
+              </a:rPr>
+              <a:t>[Slide 2] This paper relates to 'Data Provenance' and introduces an advanced explanation system for complex machine learning models. Our presentation follows the structure of the paper.</a:t>
+            </a:r>
+            <a:endParaRPr lang="en-US" sz="1800" kern="100" dirty="0">
+              <a:effectLst/>
+              <a:latin typeface="Calibri" panose="020F0502020204030204" pitchFamily="34" charset="0"/>
+              <a:ea typeface="맑은 고딕" panose="020B0503020000020004" pitchFamily="34" charset="-127"/>
+              <a:cs typeface="Times New Roman" panose="02020603050405020304" pitchFamily="18" charset="0"/>
+            </a:endParaRPr>
           </a:p>
         </p:txBody>
       </p:sp>
@@ -1779,66 +2314,140 @@
           <a:bodyPr/>
           <a:lstStyle/>
           <a:p>
-            <a:r>
-              <a:rPr lang="en-US" b="0" i="0" dirty="0">
+            <a:pPr>
+              <a:lnSpc>
+                <a:spcPct val="107000"/>
+              </a:lnSpc>
+              <a:spcAft>
+                <a:spcPts val="800"/>
+              </a:spcAft>
+            </a:pPr>
+            <a:r>
+              <a:rPr lang="en-US" sz="1800" kern="100" dirty="0">
+                <a:effectLst/>
+                <a:latin typeface="Calibri" panose="020F0502020204030204" pitchFamily="34" charset="0"/>
+                <a:ea typeface="맑은 고딕" panose="020B0503020000020004" pitchFamily="34" charset="-127"/>
+                <a:cs typeface="Calibri" panose="020F0502020204030204" pitchFamily="34" charset="0"/>
+              </a:rPr>
+              <a:t>[Slide 20] The four data sets shown in the table above were used to evaluate the algorithm. As you go from left to right, you can see that the data set becomes more complex and atypical. Note that the counterfactual explanation model applied to the newly introduced algorithm was considered a black box and was reflected in the form of borrowing the </a:t>
+            </a:r>
+            <a:r>
+              <a:rPr lang="en-US" sz="1800" kern="100" dirty="0" err="1">
+                <a:effectLst/>
+                <a:latin typeface="Calibri" panose="020F0502020204030204" pitchFamily="34" charset="0"/>
+                <a:ea typeface="맑은 고딕" panose="020B0503020000020004" pitchFamily="34" charset="-127"/>
+                <a:cs typeface="Calibri" panose="020F0502020204030204" pitchFamily="34" charset="0"/>
+              </a:rPr>
+              <a:t>GeCo</a:t>
+            </a:r>
+            <a:r>
+              <a:rPr lang="en-US" sz="1800" kern="100" dirty="0">
+                <a:effectLst/>
+                <a:latin typeface="Calibri" panose="020F0502020204030204" pitchFamily="34" charset="0"/>
+                <a:ea typeface="맑은 고딕" panose="020B0503020000020004" pitchFamily="34" charset="-127"/>
+                <a:cs typeface="Calibri" panose="020F0502020204030204" pitchFamily="34" charset="0"/>
+              </a:rPr>
+              <a:t> model after evaluating 13 existing models. Evaluation of the model can be found at the GitHub address above. The </a:t>
+            </a:r>
+            <a:r>
+              <a:rPr lang="en-US" sz="1800" kern="100" dirty="0" err="1">
+                <a:effectLst/>
+                <a:latin typeface="Calibri" panose="020F0502020204030204" pitchFamily="34" charset="0"/>
+                <a:ea typeface="맑은 고딕" panose="020B0503020000020004" pitchFamily="34" charset="-127"/>
+                <a:cs typeface="Calibri" panose="020F0502020204030204" pitchFamily="34" charset="0"/>
+              </a:rPr>
+              <a:t>CFRules</a:t>
+            </a:r>
+            <a:r>
+              <a:rPr lang="en-US" sz="1800" kern="100" dirty="0">
+                <a:effectLst/>
+                <a:latin typeface="Calibri" panose="020F0502020204030204" pitchFamily="34" charset="0"/>
+                <a:ea typeface="맑은 고딕" panose="020B0503020000020004" pitchFamily="34" charset="-127"/>
+                <a:cs typeface="Calibri" panose="020F0502020204030204" pitchFamily="34" charset="0"/>
+              </a:rPr>
+              <a:t> and </a:t>
+            </a:r>
+            <a:r>
+              <a:rPr lang="en-US" sz="1800" kern="100" dirty="0" err="1">
+                <a:effectLst/>
+                <a:latin typeface="Calibri" panose="020F0502020204030204" pitchFamily="34" charset="0"/>
+                <a:ea typeface="맑은 고딕" panose="020B0503020000020004" pitchFamily="34" charset="-127"/>
+                <a:cs typeface="Calibri" panose="020F0502020204030204" pitchFamily="34" charset="0"/>
+              </a:rPr>
+              <a:t>consistentCF</a:t>
+            </a:r>
+            <a:r>
+              <a:rPr lang="en-US" sz="1800" kern="100" dirty="0">
+                <a:effectLst/>
+                <a:latin typeface="Calibri" panose="020F0502020204030204" pitchFamily="34" charset="0"/>
+                <a:ea typeface="맑은 고딕" panose="020B0503020000020004" pitchFamily="34" charset="-127"/>
+                <a:cs typeface="Calibri" panose="020F0502020204030204" pitchFamily="34" charset="0"/>
+              </a:rPr>
+              <a:t> included in the algorithm were not implemented by </a:t>
+            </a:r>
+            <a:r>
+              <a:rPr lang="en-US" sz="1800" kern="100" dirty="0">
                 <a:solidFill>
-                  <a:srgbClr val="E8EAED"/>
+                  <a:srgbClr val="000000"/>
                 </a:solidFill>
                 <a:effectLst/>
-                <a:latin typeface="Apple SD Gothic Neo"/>
-              </a:rPr>
-              <a:t>The four datasets shown in the table above were used to evaluate the algorithm. As you go from left to right, you can see that the dataset becomes more complex and atypical. </a:t>
-            </a:r>
-            <a:r>
-              <a:rPr lang="en-US" dirty="0"/>
-              <a:t>Note that, the Counterfactual explanation model applied to the newly introduced algorithm was considered a black box and was reflected in the form of borrowing the </a:t>
-            </a:r>
-            <a:r>
-              <a:rPr lang="en-US" dirty="0" err="1"/>
+                <a:latin typeface="Calibri" panose="020F0502020204030204" pitchFamily="34" charset="0"/>
+                <a:ea typeface="맑은 고딕" panose="020B0503020000020004" pitchFamily="34" charset="-127"/>
+                <a:cs typeface="Calibri" panose="020F0502020204030204" pitchFamily="34" charset="0"/>
+              </a:rPr>
+              <a:t>themselves but</a:t>
+            </a:r>
+            <a:r>
+              <a:rPr lang="en-US" sz="1800" kern="100" dirty="0">
+                <a:effectLst/>
+                <a:latin typeface="Calibri" panose="020F0502020204030204" pitchFamily="34" charset="0"/>
+                <a:ea typeface="맑은 고딕" panose="020B0503020000020004" pitchFamily="34" charset="-127"/>
+                <a:cs typeface="Calibri" panose="020F0502020204030204" pitchFamily="34" charset="0"/>
+              </a:rPr>
+              <a:t> were applied using </a:t>
+            </a:r>
+            <a:r>
+              <a:rPr lang="en-US" sz="1800" kern="100" dirty="0" err="1">
+                <a:effectLst/>
+                <a:latin typeface="Calibri" panose="020F0502020204030204" pitchFamily="34" charset="0"/>
+                <a:ea typeface="맑은 고딕" panose="020B0503020000020004" pitchFamily="34" charset="-127"/>
+                <a:cs typeface="Calibri" panose="020F0502020204030204" pitchFamily="34" charset="0"/>
+              </a:rPr>
               <a:t>GeCo</a:t>
             </a:r>
             <a:r>
-              <a:rPr lang="en-US" dirty="0"/>
-              <a:t> model after evaluating 13 existing models. Evaluation of the model can be found at the GitHub address above. </a:t>
-            </a:r>
-            <a:r>
-              <a:rPr lang="en-US" dirty="0" err="1"/>
-              <a:t>CFRules</a:t>
-            </a:r>
-            <a:r>
-              <a:rPr lang="en-US" dirty="0"/>
-              <a:t> and </a:t>
-            </a:r>
-            <a:r>
-              <a:rPr lang="en-US" dirty="0" err="1"/>
-              <a:t>consistentCF</a:t>
-            </a:r>
-            <a:r>
-              <a:rPr lang="en-US" dirty="0"/>
-              <a:t> included in the algorithm were not implemented by themselves but were applied by utilizing </a:t>
-            </a:r>
-            <a:r>
-              <a:rPr lang="en-US" dirty="0" err="1"/>
-              <a:t>GeCo</a:t>
-            </a:r>
-            <a:r>
-              <a:rPr lang="en-US" dirty="0"/>
-              <a:t>. </a:t>
-            </a:r>
-          </a:p>
-          <a:p>
-            <a:r>
-              <a:rPr lang="en-US" dirty="0"/>
-              <a:t>Additionally, the authors strengthened the effectiveness of the verification by including a comparison with existing systems Anchor and </a:t>
-            </a:r>
-            <a:r>
-              <a:rPr lang="en-US" dirty="0" err="1"/>
+              <a:rPr lang="en-US" sz="1800" kern="100" dirty="0">
+                <a:effectLst/>
+                <a:latin typeface="Calibri" panose="020F0502020204030204" pitchFamily="34" charset="0"/>
+                <a:ea typeface="맑은 고딕" panose="020B0503020000020004" pitchFamily="34" charset="-127"/>
+                <a:cs typeface="Calibri" panose="020F0502020204030204" pitchFamily="34" charset="0"/>
+              </a:rPr>
+              <a:t>. Furthermore, the authors strengthened the effectiveness of the verification by including a comparison with existing systems Anchor and </a:t>
+            </a:r>
+            <a:r>
+              <a:rPr lang="en-US" sz="1800" kern="100" dirty="0" err="1">
+                <a:effectLst/>
+                <a:latin typeface="Calibri" panose="020F0502020204030204" pitchFamily="34" charset="0"/>
+                <a:ea typeface="맑은 고딕" panose="020B0503020000020004" pitchFamily="34" charset="-127"/>
+                <a:cs typeface="Calibri" panose="020F0502020204030204" pitchFamily="34" charset="0"/>
+              </a:rPr>
               <a:t>MinSetCover</a:t>
             </a:r>
             <a:r>
-              <a:rPr lang="en-US" dirty="0"/>
+              <a:rPr lang="en-US" sz="1800" kern="100" dirty="0">
+                <a:effectLst/>
+                <a:latin typeface="Calibri" panose="020F0502020204030204" pitchFamily="34" charset="0"/>
+                <a:ea typeface="맑은 고딕" panose="020B0503020000020004" pitchFamily="34" charset="-127"/>
+                <a:cs typeface="Calibri" panose="020F0502020204030204" pitchFamily="34" charset="0"/>
+              </a:rPr>
               <a:t> in the evaluation.</a:t>
             </a:r>
+            <a:endParaRPr lang="en-US" sz="1800" kern="100" dirty="0">
+              <a:effectLst/>
+              <a:latin typeface="Calibri" panose="020F0502020204030204" pitchFamily="34" charset="0"/>
+              <a:ea typeface="맑은 고딕" panose="020B0503020000020004" pitchFamily="34" charset="-127"/>
+              <a:cs typeface="Times New Roman" panose="02020603050405020304" pitchFamily="18" charset="0"/>
+            </a:endParaRPr>
           </a:p>
         </p:txBody>
       </p:sp>
@@ -1922,88 +2531,50 @@
           <a:bodyPr/>
           <a:lstStyle/>
           <a:p>
-            <a:r>
-              <a:rPr lang="en-US" dirty="0"/>
-              <a:t>The first assessment performed was on quality in terms of consistency and interpretability. In other words, the evaluation concerns the effectiveness of the algorithm. </a:t>
-            </a:r>
-            <a:r>
-              <a:rPr lang="en-US" b="0" i="0" dirty="0">
+            <a:pPr>
+              <a:lnSpc>
+                <a:spcPct val="107000"/>
+              </a:lnSpc>
+              <a:spcAft>
+                <a:spcPts val="800"/>
+              </a:spcAft>
+            </a:pPr>
+            <a:r>
+              <a:rPr lang="en-US" sz="1800" kern="100" dirty="0">
+                <a:effectLst/>
+                <a:latin typeface="Calibri" panose="020F0502020204030204" pitchFamily="34" charset="0"/>
+                <a:ea typeface="맑은 고딕" panose="020B0503020000020004" pitchFamily="34" charset="-127"/>
+                <a:cs typeface="Calibri" panose="020F0502020204030204" pitchFamily="34" charset="0"/>
+              </a:rPr>
+              <a:t>[Slide 21] The first evaluation carried out was </a:t>
+            </a:r>
+            <a:r>
+              <a:rPr lang="en-US" sz="1800" kern="100" dirty="0">
                 <a:solidFill>
-                  <a:srgbClr val="E8EAED"/>
+                  <a:srgbClr val="000000"/>
                 </a:solidFill>
                 <a:effectLst/>
-                <a:latin typeface="Apple SD Gothic Neo"/>
-              </a:rPr>
-              <a:t>The authors evaluated three algorithms and two benchmark algorithms on the synthetic classifier version, which refers to the rule itself, and then performed the same evaluation on the real classifier version. </a:t>
-            </a:r>
-            <a:br>
-              <a:rPr lang="en-US" dirty="0"/>
-            </a:br>
-            <a:r>
-              <a:rPr lang="en-US" b="0" i="0" dirty="0">
-                <a:solidFill>
-                  <a:srgbClr val="E8EAED"/>
-                </a:solidFill>
+                <a:latin typeface="Calibri" panose="020F0502020204030204" pitchFamily="34" charset="0"/>
+                <a:ea typeface="맑은 고딕" panose="020B0503020000020004" pitchFamily="34" charset="-127"/>
+                <a:cs typeface="Calibri" panose="020F0502020204030204" pitchFamily="34" charset="0"/>
+              </a:rPr>
+              <a:t>of</a:t>
+            </a:r>
+            <a:r>
+              <a:rPr lang="en-US" sz="1800" kern="100" dirty="0">
                 <a:effectLst/>
-                <a:latin typeface="Apple SD Gothic Neo"/>
-              </a:rPr>
-              <a:t>When testing synthetic classifiers, the consistency level of each algorithm was evaluated against the same cardinality of classifiers.</a:t>
-            </a:r>
-          </a:p>
-          <a:p>
-            <a:r>
-              <a:rPr lang="en-US" dirty="0"/>
-              <a:t> As can be seen in Figure 1 on the left, the three newly developed algorithms are superior to the remaining two benchmark algorithms in all cases, and no inconsistency is reported at all except for the most complex case. Among these, only the </a:t>
-            </a:r>
-            <a:r>
-              <a:rPr lang="en-US" dirty="0" err="1"/>
-              <a:t>GeneticRule</a:t>
-            </a:r>
-            <a:r>
-              <a:rPr lang="en-US" dirty="0"/>
-              <a:t> algorithm, which did not utilize the </a:t>
-            </a:r>
-            <a:r>
-              <a:rPr lang="en-US" dirty="0" err="1"/>
-              <a:t>Couterfactual</a:t>
-            </a:r>
-            <a:r>
-              <a:rPr lang="en-US" dirty="0"/>
-              <a:t> explanation system, showed a relatively low level of consistency. On the other hand, the benchmark system shows inconsistency in all cases except for the results shown by </a:t>
-            </a:r>
-            <a:r>
-              <a:rPr lang="en-US" dirty="0" err="1"/>
-              <a:t>MinSetCover</a:t>
-            </a:r>
-            <a:r>
-              <a:rPr lang="en-US" dirty="0"/>
-              <a:t> in the simplest case comparison. Additionally, as cardinality increases, this problematic trend increases exponentially.</a:t>
-            </a:r>
-          </a:p>
-          <a:p>
-            <a:r>
-              <a:rPr lang="en-US" dirty="0"/>
-              <a:t> As can be seen in Figure 2 on the right, tests applying the Real Classifier test were somewhat more realistic than previous results, and a low level of consistency was reported for the three newly developed algorithms. Among them, the Genetic algorithm that was not leveraged with a counterfactual explanation showed a low level of consistency similar to that of the benchmark algorithm. One notable point is that, unlike </a:t>
-            </a:r>
-            <a:r>
-              <a:rPr lang="en-US" dirty="0" err="1"/>
-              <a:t>GeneticRuleCF</a:t>
-            </a:r>
-            <a:r>
-              <a:rPr lang="en-US" dirty="0"/>
-              <a:t>, </a:t>
-            </a:r>
-            <a:r>
-              <a:rPr lang="en-US" dirty="0" err="1"/>
-              <a:t>GreedyRuleCF</a:t>
-            </a:r>
-            <a:r>
-              <a:rPr lang="en-US" dirty="0"/>
-              <a:t> does not report any redundancy.</a:t>
-            </a:r>
-          </a:p>
-          <a:p>
-            <a:endParaRPr lang="en-US" dirty="0"/>
+                <a:latin typeface="Calibri" panose="020F0502020204030204" pitchFamily="34" charset="0"/>
+                <a:ea typeface="맑은 고딕" panose="020B0503020000020004" pitchFamily="34" charset="-127"/>
+                <a:cs typeface="Calibri" panose="020F0502020204030204" pitchFamily="34" charset="0"/>
+              </a:rPr>
+              <a:t> quality in terms of consistency and interpretability. In other words, the evaluation concerns the effectiveness of the algorithm. The authors evaluated three algorithms and two benchmark algorithms on the synthetic classifier version, which refers to the rule itself, and then performed the same evaluation on the real classifier version. When tested against synthetic classifiers, the new algorithms all outperformed the benchmarks, and when tested against real classifiers, the algorithms utilized by the counterfactual explanation system mainly outperformed other algorithms. Regarding the test results of the real classifier, the authors analyzed that the introduction of the counterfactual explanation system influenced improved consistency and effective redundancy control.</a:t>
+            </a:r>
+            <a:endParaRPr lang="en-US" sz="1800" kern="100" dirty="0">
+              <a:effectLst/>
+              <a:latin typeface="Calibri" panose="020F0502020204030204" pitchFamily="34" charset="0"/>
+              <a:ea typeface="맑은 고딕" panose="020B0503020000020004" pitchFamily="34" charset="-127"/>
+              <a:cs typeface="Times New Roman" panose="02020603050405020304" pitchFamily="18" charset="0"/>
+            </a:endParaRPr>
           </a:p>
         </p:txBody>
       </p:sp>
@@ -2087,30 +2658,113 @@
           <a:bodyPr/>
           <a:lstStyle/>
           <a:p>
-            <a:r>
-              <a:rPr lang="en-US" dirty="0"/>
-              <a:t>The second evaluation performed was in terms of runtime comparison, i.e. efficiency.</a:t>
-            </a:r>
-          </a:p>
-          <a:p>
-            <a:r>
-              <a:rPr lang="en-US" dirty="0"/>
-              <a:t> According to the results of the Synthetic Classifier shown in Figure 3, the three newly developed algorithms were more efficient than the remaining two benchmark algorithms in all cases. Also, according to the results, an increase in cardinality, or an increase in complexity, affected runtime, but the counterfactual explanation leveraged algorithm, which can add one or more rules in one iteration, tended to be less affected.</a:t>
-            </a:r>
-          </a:p>
-          <a:p>
-            <a:r>
-              <a:rPr lang="en-US" dirty="0"/>
-              <a:t> The results of such runtime tests appear in a more complex form when testing real classifiers that utilize actual datasets. The authors analyzed that, in addition to cardinality, that is, the complexity factor, each algorithm's ability to handle data, such as whether one-hot encoding can be handled as a single function or strong consistency verification ability, affected execution time. In this case, what is particularly noteworthy is that the performance of Greedy Rule CF drops very sharply as the dataset becomes more complex. Despite the superior effectiveness of </a:t>
-            </a:r>
-            <a:r>
-              <a:rPr lang="en-US" dirty="0" err="1"/>
-              <a:t>GreedyRuleCF</a:t>
-            </a:r>
-            <a:r>
-              <a:rPr lang="en-US" dirty="0"/>
-              <a:t> analyzed previously, its performance appears to largely offset the gains on large, complex datasets. The authors believe that the main reason is the strong consistency verification ability of counterfactual explanations.</a:t>
-            </a:r>
+            <a:pPr>
+              <a:lnSpc>
+                <a:spcPct val="107000"/>
+              </a:lnSpc>
+              <a:spcAft>
+                <a:spcPts val="800"/>
+              </a:spcAft>
+            </a:pPr>
+            <a:r>
+              <a:rPr lang="en-US" sz="1800" kern="100" dirty="0">
+                <a:effectLst/>
+                <a:latin typeface="Calibri" panose="020F0502020204030204" pitchFamily="34" charset="0"/>
+                <a:ea typeface="맑은 고딕" panose="020B0503020000020004" pitchFamily="34" charset="-127"/>
+                <a:cs typeface="Calibri" panose="020F0502020204030204" pitchFamily="34" charset="0"/>
+              </a:rPr>
+              <a:t>[Slide 22] The second evaluation performed was in terms of run-time comparison, that is, efficiency. When tested against synthetic classifiers, all new algorithms outperformed the benchmarks, but when tested against real classifiers, algorithms using counterfactual explanation systems showed </a:t>
+            </a:r>
+            <a:r>
+              <a:rPr lang="en-US" sz="1800" kern="100" dirty="0">
+                <a:solidFill>
+                  <a:srgbClr val="000000"/>
+                </a:solidFill>
+                <a:effectLst/>
+                <a:latin typeface="Calibri" panose="020F0502020204030204" pitchFamily="34" charset="0"/>
+                <a:ea typeface="맑은 고딕" panose="020B0503020000020004" pitchFamily="34" charset="-127"/>
+                <a:cs typeface="Calibri" panose="020F0502020204030204" pitchFamily="34" charset="0"/>
+              </a:rPr>
+              <a:t>a</a:t>
+            </a:r>
+            <a:r>
+              <a:rPr lang="en-US" sz="1800" kern="100" dirty="0">
+                <a:effectLst/>
+                <a:latin typeface="Calibri" panose="020F0502020204030204" pitchFamily="34" charset="0"/>
+                <a:ea typeface="맑은 고딕" panose="020B0503020000020004" pitchFamily="34" charset="-127"/>
+                <a:cs typeface="Calibri" panose="020F0502020204030204" pitchFamily="34" charset="0"/>
+              </a:rPr>
+              <a:t> significant </a:t>
+            </a:r>
+            <a:r>
+              <a:rPr lang="en-US" sz="1800" kern="100" dirty="0">
+                <a:solidFill>
+                  <a:srgbClr val="000000"/>
+                </a:solidFill>
+                <a:effectLst/>
+                <a:latin typeface="Calibri" panose="020F0502020204030204" pitchFamily="34" charset="0"/>
+                <a:ea typeface="맑은 고딕" panose="020B0503020000020004" pitchFamily="34" charset="-127"/>
+                <a:cs typeface="Calibri" panose="020F0502020204030204" pitchFamily="34" charset="0"/>
+              </a:rPr>
+              <a:t>increase in run-time.</a:t>
+            </a:r>
+            <a:r>
+              <a:rPr lang="en-US" sz="1800" kern="100" dirty="0">
+                <a:effectLst/>
+                <a:latin typeface="Calibri" panose="020F0502020204030204" pitchFamily="34" charset="0"/>
+                <a:ea typeface="맑은 고딕" panose="020B0503020000020004" pitchFamily="34" charset="-127"/>
+                <a:cs typeface="Calibri" panose="020F0502020204030204" pitchFamily="34" charset="0"/>
+              </a:rPr>
+              <a:t> The authors analyzed that the strong verification function provided by the counterfactual explanation system was the main cause </a:t>
+            </a:r>
+            <a:r>
+              <a:rPr lang="en-US" sz="1800" kern="100" dirty="0">
+                <a:solidFill>
+                  <a:srgbClr val="000000"/>
+                </a:solidFill>
+                <a:effectLst/>
+                <a:latin typeface="Calibri" panose="020F0502020204030204" pitchFamily="34" charset="0"/>
+                <a:ea typeface="맑은 고딕" panose="020B0503020000020004" pitchFamily="34" charset="-127"/>
+                <a:cs typeface="Calibri" panose="020F0502020204030204" pitchFamily="34" charset="0"/>
+              </a:rPr>
+              <a:t>of significantly</a:t>
+            </a:r>
+            <a:r>
+              <a:rPr lang="en-US" sz="1800" kern="100" dirty="0">
+                <a:effectLst/>
+                <a:latin typeface="Calibri" panose="020F0502020204030204" pitchFamily="34" charset="0"/>
+                <a:ea typeface="맑은 고딕" panose="020B0503020000020004" pitchFamily="34" charset="-127"/>
+                <a:cs typeface="Calibri" panose="020F0502020204030204" pitchFamily="34" charset="0"/>
+              </a:rPr>
+              <a:t> increased </a:t>
+            </a:r>
+            <a:r>
+              <a:rPr lang="en-US" sz="1800" kern="100" dirty="0">
+                <a:solidFill>
+                  <a:srgbClr val="000000"/>
+                </a:solidFill>
+                <a:effectLst/>
+                <a:latin typeface="Calibri" panose="020F0502020204030204" pitchFamily="34" charset="0"/>
+                <a:ea typeface="맑은 고딕" panose="020B0503020000020004" pitchFamily="34" charset="-127"/>
+                <a:cs typeface="Calibri" panose="020F0502020204030204" pitchFamily="34" charset="0"/>
+              </a:rPr>
+              <a:t>run time</a:t>
+            </a:r>
+            <a:r>
+              <a:rPr lang="en-US" sz="1800" kern="100" dirty="0">
+                <a:effectLst/>
+                <a:latin typeface="Calibri" panose="020F0502020204030204" pitchFamily="34" charset="0"/>
+                <a:ea typeface="맑은 고딕" panose="020B0503020000020004" pitchFamily="34" charset="-127"/>
+                <a:cs typeface="Calibri" panose="020F0502020204030204" pitchFamily="34" charset="0"/>
+              </a:rPr>
+              <a:t> with the complexity of the data.</a:t>
+            </a:r>
+            <a:endParaRPr lang="en-US" sz="1800" kern="100" dirty="0">
+              <a:effectLst/>
+              <a:latin typeface="Calibri" panose="020F0502020204030204" pitchFamily="34" charset="0"/>
+              <a:ea typeface="맑은 고딕" panose="020B0503020000020004" pitchFamily="34" charset="-127"/>
+              <a:cs typeface="Times New Roman" panose="02020603050405020304" pitchFamily="18" charset="0"/>
+            </a:endParaRPr>
           </a:p>
         </p:txBody>
       </p:sp>
@@ -2194,48 +2848,50 @@
           <a:bodyPr/>
           <a:lstStyle/>
           <a:p>
-            <a:r>
-              <a:rPr lang="en-US" dirty="0"/>
-              <a:t>Lastly, the authors included an attempt to analyze the previously evaluated test results in more detail through microbenchmarks.</a:t>
-            </a:r>
-          </a:p>
-          <a:p>
-            <a:r>
-              <a:rPr lang="en-US" dirty="0"/>
-              <a:t>First, the authors tested the pure run time of Classifier and </a:t>
-            </a:r>
-            <a:r>
-              <a:rPr lang="en-US" dirty="0" err="1"/>
-              <a:t>GeCo</a:t>
-            </a:r>
-            <a:r>
-              <a:rPr lang="en-US" dirty="0"/>
-              <a:t> for each dataset. Accordingly, the authors judged that the counterfactual explanation system had the greatest impact and suggested the need for improvement. Second, tests were conducted to check the number of candidate rules discovered for each algorithm developed for each different dataset. According to this, when the dataset is relatively simple, algorithms leveraged by counterfactual explanations focus on minimizing data redundancy, and in the opposite case, the degree of search increases sharply by focusing on finding consistent candidates. Finally, tests were performed to determine the extent to which </a:t>
-            </a:r>
-            <a:r>
-              <a:rPr lang="en-US" dirty="0" err="1"/>
-              <a:t>GeCo</a:t>
-            </a:r>
-            <a:r>
-              <a:rPr lang="en-US" dirty="0"/>
-              <a:t> was called for each dataset. Based on their results, the authors concluded that </a:t>
-            </a:r>
-            <a:r>
-              <a:rPr lang="en-US" dirty="0" err="1"/>
-              <a:t>GeneticRuleCF</a:t>
-            </a:r>
-            <a:r>
-              <a:rPr lang="en-US" dirty="0"/>
-              <a:t> is more ideal than </a:t>
-            </a:r>
-            <a:r>
-              <a:rPr lang="en-US" dirty="0" err="1"/>
-              <a:t>GreedyRuleCF</a:t>
-            </a:r>
-            <a:r>
-              <a:rPr lang="en-US" dirty="0"/>
-              <a:t> for large and complex datasets.</a:t>
-            </a:r>
+            <a:pPr>
+              <a:lnSpc>
+                <a:spcPct val="107000"/>
+              </a:lnSpc>
+              <a:spcAft>
+                <a:spcPts val="800"/>
+              </a:spcAft>
+            </a:pPr>
+            <a:r>
+              <a:rPr lang="en-US" sz="1800" kern="100" dirty="0">
+                <a:effectLst/>
+                <a:latin typeface="Calibri" panose="020F0502020204030204" pitchFamily="34" charset="0"/>
+                <a:ea typeface="맑은 고딕" panose="020B0503020000020004" pitchFamily="34" charset="-127"/>
+                <a:cs typeface="Calibri" panose="020F0502020204030204" pitchFamily="34" charset="0"/>
+              </a:rPr>
+              <a:t>[Slide 23] Finally, the authors included an attempt to analyze the test results evaluated previously in more detail using microbenchmarks. The result shows that as data sets become more complex, the performance of the underlying counterfactual explanation system deteriorates significantly. The author points out that </a:t>
+            </a:r>
+            <a:r>
+              <a:rPr lang="en-US" sz="1800" kern="100" dirty="0">
+                <a:solidFill>
+                  <a:srgbClr val="000000"/>
+                </a:solidFill>
+                <a:effectLst/>
+                <a:latin typeface="Calibri" panose="020F0502020204030204" pitchFamily="34" charset="0"/>
+                <a:ea typeface="맑은 고딕" panose="020B0503020000020004" pitchFamily="34" charset="-127"/>
+                <a:cs typeface="Calibri" panose="020F0502020204030204" pitchFamily="34" charset="0"/>
+              </a:rPr>
+              <a:t>this happens</a:t>
+            </a:r>
+            <a:r>
+              <a:rPr lang="en-US" sz="1800" kern="100" dirty="0">
+                <a:effectLst/>
+                <a:latin typeface="Calibri" panose="020F0502020204030204" pitchFamily="34" charset="0"/>
+                <a:ea typeface="맑은 고딕" panose="020B0503020000020004" pitchFamily="34" charset="-127"/>
+                <a:cs typeface="Calibri" panose="020F0502020204030204" pitchFamily="34" charset="0"/>
+              </a:rPr>
+              <a:t> because as data sets become more complex, the system places a stronger emphasis on finding consistent candidates.</a:t>
+            </a:r>
+            <a:endParaRPr lang="en-US" sz="1800" kern="100" dirty="0">
+              <a:effectLst/>
+              <a:latin typeface="Calibri" panose="020F0502020204030204" pitchFamily="34" charset="0"/>
+              <a:ea typeface="맑은 고딕" panose="020B0503020000020004" pitchFamily="34" charset="-127"/>
+              <a:cs typeface="Times New Roman" panose="02020603050405020304" pitchFamily="18" charset="0"/>
+            </a:endParaRPr>
           </a:p>
         </p:txBody>
       </p:sp>
@@ -2319,14 +2975,29 @@
           <a:bodyPr/>
           <a:lstStyle/>
           <a:p>
-            <a:r>
-              <a:rPr lang="en-US"/>
-              <a:t>In </a:t>
-            </a:r>
-            <a:r>
-              <a:rPr lang="en-US" dirty="0"/>
-              <a:t>addition to previous evaluations, the authors acknowledged the limitations of the results and mentioned future improvement plans. In addition to the parts described in this paper, we would like to add some opinions we have discovered regarding the feasibility and effectiveness of the algorithm.</a:t>
-            </a:r>
+            <a:pPr>
+              <a:lnSpc>
+                <a:spcPct val="107000"/>
+              </a:lnSpc>
+              <a:spcAft>
+                <a:spcPts val="800"/>
+              </a:spcAft>
+            </a:pPr>
+            <a:r>
+              <a:rPr lang="en-US" sz="1800" kern="100" dirty="0">
+                <a:effectLst/>
+                <a:latin typeface="Calibri" panose="020F0502020204030204" pitchFamily="34" charset="0"/>
+                <a:ea typeface="맑은 고딕" panose="020B0503020000020004" pitchFamily="34" charset="-127"/>
+                <a:cs typeface="Calibri" panose="020F0502020204030204" pitchFamily="34" charset="0"/>
+              </a:rPr>
+              <a:t>[Slide 24] In addition to previous evaluations, the authors acknowledged the limitations of the results and mentioned future improvement plans. In addition to the parts described in this paper, we would like to add some opinions we have discovered regarding the feasibility and effectiveness of the algorithm.</a:t>
+            </a:r>
+            <a:endParaRPr lang="en-US" sz="1800" kern="100" dirty="0">
+              <a:effectLst/>
+              <a:latin typeface="Calibri" panose="020F0502020204030204" pitchFamily="34" charset="0"/>
+              <a:ea typeface="맑은 고딕" panose="020B0503020000020004" pitchFamily="34" charset="-127"/>
+              <a:cs typeface="Times New Roman" panose="02020603050405020304" pitchFamily="18" charset="0"/>
+            </a:endParaRPr>
           </a:p>
         </p:txBody>
       </p:sp>
@@ -2410,10 +3081,92 @@
           <a:bodyPr/>
           <a:lstStyle/>
           <a:p>
-            <a:r>
-              <a:rPr lang="en-US" dirty="0"/>
-              <a:t>The authors presented the limitations of the algorithm they developed, and the improvements needed in the future, organized into the five items above. However, I think these five items can be largely summarized in the aspect of ‘generality’ or ‘versatility’. Constraints represented by data consistency are useful for comparison with existing systems, but they limit the verification of whether the created algorithm is actually an effective explanation system. Additionally, data is not binary and is mutable. Above all, when data consistency is not assumed, the premise for the existing correlation proven through the Duality Theorem becomes unstable. In addition, the need for a more developed counterfactual explanation model is that the introduced algorithm relies heavily on the black box counterfactual explanation model, so it will be difficult to evaluate its value until the counterfactual explanation model, the corresponding algorithm, is established. In summary, the evaluation of the paper's algorithm can only be properly performed if the same performance and effect can be expected even when using a more realistic dataset, a more effective counterfactual explanation model must be introduced, and the existing premise of Duality must be maintained. </a:t>
-            </a:r>
+            <a:pPr>
+              <a:lnSpc>
+                <a:spcPct val="107000"/>
+              </a:lnSpc>
+              <a:spcAft>
+                <a:spcPts val="800"/>
+              </a:spcAft>
+            </a:pPr>
+            <a:r>
+              <a:rPr lang="en-US" sz="1800" kern="100" dirty="0">
+                <a:effectLst/>
+                <a:latin typeface="Calibri" panose="020F0502020204030204" pitchFamily="34" charset="0"/>
+                <a:ea typeface="맑은 고딕" panose="020B0503020000020004" pitchFamily="34" charset="-127"/>
+                <a:cs typeface="Calibri" panose="020F0502020204030204" pitchFamily="34" charset="0"/>
+              </a:rPr>
+              <a:t>[Slide 25] The authors presented the limitations of the algorithm they developed, and the improvements needed in the future, organized into the five above. However, I think these five elements can be largely summarized in the 'generality' </a:t>
+            </a:r>
+            <a:r>
+              <a:rPr lang="en-US" sz="1800" kern="100" dirty="0">
+                <a:solidFill>
+                  <a:srgbClr val="000000"/>
+                </a:solidFill>
+                <a:effectLst/>
+                <a:latin typeface="Calibri" panose="020F0502020204030204" pitchFamily="34" charset="0"/>
+                <a:ea typeface="맑은 고딕" panose="020B0503020000020004" pitchFamily="34" charset="-127"/>
+                <a:cs typeface="Calibri" panose="020F0502020204030204" pitchFamily="34" charset="0"/>
+              </a:rPr>
+              <a:t>or 'versatility'</a:t>
+            </a:r>
+            <a:r>
+              <a:rPr lang="en-US" sz="1800" kern="100" dirty="0">
+                <a:effectLst/>
+                <a:latin typeface="Calibri" panose="020F0502020204030204" pitchFamily="34" charset="0"/>
+                <a:ea typeface="맑은 고딕" panose="020B0503020000020004" pitchFamily="34" charset="-127"/>
+                <a:cs typeface="Calibri" panose="020F0502020204030204" pitchFamily="34" charset="0"/>
+              </a:rPr>
+              <a:t> aspect. Constraints represented by data consistency are useful for comparison with existing systems but limit the verification of whether the algorithm created is an effective explanation system. </a:t>
+            </a:r>
+            <a:r>
+              <a:rPr lang="en-US" sz="1800" kern="100" dirty="0">
+                <a:solidFill>
+                  <a:srgbClr val="000000"/>
+                </a:solidFill>
+                <a:effectLst/>
+                <a:latin typeface="Calibri" panose="020F0502020204030204" pitchFamily="34" charset="0"/>
+                <a:ea typeface="맑은 고딕" panose="020B0503020000020004" pitchFamily="34" charset="-127"/>
+                <a:cs typeface="Calibri" panose="020F0502020204030204" pitchFamily="34" charset="0"/>
+              </a:rPr>
+              <a:t>Furthermore, the</a:t>
+            </a:r>
+            <a:r>
+              <a:rPr lang="en-US" sz="1800" kern="100" dirty="0">
+                <a:effectLst/>
+                <a:latin typeface="Calibri" panose="020F0502020204030204" pitchFamily="34" charset="0"/>
+                <a:ea typeface="맑은 고딕" panose="020B0503020000020004" pitchFamily="34" charset="-127"/>
+                <a:cs typeface="Calibri" panose="020F0502020204030204" pitchFamily="34" charset="0"/>
+              </a:rPr>
+              <a:t> data are not binary and are mutable. Above all, when data consistency is not assumed, the premise for the existing correlation proven through the duality Theorem becomes unstable. </a:t>
+            </a:r>
+            <a:r>
+              <a:rPr lang="en-US" sz="1800" kern="100" dirty="0">
+                <a:solidFill>
+                  <a:srgbClr val="000000"/>
+                </a:solidFill>
+                <a:effectLst/>
+                <a:latin typeface="Calibri" panose="020F0502020204030204" pitchFamily="34" charset="0"/>
+                <a:ea typeface="맑은 고딕" panose="020B0503020000020004" pitchFamily="34" charset="-127"/>
+                <a:cs typeface="Calibri" panose="020F0502020204030204" pitchFamily="34" charset="0"/>
+              </a:rPr>
+              <a:t>Furthermore,</a:t>
+            </a:r>
+            <a:r>
+              <a:rPr lang="en-US" sz="1800" kern="100" dirty="0">
+                <a:effectLst/>
+                <a:latin typeface="Calibri" panose="020F0502020204030204" pitchFamily="34" charset="0"/>
+                <a:ea typeface="맑은 고딕" panose="020B0503020000020004" pitchFamily="34" charset="-127"/>
+                <a:cs typeface="Calibri" panose="020F0502020204030204" pitchFamily="34" charset="0"/>
+              </a:rPr>
+              <a:t> the need for a more developed counterfactual explanation model is that the algorithm introduced relies heavily on the black-box counterfactual explanation model, so it will be difficult to evaluate its value until the counterfactual explanation model, the corresponding algorithm, is established. In summary, the evaluation of the paper's algorithm can only be properly performed if the same performance and effect can be expected even when using a more realistic dataset, a more effective counterfactual explanation model must be introduced, and the existing premise of duality must be maintained. </a:t>
+            </a:r>
+            <a:endParaRPr lang="en-US" sz="1800" kern="100" dirty="0">
+              <a:effectLst/>
+              <a:latin typeface="Calibri" panose="020F0502020204030204" pitchFamily="34" charset="0"/>
+              <a:ea typeface="맑은 고딕" panose="020B0503020000020004" pitchFamily="34" charset="-127"/>
+              <a:cs typeface="Times New Roman" panose="02020603050405020304" pitchFamily="18" charset="0"/>
+            </a:endParaRPr>
           </a:p>
         </p:txBody>
       </p:sp>
@@ -2497,18 +3250,152 @@
           <a:bodyPr/>
           <a:lstStyle/>
           <a:p>
-            <a:r>
-              <a:rPr lang="en-US" dirty="0"/>
-              <a:t>So far, through this paper, we have looked at the algorithm introduced Rule-Based Explanations by Leveraging counterfactuals as a new Explanation model for complex machine learning suitable for high-risk. Our conclusion is that although the algorithm has many limitations, it is meaningful to see that a more consistent and efficient approach to complex data automation can exist. Despite the ever-accelerating black </a:t>
-            </a:r>
-            <a:r>
-              <a:rPr lang="en-US" dirty="0" err="1"/>
+            <a:pPr>
+              <a:lnSpc>
+                <a:spcPct val="107000"/>
+              </a:lnSpc>
+              <a:spcAft>
+                <a:spcPts val="800"/>
+              </a:spcAft>
+            </a:pPr>
+            <a:r>
+              <a:rPr lang="en-US" sz="1800" kern="100" dirty="0">
+                <a:effectLst/>
+                <a:latin typeface="Calibri" panose="020F0502020204030204" pitchFamily="34" charset="0"/>
+                <a:ea typeface="맑은 고딕" panose="020B0503020000020004" pitchFamily="34" charset="-127"/>
+                <a:cs typeface="Calibri" panose="020F0502020204030204" pitchFamily="34" charset="0"/>
+              </a:rPr>
+              <a:t>[Slide 26] So far, </a:t>
+            </a:r>
+            <a:r>
+              <a:rPr lang="en-US" sz="1800" kern="100" dirty="0">
+                <a:solidFill>
+                  <a:srgbClr val="000000"/>
+                </a:solidFill>
+                <a:effectLst/>
+                <a:latin typeface="Calibri" panose="020F0502020204030204" pitchFamily="34" charset="0"/>
+                <a:ea typeface="맑은 고딕" panose="020B0503020000020004" pitchFamily="34" charset="-127"/>
+                <a:cs typeface="Calibri" panose="020F0502020204030204" pitchFamily="34" charset="0"/>
+              </a:rPr>
+              <a:t>in</a:t>
+            </a:r>
+            <a:r>
+              <a:rPr lang="en-US" sz="1800" kern="100" dirty="0">
+                <a:effectLst/>
+                <a:latin typeface="Calibri" panose="020F0502020204030204" pitchFamily="34" charset="0"/>
+                <a:ea typeface="맑은 고딕" panose="020B0503020000020004" pitchFamily="34" charset="-127"/>
+                <a:cs typeface="Calibri" panose="020F0502020204030204" pitchFamily="34" charset="0"/>
+              </a:rPr>
+              <a:t> this paper, we have looked at the algorithm </a:t>
+            </a:r>
+            <a:r>
+              <a:rPr lang="en-US" sz="1800" kern="100" dirty="0">
+                <a:solidFill>
+                  <a:srgbClr val="000000"/>
+                </a:solidFill>
+                <a:effectLst/>
+                <a:latin typeface="Calibri" panose="020F0502020204030204" pitchFamily="34" charset="0"/>
+                <a:ea typeface="맑은 고딕" panose="020B0503020000020004" pitchFamily="34" charset="-127"/>
+                <a:cs typeface="Calibri" panose="020F0502020204030204" pitchFamily="34" charset="0"/>
+              </a:rPr>
+              <a:t>introduced</a:t>
+            </a:r>
+            <a:r>
+              <a:rPr lang="en-US" sz="1800" kern="100" dirty="0">
+                <a:effectLst/>
+                <a:latin typeface="Calibri" panose="020F0502020204030204" pitchFamily="34" charset="0"/>
+                <a:ea typeface="맑은 고딕" panose="020B0503020000020004" pitchFamily="34" charset="-127"/>
+                <a:cs typeface="Calibri" panose="020F0502020204030204" pitchFamily="34" charset="0"/>
+              </a:rPr>
+              <a:t> by </a:t>
+            </a:r>
+            <a:r>
+              <a:rPr lang="en-US" sz="1800" kern="100" dirty="0">
+                <a:solidFill>
+                  <a:srgbClr val="000000"/>
+                </a:solidFill>
+                <a:effectLst/>
+                <a:latin typeface="Calibri" panose="020F0502020204030204" pitchFamily="34" charset="0"/>
+                <a:ea typeface="맑은 고딕" panose="020B0503020000020004" pitchFamily="34" charset="-127"/>
+                <a:cs typeface="Calibri" panose="020F0502020204030204" pitchFamily="34" charset="0"/>
+              </a:rPr>
+              <a:t>rule-based explanations by leveraging</a:t>
+            </a:r>
+            <a:r>
+              <a:rPr lang="en-US" sz="1800" kern="100" dirty="0">
+                <a:effectLst/>
+                <a:latin typeface="Calibri" panose="020F0502020204030204" pitchFamily="34" charset="0"/>
+                <a:ea typeface="맑은 고딕" panose="020B0503020000020004" pitchFamily="34" charset="-127"/>
+                <a:cs typeface="Calibri" panose="020F0502020204030204" pitchFamily="34" charset="0"/>
+              </a:rPr>
+              <a:t> counterfactuals as a new </a:t>
+            </a:r>
+            <a:r>
+              <a:rPr lang="en-US" sz="1800" kern="100" dirty="0">
+                <a:solidFill>
+                  <a:srgbClr val="000000"/>
+                </a:solidFill>
+                <a:effectLst/>
+                <a:latin typeface="Calibri" panose="020F0502020204030204" pitchFamily="34" charset="0"/>
+                <a:ea typeface="맑은 고딕" panose="020B0503020000020004" pitchFamily="34" charset="-127"/>
+                <a:cs typeface="Calibri" panose="020F0502020204030204" pitchFamily="34" charset="0"/>
+              </a:rPr>
+              <a:t>explanation</a:t>
+            </a:r>
+            <a:r>
+              <a:rPr lang="en-US" sz="1800" kern="100" dirty="0">
+                <a:effectLst/>
+                <a:latin typeface="Calibri" panose="020F0502020204030204" pitchFamily="34" charset="0"/>
+                <a:ea typeface="맑은 고딕" panose="020B0503020000020004" pitchFamily="34" charset="-127"/>
+                <a:cs typeface="Calibri" panose="020F0502020204030204" pitchFamily="34" charset="0"/>
+              </a:rPr>
+              <a:t> model for complex machine learning suitable for </a:t>
+            </a:r>
+            <a:r>
+              <a:rPr lang="en-US" sz="1800" kern="100" dirty="0">
+                <a:solidFill>
+                  <a:srgbClr val="000000"/>
+                </a:solidFill>
+                <a:effectLst/>
+                <a:latin typeface="Calibri" panose="020F0502020204030204" pitchFamily="34" charset="0"/>
+                <a:ea typeface="맑은 고딕" panose="020B0503020000020004" pitchFamily="34" charset="-127"/>
+                <a:cs typeface="Calibri" panose="020F0502020204030204" pitchFamily="34" charset="0"/>
+              </a:rPr>
+              <a:t>high risk.</a:t>
+            </a:r>
+            <a:r>
+              <a:rPr lang="en-US" sz="1800" kern="100" dirty="0">
+                <a:effectLst/>
+                <a:latin typeface="Calibri" panose="020F0502020204030204" pitchFamily="34" charset="0"/>
+                <a:ea typeface="맑은 고딕" panose="020B0503020000020004" pitchFamily="34" charset="-127"/>
+                <a:cs typeface="Calibri" panose="020F0502020204030204" pitchFamily="34" charset="0"/>
+              </a:rPr>
+              <a:t> Our conclusion is that, although the algorithm has many limitations, it is meaningful to see that a more consistent and efficient approach to complex data automation can exist. Despite the ever-accelerating black-</a:t>
+            </a:r>
+            <a:r>
+              <a:rPr lang="en-US" sz="1800" kern="100" dirty="0" err="1">
+                <a:effectLst/>
+                <a:latin typeface="Calibri" panose="020F0502020204030204" pitchFamily="34" charset="0"/>
+                <a:ea typeface="맑은 고딕" panose="020B0503020000020004" pitchFamily="34" charset="-127"/>
+                <a:cs typeface="Calibri" panose="020F0502020204030204" pitchFamily="34" charset="0"/>
+              </a:rPr>
               <a:t>boxization</a:t>
             </a:r>
             <a:r>
-              <a:rPr lang="en-US" dirty="0"/>
+              <a:rPr lang="en-US" sz="1800" kern="100" dirty="0">
+                <a:effectLst/>
+                <a:latin typeface="Calibri" panose="020F0502020204030204" pitchFamily="34" charset="0"/>
+                <a:ea typeface="맑은 고딕" panose="020B0503020000020004" pitchFamily="34" charset="-127"/>
+                <a:cs typeface="Calibri" panose="020F0502020204030204" pitchFamily="34" charset="0"/>
+              </a:rPr>
               <a:t> of machine learning models, if a valid system can be maintained and developed while maintaining clear data provenance, the development of a better automated learning system will not be far away.</a:t>
             </a:r>
+            <a:endParaRPr lang="en-US" sz="1800" kern="100" dirty="0">
+              <a:effectLst/>
+              <a:latin typeface="Calibri" panose="020F0502020204030204" pitchFamily="34" charset="0"/>
+              <a:ea typeface="맑은 고딕" panose="020B0503020000020004" pitchFamily="34" charset="-127"/>
+              <a:cs typeface="Times New Roman" panose="02020603050405020304" pitchFamily="18" charset="0"/>
+            </a:endParaRPr>
           </a:p>
         </p:txBody>
       </p:sp>
@@ -2592,18 +3479,24 @@
           <a:bodyPr/>
           <a:lstStyle/>
           <a:p>
-            <a:br>
-              <a:rPr lang="en-US" dirty="0"/>
-            </a:br>
-            <a:r>
-              <a:rPr lang="en-US" b="0" i="0" dirty="0">
+            <a:r>
+              <a:rPr lang="en-US" sz="1800" dirty="0">
+                <a:effectLst/>
+                <a:latin typeface="Calibri" panose="020F0502020204030204" pitchFamily="34" charset="0"/>
+                <a:ea typeface="맑은 고딕" panose="020B0503020000020004" pitchFamily="34" charset="-127"/>
+              </a:rPr>
+              <a:t>[Slide 27] Thank you for your attention. We hope you found this overview </a:t>
+            </a:r>
+            <a:r>
+              <a:rPr lang="en-US" sz="1800" dirty="0">
                 <a:solidFill>
-                  <a:srgbClr val="E8EAED"/>
+                  <a:srgbClr val="000000"/>
                 </a:solidFill>
                 <a:effectLst/>
-                <a:latin typeface="Apple SD Gothic Neo"/>
-              </a:rPr>
-              <a:t>Thank you for listening to our presentation so far. Well then, I hope you have a nice day.</a:t>
+                <a:latin typeface="Calibri" panose="020F0502020204030204" pitchFamily="34" charset="0"/>
+                <a:ea typeface="맑은 고딕" panose="020B0503020000020004" pitchFamily="34" charset="-127"/>
+              </a:rPr>
+              <a:t>useful.</a:t>
             </a:r>
             <a:endParaRPr lang="en-US" dirty="0"/>
           </a:p>
@@ -2689,10 +3582,92 @@
           <a:bodyPr/>
           <a:lstStyle/>
           <a:p>
-            <a:r>
-              <a:rPr lang="en-US" dirty="0"/>
-              <a:t>Before start off, let's talk about the concept 'Data Provenance’. Through the class, we learned that Data Provenance is a Metadata describing the origin and creation process of data. However, here we would like to explain Data Provenance as more straightforward through a slightly modified example from the example included in the paper we reviewed.</a:t>
-            </a:r>
+            <a:pPr>
+              <a:lnSpc>
+                <a:spcPct val="107000"/>
+              </a:lnSpc>
+              <a:spcAft>
+                <a:spcPts val="800"/>
+              </a:spcAft>
+            </a:pPr>
+            <a:r>
+              <a:rPr lang="en-US" sz="1800" kern="100" dirty="0">
+                <a:effectLst/>
+                <a:latin typeface="Calibri" panose="020F0502020204030204" pitchFamily="34" charset="0"/>
+                <a:ea typeface="맑은 고딕" panose="020B0503020000020004" pitchFamily="34" charset="-127"/>
+                <a:cs typeface="Calibri" panose="020F0502020204030204" pitchFamily="34" charset="0"/>
+              </a:rPr>
+              <a:t>[Slide 3] Before starting, let us talk about the concept 'Data Provenance’. Through the class, we learned that Data Provenance is a metadata </a:t>
+            </a:r>
+            <a:r>
+              <a:rPr lang="en-US" sz="1800" kern="100" dirty="0">
+                <a:solidFill>
+                  <a:srgbClr val="000000"/>
+                </a:solidFill>
+                <a:effectLst/>
+                <a:latin typeface="Calibri" panose="020F0502020204030204" pitchFamily="34" charset="0"/>
+                <a:ea typeface="맑은 고딕" panose="020B0503020000020004" pitchFamily="34" charset="-127"/>
+                <a:cs typeface="Calibri" panose="020F0502020204030204" pitchFamily="34" charset="0"/>
+              </a:rPr>
+              <a:t>that describes</a:t>
+            </a:r>
+            <a:r>
+              <a:rPr lang="en-US" sz="1800" kern="100" dirty="0">
+                <a:effectLst/>
+                <a:latin typeface="Calibri" panose="020F0502020204030204" pitchFamily="34" charset="0"/>
+                <a:ea typeface="맑은 고딕" panose="020B0503020000020004" pitchFamily="34" charset="-127"/>
+                <a:cs typeface="Calibri" panose="020F0502020204030204" pitchFamily="34" charset="0"/>
+              </a:rPr>
+              <a:t> </a:t>
+            </a:r>
+            <a:r>
+              <a:rPr lang="en-US" sz="1800" kern="100" dirty="0">
+                <a:solidFill>
+                  <a:srgbClr val="000000"/>
+                </a:solidFill>
+                <a:effectLst/>
+                <a:latin typeface="Calibri" panose="020F0502020204030204" pitchFamily="34" charset="0"/>
+                <a:ea typeface="맑은 고딕" panose="020B0503020000020004" pitchFamily="34" charset="-127"/>
+                <a:cs typeface="Calibri" panose="020F0502020204030204" pitchFamily="34" charset="0"/>
+              </a:rPr>
+              <a:t>the data</a:t>
+            </a:r>
+            <a:r>
+              <a:rPr lang="en-US" sz="1800" kern="100" dirty="0">
+                <a:effectLst/>
+                <a:latin typeface="Calibri" panose="020F0502020204030204" pitchFamily="34" charset="0"/>
+                <a:ea typeface="맑은 고딕" panose="020B0503020000020004" pitchFamily="34" charset="-127"/>
+                <a:cs typeface="Calibri" panose="020F0502020204030204" pitchFamily="34" charset="0"/>
+              </a:rPr>
+              <a:t> origin and creation </a:t>
+            </a:r>
+            <a:r>
+              <a:rPr lang="en-US" sz="1800" kern="100" dirty="0">
+                <a:solidFill>
+                  <a:srgbClr val="000000"/>
+                </a:solidFill>
+                <a:effectLst/>
+                <a:latin typeface="Calibri" panose="020F0502020204030204" pitchFamily="34" charset="0"/>
+                <a:ea typeface="맑은 고딕" panose="020B0503020000020004" pitchFamily="34" charset="-127"/>
+                <a:cs typeface="Calibri" panose="020F0502020204030204" pitchFamily="34" charset="0"/>
+              </a:rPr>
+              <a:t>process.</a:t>
+            </a:r>
+            <a:r>
+              <a:rPr lang="en-US" sz="1800" kern="100" dirty="0">
+                <a:effectLst/>
+                <a:latin typeface="Calibri" panose="020F0502020204030204" pitchFamily="34" charset="0"/>
+                <a:ea typeface="맑은 고딕" panose="020B0503020000020004" pitchFamily="34" charset="-127"/>
+                <a:cs typeface="Calibri" panose="020F0502020204030204" pitchFamily="34" charset="0"/>
+              </a:rPr>
+              <a:t> However, here we explain Data Provenance as more straightforward through a slightly modified example from the example included in the paper we reviewed.</a:t>
+            </a:r>
+            <a:endParaRPr lang="en-US" sz="1800" kern="100" dirty="0">
+              <a:effectLst/>
+              <a:latin typeface="Calibri" panose="020F0502020204030204" pitchFamily="34" charset="0"/>
+              <a:ea typeface="맑은 고딕" panose="020B0503020000020004" pitchFamily="34" charset="-127"/>
+              <a:cs typeface="Times New Roman" panose="02020603050405020304" pitchFamily="18" charset="0"/>
+            </a:endParaRPr>
           </a:p>
         </p:txBody>
       </p:sp>
@@ -2776,24 +3751,50 @@
           <a:bodyPr/>
           <a:lstStyle/>
           <a:p>
-            <a:r>
-              <a:rPr lang="en-US" dirty="0"/>
-              <a:t>For example, let's assume that a customer named Jesse visits a bank to apply for a mortgage loan. Let's say the banker, Laura, takes over the relevant documents from her and enters them into the bank's computer system. </a:t>
-            </a:r>
-            <a:r>
-              <a:rPr lang="en-US" b="0" i="0" dirty="0">
+            <a:pPr>
+              <a:lnSpc>
+                <a:spcPct val="107000"/>
+              </a:lnSpc>
+              <a:spcAft>
+                <a:spcPts val="800"/>
+              </a:spcAft>
+            </a:pPr>
+            <a:r>
+              <a:rPr lang="en-US" sz="1800" kern="100" dirty="0">
+                <a:effectLst/>
+                <a:latin typeface="Calibri" panose="020F0502020204030204" pitchFamily="34" charset="0"/>
+                <a:ea typeface="맑은 고딕" panose="020B0503020000020004" pitchFamily="34" charset="-127"/>
+                <a:cs typeface="Calibri" panose="020F0502020204030204" pitchFamily="34" charset="0"/>
+              </a:rPr>
+              <a:t>[Slide 4] Let us assume that a customer named Jesse applies for a </a:t>
+            </a:r>
+            <a:r>
+              <a:rPr lang="en-US" sz="1800" kern="100" dirty="0">
                 <a:solidFill>
-                  <a:srgbClr val="E8EAED"/>
+                  <a:srgbClr val="000000"/>
                 </a:solidFill>
                 <a:effectLst/>
-                <a:latin typeface="Apple SD Gothic Neo"/>
-              </a:rPr>
-              <a:t>The bank operates an automated loan screening system, so Laura only needs to check the screening results based on the information she entered. </a:t>
-            </a:r>
-            <a:r>
-              <a:rPr lang="en-US" dirty="0"/>
-              <a:t>However, unfortunately, according to Laura's screening results, Jesse was found to be ineligible for the loan.</a:t>
-            </a:r>
+                <a:latin typeface="Calibri" panose="020F0502020204030204" pitchFamily="34" charset="0"/>
+                <a:ea typeface="맑은 고딕" panose="020B0503020000020004" pitchFamily="34" charset="-127"/>
+                <a:cs typeface="Calibri" panose="020F0502020204030204" pitchFamily="34" charset="0"/>
+              </a:rPr>
+              <a:t>loan</a:t>
+            </a:r>
+            <a:r>
+              <a:rPr lang="en-US" sz="1800" kern="100" dirty="0">
+                <a:effectLst/>
+                <a:latin typeface="Calibri" panose="020F0502020204030204" pitchFamily="34" charset="0"/>
+                <a:ea typeface="맑은 고딕" panose="020B0503020000020004" pitchFamily="34" charset="-127"/>
+                <a:cs typeface="Calibri" panose="020F0502020204030204" pitchFamily="34" charset="0"/>
+              </a:rPr>
+              <a:t> and the bank uses an automated screening system. However, unfortunately, Jesse is deemed ineligible.</a:t>
+            </a:r>
+            <a:endParaRPr lang="en-US" sz="1800" kern="100" dirty="0">
+              <a:effectLst/>
+              <a:latin typeface="Calibri" panose="020F0502020204030204" pitchFamily="34" charset="0"/>
+              <a:ea typeface="맑은 고딕" panose="020B0503020000020004" pitchFamily="34" charset="-127"/>
+              <a:cs typeface="Times New Roman" panose="02020603050405020304" pitchFamily="18" charset="0"/>
+            </a:endParaRPr>
           </a:p>
         </p:txBody>
       </p:sp>
@@ -2877,10 +3878,50 @@
           <a:bodyPr/>
           <a:lstStyle/>
           <a:p>
-            <a:r>
-              <a:rPr lang="en-US" dirty="0"/>
-              <a:t>Here, depending on the specific system the bank operates, you can think about how Laura would report the results. For example, Laura could explain that Jessie was rejected because she had features that put her in a group that did not allow her to apply for a mortgage loan. In another case, Jessie was rejected because she does not have the group's features to be approved, and Laura might reply that she could be approved for mortgage loan if she achieved those features. </a:t>
-            </a:r>
+            <a:pPr>
+              <a:lnSpc>
+                <a:spcPct val="107000"/>
+              </a:lnSpc>
+              <a:spcAft>
+                <a:spcPts val="800"/>
+              </a:spcAft>
+            </a:pPr>
+            <a:r>
+              <a:rPr lang="en-US" sz="1800" kern="100" dirty="0">
+                <a:effectLst/>
+                <a:latin typeface="Calibri" panose="020F0502020204030204" pitchFamily="34" charset="0"/>
+                <a:ea typeface="맑은 고딕" panose="020B0503020000020004" pitchFamily="34" charset="-127"/>
+                <a:cs typeface="Calibri" panose="020F0502020204030204" pitchFamily="34" charset="0"/>
+              </a:rPr>
+              <a:t>[Slide 5] Here, imagine you are a bank </a:t>
+            </a:r>
+            <a:r>
+              <a:rPr lang="en-US" sz="1800" kern="100" dirty="0">
+                <a:solidFill>
+                  <a:srgbClr val="000000"/>
+                </a:solidFill>
+                <a:effectLst/>
+                <a:latin typeface="Calibri" panose="020F0502020204030204" pitchFamily="34" charset="0"/>
+                <a:ea typeface="맑은 고딕" panose="020B0503020000020004" pitchFamily="34" charset="-127"/>
+                <a:cs typeface="Calibri" panose="020F0502020204030204" pitchFamily="34" charset="0"/>
+              </a:rPr>
+              <a:t>clerk.</a:t>
+            </a:r>
+            <a:r>
+              <a:rPr lang="en-US" sz="1800" kern="100" dirty="0">
+                <a:effectLst/>
+                <a:latin typeface="Calibri" panose="020F0502020204030204" pitchFamily="34" charset="0"/>
+                <a:ea typeface="맑은 고딕" panose="020B0503020000020004" pitchFamily="34" charset="-127"/>
+                <a:cs typeface="Calibri" panose="020F0502020204030204" pitchFamily="34" charset="0"/>
+              </a:rPr>
+              <a:t> You can either reply that all of Jesse's features were rejected because they belong to the rejected group, or you can advise that he was rejected because he lacked certain features and that those features need to be updated.</a:t>
+            </a:r>
+            <a:endParaRPr lang="en-US" sz="1800" kern="100" dirty="0">
+              <a:effectLst/>
+              <a:latin typeface="Calibri" panose="020F0502020204030204" pitchFamily="34" charset="0"/>
+              <a:ea typeface="맑은 고딕" panose="020B0503020000020004" pitchFamily="34" charset="-127"/>
+              <a:cs typeface="Times New Roman" panose="02020603050405020304" pitchFamily="18" charset="0"/>
+            </a:endParaRPr>
           </a:p>
         </p:txBody>
       </p:sp>
@@ -2964,31 +4005,50 @@
           <a:bodyPr/>
           <a:lstStyle/>
           <a:p>
-            <a:r>
-              <a:rPr lang="en-US" b="0" i="0" dirty="0">
+            <a:pPr>
+              <a:lnSpc>
+                <a:spcPct val="107000"/>
+              </a:lnSpc>
+              <a:spcAft>
+                <a:spcPts val="800"/>
+              </a:spcAft>
+            </a:pPr>
+            <a:r>
+              <a:rPr lang="en-US" sz="1800" kern="100" dirty="0">
+                <a:effectLst/>
+                <a:latin typeface="Calibri" panose="020F0502020204030204" pitchFamily="34" charset="0"/>
+                <a:ea typeface="맑은 고딕" panose="020B0503020000020004" pitchFamily="34" charset="-127"/>
+                <a:cs typeface="Calibri" panose="020F0502020204030204" pitchFamily="34" charset="0"/>
+              </a:rPr>
+              <a:t>[Slide 6] However, in any </a:t>
+            </a:r>
+            <a:r>
+              <a:rPr lang="en-US" sz="1800" kern="100" dirty="0">
                 <a:solidFill>
-                  <a:srgbClr val="E8EAED"/>
+                  <a:srgbClr val="000000"/>
                 </a:solidFill>
                 <a:effectLst/>
-                <a:latin typeface="Apple SD Gothic Neo"/>
-              </a:rPr>
-              <a:t> However, in any case, Laura or the bank must be able to explain that the loan reviews in our system were conducted in a reasonable and fair manner. For example, in the first case, the customer's interest is in getting approved for a mortgage loan, so the reason for the rejection may not be very important. On the other hand, in the second case, Jesse can question the system because her friend Paul had the same features as her and was approved for a mortgage loan. </a:t>
-            </a:r>
-            <a:r>
-              <a:rPr lang="en-US" dirty="0"/>
-              <a:t>The bank's customers, including Jesse, are not interested in how overly complex or limited-access electronic screening systems work. We are only interested in ensuring that the system operates in a reasonable and fair manner. Non-IT employees, including banker Laura, are also not interested in the system's algorithms; they only want to know on what basis the system works. </a:t>
-            </a:r>
-            <a:r>
-              <a:rPr lang="en-US" b="0" i="0" dirty="0">
-                <a:solidFill>
-                  <a:srgbClr val="E8EAED"/>
-                </a:solidFill>
+                <a:latin typeface="Calibri" panose="020F0502020204030204" pitchFamily="34" charset="0"/>
+                <a:ea typeface="맑은 고딕" panose="020B0503020000020004" pitchFamily="34" charset="-127"/>
+                <a:cs typeface="Calibri" panose="020F0502020204030204" pitchFamily="34" charset="0"/>
+              </a:rPr>
+              <a:t>case, the</a:t>
+            </a:r>
+            <a:r>
+              <a:rPr lang="en-US" sz="1800" kern="100" dirty="0">
                 <a:effectLst/>
-                <a:latin typeface="Apple SD Gothic Neo"/>
-              </a:rPr>
-              <a:t>This is because the system is already so complex and processing so much data that individuals cannot control it.</a:t>
-            </a:r>
-            <a:endParaRPr lang="en-US" dirty="0"/>
+                <a:latin typeface="Calibri" panose="020F0502020204030204" pitchFamily="34" charset="0"/>
+                <a:ea typeface="맑은 고딕" panose="020B0503020000020004" pitchFamily="34" charset="-127"/>
+                <a:cs typeface="Calibri" panose="020F0502020204030204" pitchFamily="34" charset="0"/>
+              </a:rPr>
+              <a:t> bank's explanation system must be reasonable and fair, regardless of its complexity. Note that the bank's customers, including Jesse, are only interested in being evaluated for reasonable and fair reasons and are not interested in system detail. Therefore, we need to at least clarify where the basis and source of the data are.</a:t>
+            </a:r>
+            <a:endParaRPr lang="en-US" sz="1800" kern="100" dirty="0">
+              <a:effectLst/>
+              <a:latin typeface="Calibri" panose="020F0502020204030204" pitchFamily="34" charset="0"/>
+              <a:ea typeface="맑은 고딕" panose="020B0503020000020004" pitchFamily="34" charset="-127"/>
+              <a:cs typeface="Times New Roman" panose="02020603050405020304" pitchFamily="18" charset="0"/>
+            </a:endParaRPr>
           </a:p>
         </p:txBody>
       </p:sp>
@@ -3072,16 +4132,29 @@
           <a:bodyPr/>
           <a:lstStyle/>
           <a:p>
-            <a:r>
-              <a:rPr lang="en-US" dirty="0"/>
-              <a:t>Let us recall once again the definition of data provenance mentioned earlier. When considered in relation to the case, we can now guess that a rational algorithm is needed that encompasses the origins and application logic of a system that applies complex machine learning, such as a loan screening system. With this goal in mind, the authors of the paper we reviewed developed a more efficient and at the same time persuasive algorithm and introduced it in the paper.</a:t>
-            </a:r>
-          </a:p>
-          <a:p>
-            <a:r>
-              <a:rPr lang="en-US" dirty="0"/>
-              <a:t>In summary, this paper is a method of mixing rule-based explanations and counterfactual explanations in a way that can improve the efficiency of the rule-based explanation system while overcoming the incompleteness of the counterfactual explanation system under the premise that the duality theorem is established. We are introducing a new algorithm.</a:t>
-            </a:r>
+            <a:pPr>
+              <a:lnSpc>
+                <a:spcPct val="107000"/>
+              </a:lnSpc>
+              <a:spcAft>
+                <a:spcPts val="800"/>
+              </a:spcAft>
+            </a:pPr>
+            <a:r>
+              <a:rPr lang="en-US" sz="1800" kern="100" dirty="0">
+                <a:effectLst/>
+                <a:latin typeface="Calibri" panose="020F0502020204030204" pitchFamily="34" charset="0"/>
+                <a:ea typeface="맑은 고딕" panose="020B0503020000020004" pitchFamily="34" charset="-127"/>
+                <a:cs typeface="Calibri" panose="020F0502020204030204" pitchFamily="34" charset="0"/>
+              </a:rPr>
+              <a:t>[Slide 7] Let us recall once again the definition of data provenance mentioned earlier. Connecting it with the previous example, we can conclude that data provenance requires a reasonable algorithm for a system such as loan screening that encompasses provenance and application logic. With this goal in mind, the authors of the articles we reviewed introduced algorithms for more efficient and persuasive explanation systems.</a:t>
+            </a:r>
+            <a:endParaRPr lang="en-US" sz="1800" kern="100" dirty="0">
+              <a:effectLst/>
+              <a:latin typeface="Calibri" panose="020F0502020204030204" pitchFamily="34" charset="0"/>
+              <a:ea typeface="맑은 고딕" panose="020B0503020000020004" pitchFamily="34" charset="-127"/>
+              <a:cs typeface="Times New Roman" panose="02020603050405020304" pitchFamily="18" charset="0"/>
+            </a:endParaRPr>
           </a:p>
         </p:txBody>
       </p:sp>
@@ -3165,21 +4238,92 @@
           <a:bodyPr/>
           <a:lstStyle/>
           <a:p>
-            <a:r>
-              <a:rPr lang="en-US" dirty="0"/>
-              <a:t>We found that there were several concepts in the paper that were relatively unfamiliar or needed to be clarified in the development of the paper. Representative examples include duality theorem, Rule-Based Explanation, and Counterfactual explanation. </a:t>
-            </a:r>
-            <a:r>
-              <a:rPr lang="en-US" b="0" i="0" dirty="0">
+            <a:pPr>
+              <a:lnSpc>
+                <a:spcPct val="107000"/>
+              </a:lnSpc>
+              <a:spcAft>
+                <a:spcPts val="800"/>
+              </a:spcAft>
+            </a:pPr>
+            <a:r>
+              <a:rPr lang="en-US" sz="1800" kern="100" dirty="0">
+                <a:effectLst/>
+                <a:latin typeface="Calibri" panose="020F0502020204030204" pitchFamily="34" charset="0"/>
+                <a:ea typeface="맑은 고딕" panose="020B0503020000020004" pitchFamily="34" charset="-127"/>
+                <a:cs typeface="Calibri" panose="020F0502020204030204" pitchFamily="34" charset="0"/>
+              </a:rPr>
+              <a:t>[Slide 8] Now, let us talk about some terminology involved. We will briefly </a:t>
+            </a:r>
+            <a:r>
+              <a:rPr lang="en-US" sz="1800" kern="100" dirty="0">
                 <a:solidFill>
-                  <a:srgbClr val="E8EAED"/>
+                  <a:srgbClr val="000000"/>
                 </a:solidFill>
                 <a:effectLst/>
-                <a:latin typeface="Apple SD Gothic Neo"/>
-              </a:rPr>
-              <a:t>Before proceeding with the explanation of the algorithm, we will briefly explain these concepts.</a:t>
-            </a:r>
-            <a:endParaRPr lang="en-US" dirty="0"/>
+                <a:latin typeface="Calibri" panose="020F0502020204030204" pitchFamily="34" charset="0"/>
+                <a:ea typeface="맑은 고딕" panose="020B0503020000020004" pitchFamily="34" charset="-127"/>
+                <a:cs typeface="Calibri" panose="020F0502020204030204" pitchFamily="34" charset="0"/>
+              </a:rPr>
+              <a:t>explain the</a:t>
+            </a:r>
+            <a:r>
+              <a:rPr lang="en-US" sz="1800" kern="100" dirty="0">
+                <a:effectLst/>
+                <a:latin typeface="Calibri" panose="020F0502020204030204" pitchFamily="34" charset="0"/>
+                <a:ea typeface="맑은 고딕" panose="020B0503020000020004" pitchFamily="34" charset="-127"/>
+                <a:cs typeface="Calibri" panose="020F0502020204030204" pitchFamily="34" charset="0"/>
+              </a:rPr>
+              <a:t> key terms 'rule-based </a:t>
+            </a:r>
+            <a:r>
+              <a:rPr lang="en-US" sz="1800" kern="100" dirty="0">
+                <a:solidFill>
+                  <a:srgbClr val="000000"/>
+                </a:solidFill>
+                <a:effectLst/>
+                <a:latin typeface="Calibri" panose="020F0502020204030204" pitchFamily="34" charset="0"/>
+                <a:ea typeface="맑은 고딕" panose="020B0503020000020004" pitchFamily="34" charset="-127"/>
+                <a:cs typeface="Calibri" panose="020F0502020204030204" pitchFamily="34" charset="0"/>
+              </a:rPr>
+              <a:t>explanation',</a:t>
+            </a:r>
+            <a:r>
+              <a:rPr lang="en-US" sz="1800" kern="100" dirty="0">
+                <a:effectLst/>
+                <a:latin typeface="Calibri" panose="020F0502020204030204" pitchFamily="34" charset="0"/>
+                <a:ea typeface="맑은 고딕" panose="020B0503020000020004" pitchFamily="34" charset="-127"/>
+                <a:cs typeface="Calibri" panose="020F0502020204030204" pitchFamily="34" charset="0"/>
+              </a:rPr>
+              <a:t> 'counterfactual </a:t>
+            </a:r>
+            <a:r>
+              <a:rPr lang="en-US" sz="1800" kern="100" dirty="0">
+                <a:solidFill>
+                  <a:srgbClr val="000000"/>
+                </a:solidFill>
+                <a:effectLst/>
+                <a:latin typeface="Calibri" panose="020F0502020204030204" pitchFamily="34" charset="0"/>
+                <a:ea typeface="맑은 고딕" panose="020B0503020000020004" pitchFamily="34" charset="-127"/>
+                <a:cs typeface="Calibri" panose="020F0502020204030204" pitchFamily="34" charset="0"/>
+              </a:rPr>
+              <a:t>explanation'</a:t>
+            </a:r>
+            <a:r>
+              <a:rPr lang="en-US" sz="1800" kern="100" dirty="0">
+                <a:effectLst/>
+                <a:latin typeface="Calibri" panose="020F0502020204030204" pitchFamily="34" charset="0"/>
+                <a:ea typeface="맑은 고딕" panose="020B0503020000020004" pitchFamily="34" charset="-127"/>
+                <a:cs typeface="Calibri" panose="020F0502020204030204" pitchFamily="34" charset="0"/>
+              </a:rPr>
+              <a:t> and 'duality’.</a:t>
+            </a:r>
+            <a:endParaRPr lang="en-US" sz="1800" kern="100" dirty="0">
+              <a:effectLst/>
+              <a:latin typeface="Calibri" panose="020F0502020204030204" pitchFamily="34" charset="0"/>
+              <a:ea typeface="맑은 고딕" panose="020B0503020000020004" pitchFamily="34" charset="-127"/>
+              <a:cs typeface="Times New Roman" panose="02020603050405020304" pitchFamily="18" charset="0"/>
+            </a:endParaRPr>
           </a:p>
         </p:txBody>
       </p:sp>
@@ -3263,17 +4407,62 @@
           <a:bodyPr/>
           <a:lstStyle/>
           <a:p>
-            <a:r>
-              <a:rPr lang="en-US" b="0" i="0" dirty="0">
+            <a:pPr>
+              <a:lnSpc>
+                <a:spcPct val="107000"/>
+              </a:lnSpc>
+              <a:spcAft>
+                <a:spcPts val="800"/>
+              </a:spcAft>
+            </a:pPr>
+            <a:r>
+              <a:rPr lang="en-US" sz="1800" kern="100" dirty="0">
+                <a:effectLst/>
+                <a:latin typeface="Calibri" panose="020F0502020204030204" pitchFamily="34" charset="0"/>
+                <a:ea typeface="맑은 고딕" panose="020B0503020000020004" pitchFamily="34" charset="-127"/>
+                <a:cs typeface="Calibri" panose="020F0502020204030204" pitchFamily="34" charset="0"/>
+              </a:rPr>
+              <a:t>[Slide 9] Before we begin the explanation, </a:t>
+            </a:r>
+            <a:r>
+              <a:rPr lang="en-US" sz="1800" kern="100" dirty="0">
                 <a:solidFill>
-                  <a:srgbClr val="E8EAED"/>
+                  <a:srgbClr val="000000"/>
                 </a:solidFill>
                 <a:effectLst/>
-                <a:latin typeface="Apple SD Gothic Neo"/>
-              </a:rPr>
-              <a:t>Before we begin the explanation, let's recall the example we looked at in the last step. We have seen that a bank can have two types of explanation systems.</a:t>
-            </a:r>
-            <a:endParaRPr lang="en-US" dirty="0"/>
+                <a:latin typeface="Calibri" panose="020F0502020204030204" pitchFamily="34" charset="0"/>
+                <a:ea typeface="맑은 고딕" panose="020B0503020000020004" pitchFamily="34" charset="-127"/>
+                <a:cs typeface="Calibri" panose="020F0502020204030204" pitchFamily="34" charset="0"/>
+              </a:rPr>
+              <a:t>let us</a:t>
+            </a:r>
+            <a:r>
+              <a:rPr lang="en-US" sz="1800" kern="100" dirty="0">
+                <a:effectLst/>
+                <a:latin typeface="Calibri" panose="020F0502020204030204" pitchFamily="34" charset="0"/>
+                <a:ea typeface="맑은 고딕" panose="020B0503020000020004" pitchFamily="34" charset="-127"/>
+                <a:cs typeface="Calibri" panose="020F0502020204030204" pitchFamily="34" charset="0"/>
+              </a:rPr>
+              <a:t> recall the example we looked at in the last step. We have seen that a bank can have two types of explanation </a:t>
+            </a:r>
+            <a:r>
+              <a:rPr lang="en-US" sz="1800" kern="100" dirty="0">
+                <a:solidFill>
+                  <a:srgbClr val="000000"/>
+                </a:solidFill>
+                <a:effectLst/>
+                <a:latin typeface="Calibri" panose="020F0502020204030204" pitchFamily="34" charset="0"/>
+                <a:ea typeface="맑은 고딕" panose="020B0503020000020004" pitchFamily="34" charset="-127"/>
+                <a:cs typeface="Calibri" panose="020F0502020204030204" pitchFamily="34" charset="0"/>
+              </a:rPr>
+              <a:t>system.</a:t>
+            </a:r>
+            <a:endParaRPr lang="en-US" sz="1800" kern="100" dirty="0">
+              <a:effectLst/>
+              <a:latin typeface="Calibri" panose="020F0502020204030204" pitchFamily="34" charset="0"/>
+              <a:ea typeface="맑은 고딕" panose="020B0503020000020004" pitchFamily="34" charset="-127"/>
+              <a:cs typeface="Times New Roman" panose="02020603050405020304" pitchFamily="18" charset="0"/>
+            </a:endParaRPr>
           </a:p>
         </p:txBody>
       </p:sp>
@@ -3635,7 +4824,7 @@
             <a:fld id="{8256C2ED-54A4-480D-B5C8-65C0D62359B9}" type="datetime2">
               <a:rPr lang="en-US" smtClean="0"/>
               <a:pPr/>
-              <a:t>Monday, November 27, 2023</a:t>
+              <a:t>Thursday, November 30, 2023</a:t>
             </a:fld>
             <a:endParaRPr lang="en-US" dirty="0"/>
           </a:p>
@@ -3794,7 +4983,7 @@
           <a:p>
             <a:fld id="{53CF612A-4CB0-4F57-9A87-F049CECB184D}" type="datetime2">
               <a:rPr lang="en-US" smtClean="0"/>
-              <a:t>Monday, November 27, 2023</a:t>
+              <a:t>Thursday, November 30, 2023</a:t>
             </a:fld>
             <a:endParaRPr lang="en-US"/>
           </a:p>
@@ -4015,7 +5204,7 @@
           <a:p>
             <a:fld id="{8F397F40-C8F7-4897-A6B8-241042F913A9}" type="datetime2">
               <a:rPr lang="en-US" smtClean="0"/>
-              <a:t>Monday, November 27, 2023</a:t>
+              <a:t>Thursday, November 30, 2023</a:t>
             </a:fld>
             <a:endParaRPr lang="en-US"/>
           </a:p>
@@ -4338,7 +5527,7 @@
             <a:fld id="{8256C2ED-54A4-480D-B5C8-65C0D62359B9}" type="datetime2">
               <a:rPr lang="en-US" smtClean="0"/>
               <a:pPr/>
-              <a:t>Monday, November 27, 2023</a:t>
+              <a:t>Thursday, November 30, 2023</a:t>
             </a:fld>
             <a:endParaRPr lang="en-US" dirty="0"/>
           </a:p>
@@ -4573,7 +5762,7 @@
           <a:p>
             <a:fld id="{10EDCA73-0A86-4195-A787-75037827079D}" type="datetime2">
               <a:rPr lang="en-US" smtClean="0"/>
-              <a:t>Monday, November 27, 2023</a:t>
+              <a:t>Thursday, November 30, 2023</a:t>
             </a:fld>
             <a:endParaRPr lang="en-US"/>
           </a:p>
@@ -4924,7 +6113,7 @@
           <a:p>
             <a:fld id="{83C75374-B296-498E-A935-80631EA9020D}" type="datetime2">
               <a:rPr lang="en-US" smtClean="0"/>
-              <a:t>Monday, November 27, 2023</a:t>
+              <a:t>Thursday, November 30, 2023</a:t>
             </a:fld>
             <a:endParaRPr lang="en-US"/>
           </a:p>
@@ -5364,7 +6553,7 @@
           <a:p>
             <a:fld id="{B098B728-214A-4ABC-8432-5B3A5A66A987}" type="datetime2">
               <a:rPr lang="en-US" smtClean="0"/>
-              <a:t>Monday, November 27, 2023</a:t>
+              <a:t>Thursday, November 30, 2023</a:t>
             </a:fld>
             <a:endParaRPr lang="en-US" dirty="0"/>
           </a:p>
@@ -5522,7 +6711,7 @@
           <a:p>
             <a:fld id="{015F02D0-6806-43AF-9888-2359BF40C204}" type="datetime2">
               <a:rPr lang="en-US" smtClean="0"/>
-              <a:t>Monday, November 27, 2023</a:t>
+              <a:t>Thursday, November 30, 2023</a:t>
             </a:fld>
             <a:endParaRPr lang="en-US"/>
           </a:p>
@@ -5646,7 +6835,7 @@
           <a:p>
             <a:fld id="{8EE14D2D-B1AF-4197-82D6-FC1F8BD05681}" type="datetime2">
               <a:rPr lang="en-US" smtClean="0"/>
-              <a:t>Monday, November 27, 2023</a:t>
+              <a:t>Thursday, November 30, 2023</a:t>
             </a:fld>
             <a:endParaRPr lang="en-US"/>
           </a:p>
@@ -5974,7 +7163,7 @@
           <a:p>
             <a:fld id="{98771CEB-9838-4245-91B8-EFBAFE2D8B44}" type="datetime2">
               <a:rPr lang="en-US" smtClean="0"/>
-              <a:t>Monday, November 27, 2023</a:t>
+              <a:t>Thursday, November 30, 2023</a:t>
             </a:fld>
             <a:endParaRPr lang="en-US"/>
           </a:p>
@@ -6282,7 +7471,7 @@
           <a:p>
             <a:fld id="{51D3F6BF-A585-41F8-88DF-7E5D069F892A}" type="datetime2">
               <a:rPr lang="en-US" smtClean="0"/>
-              <a:t>Monday, November 27, 2023</a:t>
+              <a:t>Thursday, November 30, 2023</a:t>
             </a:fld>
             <a:endParaRPr lang="en-US"/>
           </a:p>
@@ -6625,7 +7814,7 @@
             <a:fld id="{8256C2ED-54A4-480D-B5C8-65C0D62359B9}" type="datetime2">
               <a:rPr lang="en-US" smtClean="0"/>
               <a:pPr/>
-              <a:t>Monday, November 27, 2023</a:t>
+              <a:t>Thursday, November 30, 2023</a:t>
             </a:fld>
             <a:endParaRPr lang="en-US" dirty="0"/>
           </a:p>
@@ -32753,98 +33942,6 @@
   <p:clrMapOvr>
     <a:masterClrMapping/>
   </p:clrMapOvr>
-  <p:timing>
-    <p:tnLst>
-      <p:par>
-        <p:cTn id="1" dur="indefinite" restart="never" nodeType="tmRoot">
-          <p:childTnLst>
-            <p:seq concurrent="1" nextAc="seek">
-              <p:cTn id="2" dur="indefinite" nodeType="mainSeq">
-                <p:childTnLst>
-                  <p:par>
-                    <p:cTn id="3" fill="hold">
-                      <p:stCondLst>
-                        <p:cond delay="indefinite"/>
-                        <p:cond evt="onBegin" delay="0">
-                          <p:tn val="2"/>
-                        </p:cond>
-                      </p:stCondLst>
-                      <p:childTnLst>
-                        <p:par>
-                          <p:cTn id="4" fill="hold">
-                            <p:stCondLst>
-                              <p:cond delay="0"/>
-                            </p:stCondLst>
-                            <p:childTnLst>
-                              <p:par>
-                                <p:cTn id="5" presetID="10" presetClass="entr" presetSubtype="0" fill="hold" grpId="0" nodeType="withEffect">
-                                  <p:stCondLst>
-                                    <p:cond delay="1000"/>
-                                  </p:stCondLst>
-                                  <p:iterate>
-                                    <p:tmPct val="10000"/>
-                                  </p:iterate>
-                                  <p:childTnLst>
-                                    <p:set>
-                                      <p:cBhvr>
-                                        <p:cTn id="6" dur="1" fill="hold">
-                                          <p:stCondLst>
-                                            <p:cond delay="0"/>
-                                          </p:stCondLst>
-                                        </p:cTn>
-                                        <p:tgtEl>
-                                          <p:spTgt spid="2"/>
-                                        </p:tgtEl>
-                                        <p:attrNameLst>
-                                          <p:attrName>style.visibility</p:attrName>
-                                        </p:attrNameLst>
-                                      </p:cBhvr>
-                                      <p:to>
-                                        <p:strVal val="visible"/>
-                                      </p:to>
-                                    </p:set>
-                                    <p:animEffect transition="in" filter="fade">
-                                      <p:cBhvr>
-                                        <p:cTn id="7" dur="700"/>
-                                        <p:tgtEl>
-                                          <p:spTgt spid="2"/>
-                                        </p:tgtEl>
-                                      </p:cBhvr>
-                                    </p:animEffect>
-                                  </p:childTnLst>
-                                </p:cTn>
-                              </p:par>
-                            </p:childTnLst>
-                          </p:cTn>
-                        </p:par>
-                      </p:childTnLst>
-                    </p:cTn>
-                  </p:par>
-                </p:childTnLst>
-              </p:cTn>
-              <p:prevCondLst>
-                <p:cond evt="onPrev" delay="0">
-                  <p:tgtEl>
-                    <p:sldTgt/>
-                  </p:tgtEl>
-                </p:cond>
-              </p:prevCondLst>
-              <p:nextCondLst>
-                <p:cond evt="onNext" delay="0">
-                  <p:tgtEl>
-                    <p:sldTgt/>
-                  </p:tgtEl>
-                </p:cond>
-              </p:nextCondLst>
-            </p:seq>
-          </p:childTnLst>
-        </p:cTn>
-      </p:par>
-    </p:tnLst>
-    <p:bldLst>
-      <p:bldP spid="2" grpId="0"/>
-    </p:bldLst>
-  </p:timing>
 </p:sld>
 </file>
 
@@ -34708,98 +35805,6 @@
   <p:clrMapOvr>
     <a:masterClrMapping/>
   </p:clrMapOvr>
-  <p:timing>
-    <p:tnLst>
-      <p:par>
-        <p:cTn id="1" dur="indefinite" restart="never" nodeType="tmRoot">
-          <p:childTnLst>
-            <p:seq concurrent="1" nextAc="seek">
-              <p:cTn id="2" dur="indefinite" nodeType="mainSeq">
-                <p:childTnLst>
-                  <p:par>
-                    <p:cTn id="3" fill="hold">
-                      <p:stCondLst>
-                        <p:cond delay="indefinite"/>
-                        <p:cond evt="onBegin" delay="0">
-                          <p:tn val="2"/>
-                        </p:cond>
-                      </p:stCondLst>
-                      <p:childTnLst>
-                        <p:par>
-                          <p:cTn id="4" fill="hold">
-                            <p:stCondLst>
-                              <p:cond delay="0"/>
-                            </p:stCondLst>
-                            <p:childTnLst>
-                              <p:par>
-                                <p:cTn id="5" presetID="10" presetClass="entr" presetSubtype="0" fill="hold" grpId="0" nodeType="withEffect">
-                                  <p:stCondLst>
-                                    <p:cond delay="1000"/>
-                                  </p:stCondLst>
-                                  <p:iterate>
-                                    <p:tmPct val="10000"/>
-                                  </p:iterate>
-                                  <p:childTnLst>
-                                    <p:set>
-                                      <p:cBhvr>
-                                        <p:cTn id="6" dur="1" fill="hold">
-                                          <p:stCondLst>
-                                            <p:cond delay="0"/>
-                                          </p:stCondLst>
-                                        </p:cTn>
-                                        <p:tgtEl>
-                                          <p:spTgt spid="2"/>
-                                        </p:tgtEl>
-                                        <p:attrNameLst>
-                                          <p:attrName>style.visibility</p:attrName>
-                                        </p:attrNameLst>
-                                      </p:cBhvr>
-                                      <p:to>
-                                        <p:strVal val="visible"/>
-                                      </p:to>
-                                    </p:set>
-                                    <p:animEffect transition="in" filter="fade">
-                                      <p:cBhvr>
-                                        <p:cTn id="7" dur="700"/>
-                                        <p:tgtEl>
-                                          <p:spTgt spid="2"/>
-                                        </p:tgtEl>
-                                      </p:cBhvr>
-                                    </p:animEffect>
-                                  </p:childTnLst>
-                                </p:cTn>
-                              </p:par>
-                            </p:childTnLst>
-                          </p:cTn>
-                        </p:par>
-                      </p:childTnLst>
-                    </p:cTn>
-                  </p:par>
-                </p:childTnLst>
-              </p:cTn>
-              <p:prevCondLst>
-                <p:cond evt="onPrev" delay="0">
-                  <p:tgtEl>
-                    <p:sldTgt/>
-                  </p:tgtEl>
-                </p:cond>
-              </p:prevCondLst>
-              <p:nextCondLst>
-                <p:cond evt="onNext" delay="0">
-                  <p:tgtEl>
-                    <p:sldTgt/>
-                  </p:tgtEl>
-                </p:cond>
-              </p:nextCondLst>
-            </p:seq>
-          </p:childTnLst>
-        </p:cTn>
-      </p:par>
-    </p:tnLst>
-    <p:bldLst>
-      <p:bldP spid="2" grpId="0"/>
-    </p:bldLst>
-  </p:timing>
 </p:sld>
 </file>
 
@@ -36950,98 +37955,6 @@
   <p:clrMapOvr>
     <a:masterClrMapping/>
   </p:clrMapOvr>
-  <p:timing>
-    <p:tnLst>
-      <p:par>
-        <p:cTn id="1" dur="indefinite" restart="never" nodeType="tmRoot">
-          <p:childTnLst>
-            <p:seq concurrent="1" nextAc="seek">
-              <p:cTn id="2" dur="indefinite" nodeType="mainSeq">
-                <p:childTnLst>
-                  <p:par>
-                    <p:cTn id="3" fill="hold">
-                      <p:stCondLst>
-                        <p:cond delay="indefinite"/>
-                        <p:cond evt="onBegin" delay="0">
-                          <p:tn val="2"/>
-                        </p:cond>
-                      </p:stCondLst>
-                      <p:childTnLst>
-                        <p:par>
-                          <p:cTn id="4" fill="hold">
-                            <p:stCondLst>
-                              <p:cond delay="0"/>
-                            </p:stCondLst>
-                            <p:childTnLst>
-                              <p:par>
-                                <p:cTn id="5" presetID="10" presetClass="entr" presetSubtype="0" fill="hold" grpId="0" nodeType="withEffect">
-                                  <p:stCondLst>
-                                    <p:cond delay="1000"/>
-                                  </p:stCondLst>
-                                  <p:iterate>
-                                    <p:tmPct val="10000"/>
-                                  </p:iterate>
-                                  <p:childTnLst>
-                                    <p:set>
-                                      <p:cBhvr>
-                                        <p:cTn id="6" dur="1" fill="hold">
-                                          <p:stCondLst>
-                                            <p:cond delay="0"/>
-                                          </p:stCondLst>
-                                        </p:cTn>
-                                        <p:tgtEl>
-                                          <p:spTgt spid="2"/>
-                                        </p:tgtEl>
-                                        <p:attrNameLst>
-                                          <p:attrName>style.visibility</p:attrName>
-                                        </p:attrNameLst>
-                                      </p:cBhvr>
-                                      <p:to>
-                                        <p:strVal val="visible"/>
-                                      </p:to>
-                                    </p:set>
-                                    <p:animEffect transition="in" filter="fade">
-                                      <p:cBhvr>
-                                        <p:cTn id="7" dur="700"/>
-                                        <p:tgtEl>
-                                          <p:spTgt spid="2"/>
-                                        </p:tgtEl>
-                                      </p:cBhvr>
-                                    </p:animEffect>
-                                  </p:childTnLst>
-                                </p:cTn>
-                              </p:par>
-                            </p:childTnLst>
-                          </p:cTn>
-                        </p:par>
-                      </p:childTnLst>
-                    </p:cTn>
-                  </p:par>
-                </p:childTnLst>
-              </p:cTn>
-              <p:prevCondLst>
-                <p:cond evt="onPrev" delay="0">
-                  <p:tgtEl>
-                    <p:sldTgt/>
-                  </p:tgtEl>
-                </p:cond>
-              </p:prevCondLst>
-              <p:nextCondLst>
-                <p:cond evt="onNext" delay="0">
-                  <p:tgtEl>
-                    <p:sldTgt/>
-                  </p:tgtEl>
-                </p:cond>
-              </p:nextCondLst>
-            </p:seq>
-          </p:childTnLst>
-        </p:cTn>
-      </p:par>
-    </p:tnLst>
-    <p:bldLst>
-      <p:bldP spid="2" grpId="0"/>
-    </p:bldLst>
-  </p:timing>
 </p:sld>
 </file>
 
@@ -39307,98 +40220,6 @@
   <p:clrMapOvr>
     <a:masterClrMapping/>
   </p:clrMapOvr>
-  <p:timing>
-    <p:tnLst>
-      <p:par>
-        <p:cTn id="1" dur="indefinite" restart="never" nodeType="tmRoot">
-          <p:childTnLst>
-            <p:seq concurrent="1" nextAc="seek">
-              <p:cTn id="2" dur="indefinite" nodeType="mainSeq">
-                <p:childTnLst>
-                  <p:par>
-                    <p:cTn id="3" fill="hold">
-                      <p:stCondLst>
-                        <p:cond delay="indefinite"/>
-                        <p:cond evt="onBegin" delay="0">
-                          <p:tn val="2"/>
-                        </p:cond>
-                      </p:stCondLst>
-                      <p:childTnLst>
-                        <p:par>
-                          <p:cTn id="4" fill="hold">
-                            <p:stCondLst>
-                              <p:cond delay="0"/>
-                            </p:stCondLst>
-                            <p:childTnLst>
-                              <p:par>
-                                <p:cTn id="5" presetID="10" presetClass="entr" presetSubtype="0" fill="hold" grpId="0" nodeType="withEffect">
-                                  <p:stCondLst>
-                                    <p:cond delay="1000"/>
-                                  </p:stCondLst>
-                                  <p:iterate type="lt">
-                                    <p:tmPct val="10000"/>
-                                  </p:iterate>
-                                  <p:childTnLst>
-                                    <p:set>
-                                      <p:cBhvr>
-                                        <p:cTn id="6" dur="1" fill="hold">
-                                          <p:stCondLst>
-                                            <p:cond delay="0"/>
-                                          </p:stCondLst>
-                                        </p:cTn>
-                                        <p:tgtEl>
-                                          <p:spTgt spid="2"/>
-                                        </p:tgtEl>
-                                        <p:attrNameLst>
-                                          <p:attrName>style.visibility</p:attrName>
-                                        </p:attrNameLst>
-                                      </p:cBhvr>
-                                      <p:to>
-                                        <p:strVal val="visible"/>
-                                      </p:to>
-                                    </p:set>
-                                    <p:animEffect transition="in" filter="fade">
-                                      <p:cBhvr>
-                                        <p:cTn id="7" dur="400"/>
-                                        <p:tgtEl>
-                                          <p:spTgt spid="2"/>
-                                        </p:tgtEl>
-                                      </p:cBhvr>
-                                    </p:animEffect>
-                                  </p:childTnLst>
-                                </p:cTn>
-                              </p:par>
-                            </p:childTnLst>
-                          </p:cTn>
-                        </p:par>
-                      </p:childTnLst>
-                    </p:cTn>
-                  </p:par>
-                </p:childTnLst>
-              </p:cTn>
-              <p:prevCondLst>
-                <p:cond evt="onPrev" delay="0">
-                  <p:tgtEl>
-                    <p:sldTgt/>
-                  </p:tgtEl>
-                </p:cond>
-              </p:prevCondLst>
-              <p:nextCondLst>
-                <p:cond evt="onNext" delay="0">
-                  <p:tgtEl>
-                    <p:sldTgt/>
-                  </p:tgtEl>
-                </p:cond>
-              </p:nextCondLst>
-            </p:seq>
-          </p:childTnLst>
-        </p:cTn>
-      </p:par>
-    </p:tnLst>
-    <p:bldLst>
-      <p:bldP spid="2" grpId="0"/>
-    </p:bldLst>
-  </p:timing>
 </p:sld>
 </file>
 

</xml_diff>

<commit_message>
minor modification (slide 25, mainly)
</commit_message>
<xml_diff>
--- a/main-520-project/CS_520_Paper_Review_Group23.pptx
+++ b/main-520-project/CS_520_Paper_Review_Group23.pptx
@@ -867,7 +867,49 @@
                 <a:ea typeface="맑은 고딕" panose="020B0503020000020004" pitchFamily="34" charset="-127"/>
                 <a:cs typeface="Calibri" panose="020F0502020204030204" pitchFamily="34" charset="0"/>
               </a:rPr>
-              <a:t>[Slide 12] Counterfactual explanatory systems, on the other hand, are more purposive explanatory systems. In the second case, the banking system was able to specify the counterexamples related to customer’s features led to be declined. As such, the main purpose of a counterfactual explanation system is to identify counterfactual cases by checking whether the judgment outcome changes when the values </a:t>
+              <a:t>[Slide 12] Counterfactual explanatory systems, on the other hand, are more purposive explanatory systems. In the second case, the banking system was able to specify the counterexamples related to customer’s </a:t>
+            </a:r>
+            <a:r>
+              <a:rPr lang="en-US" sz="1800" kern="100" dirty="0">
+                <a:solidFill>
+                  <a:srgbClr val="000000"/>
+                </a:solidFill>
+                <a:effectLst/>
+                <a:latin typeface="Calibri" panose="020F0502020204030204" pitchFamily="34" charset="0"/>
+                <a:ea typeface="맑은 고딕" panose="020B0503020000020004" pitchFamily="34" charset="-127"/>
+                <a:cs typeface="Calibri" panose="020F0502020204030204" pitchFamily="34" charset="0"/>
+              </a:rPr>
+              <a:t>features that</a:t>
+            </a:r>
+            <a:r>
+              <a:rPr lang="en-US" sz="1800" kern="100" dirty="0">
+                <a:effectLst/>
+                <a:latin typeface="Calibri" panose="020F0502020204030204" pitchFamily="34" charset="0"/>
+                <a:ea typeface="맑은 고딕" panose="020B0503020000020004" pitchFamily="34" charset="-127"/>
+                <a:cs typeface="Calibri" panose="020F0502020204030204" pitchFamily="34" charset="0"/>
+              </a:rPr>
+              <a:t> led to </a:t>
+            </a:r>
+            <a:r>
+              <a:rPr lang="en-US" sz="1800" kern="100" dirty="0">
+                <a:solidFill>
+                  <a:srgbClr val="000000"/>
+                </a:solidFill>
+                <a:effectLst/>
+                <a:latin typeface="Calibri" panose="020F0502020204030204" pitchFamily="34" charset="0"/>
+                <a:ea typeface="맑은 고딕" panose="020B0503020000020004" pitchFamily="34" charset="-127"/>
+                <a:cs typeface="Calibri" panose="020F0502020204030204" pitchFamily="34" charset="0"/>
+              </a:rPr>
+              <a:t>the rejection.</a:t>
+            </a:r>
+            <a:r>
+              <a:rPr lang="en-US" sz="1800" kern="100" dirty="0">
+                <a:effectLst/>
+                <a:latin typeface="Calibri" panose="020F0502020204030204" pitchFamily="34" charset="0"/>
+                <a:ea typeface="맑은 고딕" panose="020B0503020000020004" pitchFamily="34" charset="-127"/>
+                <a:cs typeface="Calibri" panose="020F0502020204030204" pitchFamily="34" charset="0"/>
+              </a:rPr>
+              <a:t> As such, the main purpose of a counterfactual explanation system is to identify counterfactual cases by checking whether the judgment outcome changes when the values </a:t>
             </a:r>
             <a:r>
               <a:rPr lang="en-US" sz="1800" kern="100" dirty="0">
@@ -1238,7 +1280,7 @@
                 <a:ea typeface="맑은 고딕" panose="020B0503020000020004" pitchFamily="34" charset="-127"/>
                 <a:cs typeface="Calibri" panose="020F0502020204030204" pitchFamily="34" charset="0"/>
               </a:rPr>
-              <a:t>So</a:t>
+              <a:t>So,</a:t>
             </a:r>
             <a:r>
               <a:rPr lang="en-US" sz="1800" kern="100" dirty="0">
@@ -1247,7 +1289,28 @@
                 <a:ea typeface="맑은 고딕" panose="020B0503020000020004" pitchFamily="34" charset="-127"/>
                 <a:cs typeface="Calibri" panose="020F0502020204030204" pitchFamily="34" charset="0"/>
               </a:rPr>
-              <a:t> what does ‘duality’ mean? In a mathematical sense, the term 'double' comes close to meaning a symmetrical relationship. Therefore, the author devotes part of the space to explaining the concepts of 'duality' and 'duality theorem' to prove that rule-based explanations and counterfactual explanations </a:t>
+              <a:t> what does ‘duality’ mean? In a mathematical sense, the term </a:t>
+            </a:r>
+            <a:r>
+              <a:rPr lang="en-US" sz="1800" kern="100" dirty="0">
+                <a:solidFill>
+                  <a:srgbClr val="000000"/>
+                </a:solidFill>
+                <a:effectLst/>
+                <a:latin typeface="Calibri" panose="020F0502020204030204" pitchFamily="34" charset="0"/>
+                <a:ea typeface="맑은 고딕" panose="020B0503020000020004" pitchFamily="34" charset="-127"/>
+                <a:cs typeface="Calibri" panose="020F0502020204030204" pitchFamily="34" charset="0"/>
+              </a:rPr>
+              <a:t>"double"</a:t>
+            </a:r>
+            <a:r>
+              <a:rPr lang="en-US" sz="1800" kern="100" dirty="0">
+                <a:effectLst/>
+                <a:latin typeface="Calibri" panose="020F0502020204030204" pitchFamily="34" charset="0"/>
+                <a:ea typeface="맑은 고딕" panose="020B0503020000020004" pitchFamily="34" charset="-127"/>
+                <a:cs typeface="Calibri" panose="020F0502020204030204" pitchFamily="34" charset="0"/>
+              </a:rPr>
+              <a:t> comes close to meaning a symmetrical relationship. Therefore, the author devotes part of the space to explaining the concepts of 'duality' and 'duality theorem' to prove that rule-based explanations and counterfactual explanations </a:t>
             </a:r>
             <a:r>
               <a:rPr lang="en-US" sz="1800" kern="100" dirty="0">
@@ -3320,7 +3383,7 @@
                 <a:ea typeface="맑은 고딕" panose="020B0503020000020004" pitchFamily="34" charset="-127"/>
                 <a:cs typeface="Calibri" panose="020F0502020204030204" pitchFamily="34" charset="0"/>
               </a:rPr>
-              <a:t>[Slide 25] The authors presented the limitations of the algorithm they developed, and the improvements needed in the future, organized into the five above. However, these limitations are ultimately based on the lack of generality of the </a:t>
+              <a:t>[Slide 25] The authors presented the limitations of the algorithm they developed, and the improvements needed in the future, organized into the five above. However, these limitations are ultimately based on the lack of generality of the data set and the classifier. Due to this constraint, the algorithm may not be practical in </a:t>
             </a:r>
             <a:r>
               <a:rPr lang="en-US" sz="1800" kern="100" dirty="0">
@@ -3332,7 +3395,7 @@
                 <a:ea typeface="맑은 고딕" panose="020B0503020000020004" pitchFamily="34" charset="-127"/>
                 <a:cs typeface="Calibri" panose="020F0502020204030204" pitchFamily="34" charset="0"/>
               </a:rPr>
-              <a:t>data set</a:t>
+              <a:t>practice</a:t>
             </a:r>
             <a:r>
               <a:rPr lang="en-US" sz="1800" kern="100" dirty="0">
@@ -3341,7 +3404,7 @@
                 <a:ea typeface="맑은 고딕" panose="020B0503020000020004" pitchFamily="34" charset="-127"/>
                 <a:cs typeface="Calibri" panose="020F0502020204030204" pitchFamily="34" charset="0"/>
               </a:rPr>
-              <a:t> </a:t>
+              <a:t> and the validity of the algorithm may </a:t>
             </a:r>
             <a:r>
               <a:rPr lang="en-US" sz="1800" kern="100" dirty="0">
@@ -3353,7 +3416,7 @@
                 <a:ea typeface="맑은 고딕" panose="020B0503020000020004" pitchFamily="34" charset="-127"/>
                 <a:cs typeface="Calibri" panose="020F0502020204030204" pitchFamily="34" charset="0"/>
               </a:rPr>
-              <a:t>and the</a:t>
+              <a:t>weaken.</a:t>
             </a:r>
             <a:r>
               <a:rPr lang="en-US" sz="1800" kern="100" dirty="0">
@@ -3362,30 +3425,18 @@
                 <a:ea typeface="맑은 고딕" panose="020B0503020000020004" pitchFamily="34" charset="-127"/>
                 <a:cs typeface="Calibri" panose="020F0502020204030204" pitchFamily="34" charset="0"/>
               </a:rPr>
-              <a:t> classifier. Due to this constraint, the algorithm may not be practical in practice, and there are also questions as to whether the prerequisite 'Duality' can be maintained when the reality of the data is added. </a:t>
-            </a:r>
-            <a:r>
-              <a:rPr lang="en-US" sz="1800" kern="100" dirty="0">
-                <a:solidFill>
-                  <a:srgbClr val="000000"/>
-                </a:solidFill>
+              <a:t> </a:t>
+            </a:r>
+            <a:r>
+              <a:rPr lang="en-US" sz="1800" kern="100">
                 <a:effectLst/>
                 <a:latin typeface="Calibri" panose="020F0502020204030204" pitchFamily="34" charset="0"/>
                 <a:ea typeface="맑은 고딕" panose="020B0503020000020004" pitchFamily="34" charset="-127"/>
                 <a:cs typeface="Calibri" panose="020F0502020204030204" pitchFamily="34" charset="0"/>
               </a:rPr>
-              <a:t>Furthermore,</a:t>
-            </a:r>
-            <a:r>
-              <a:rPr lang="en-US" sz="1800" kern="100" dirty="0">
-                <a:effectLst/>
-                <a:latin typeface="Calibri" panose="020F0502020204030204" pitchFamily="34" charset="0"/>
-                <a:ea typeface="맑은 고딕" panose="020B0503020000020004" pitchFamily="34" charset="-127"/>
-                <a:cs typeface="Calibri" panose="020F0502020204030204" pitchFamily="34" charset="0"/>
-              </a:rPr>
-              <a:t> because the counterfactual explanation model relies heavily on the black box, the newly developed algorithm is ultimately incomplete.</a:t>
-            </a:r>
-            <a:endParaRPr lang="en-US" sz="1800" kern="100" dirty="0">
+              <a:t>Furthermore, because the counterfactual explanation model relies heavily on the black box, the newly developed algorithm is ultimately incomplete.</a:t>
+            </a:r>
+            <a:endParaRPr lang="en-US" sz="1800" kern="100">
               <a:effectLst/>
               <a:latin typeface="Calibri" panose="020F0502020204030204" pitchFamily="34" charset="0"/>
               <a:ea typeface="맑은 고딕" panose="020B0503020000020004" pitchFamily="34" charset="-127"/>
@@ -4680,7 +4731,7 @@
                 <a:ea typeface="맑은 고딕" panose="020B0503020000020004" pitchFamily="34" charset="-127"/>
                 <a:cs typeface="Calibri" panose="020F0502020204030204" pitchFamily="34" charset="0"/>
               </a:rPr>
-              <a:t>explanation'</a:t>
+              <a:t>explanation',</a:t>
             </a:r>
             <a:r>
               <a:rPr lang="en-US" sz="1800" kern="100" dirty="0">
@@ -39089,79 +39140,79 @@
         <p:spPr>
           <a:xfrm>
             <a:off x="4229100" y="4809408"/>
-            <a:ext cx="7519488" cy="1754326"/>
+            <a:ext cx="7519488" cy="1477328"/>
           </a:xfrm>
           <a:custGeom>
             <a:avLst/>
             <a:gdLst>
               <a:gd name="connsiteX0" fmla="*/ 0 w 7519488"/>
-              <a:gd name="connsiteY0" fmla="*/ 0 h 1754326"/>
+              <a:gd name="connsiteY0" fmla="*/ 0 h 1477328"/>
               <a:gd name="connsiteX1" fmla="*/ 728812 w 7519488"/>
-              <a:gd name="connsiteY1" fmla="*/ 0 h 1754326"/>
+              <a:gd name="connsiteY1" fmla="*/ 0 h 1477328"/>
               <a:gd name="connsiteX2" fmla="*/ 1307234 w 7519488"/>
-              <a:gd name="connsiteY2" fmla="*/ 0 h 1754326"/>
+              <a:gd name="connsiteY2" fmla="*/ 0 h 1477328"/>
               <a:gd name="connsiteX3" fmla="*/ 1960851 w 7519488"/>
-              <a:gd name="connsiteY3" fmla="*/ 0 h 1754326"/>
+              <a:gd name="connsiteY3" fmla="*/ 0 h 1477328"/>
               <a:gd name="connsiteX4" fmla="*/ 2614468 w 7519488"/>
-              <a:gd name="connsiteY4" fmla="*/ 0 h 1754326"/>
+              <a:gd name="connsiteY4" fmla="*/ 0 h 1477328"/>
               <a:gd name="connsiteX5" fmla="*/ 3192890 w 7519488"/>
-              <a:gd name="connsiteY5" fmla="*/ 0 h 1754326"/>
+              <a:gd name="connsiteY5" fmla="*/ 0 h 1477328"/>
               <a:gd name="connsiteX6" fmla="*/ 3620923 w 7519488"/>
-              <a:gd name="connsiteY6" fmla="*/ 0 h 1754326"/>
+              <a:gd name="connsiteY6" fmla="*/ 0 h 1477328"/>
               <a:gd name="connsiteX7" fmla="*/ 4124150 w 7519488"/>
-              <a:gd name="connsiteY7" fmla="*/ 0 h 1754326"/>
+              <a:gd name="connsiteY7" fmla="*/ 0 h 1477328"/>
               <a:gd name="connsiteX8" fmla="*/ 4702572 w 7519488"/>
-              <a:gd name="connsiteY8" fmla="*/ 0 h 1754326"/>
+              <a:gd name="connsiteY8" fmla="*/ 0 h 1477328"/>
               <a:gd name="connsiteX9" fmla="*/ 5431384 w 7519488"/>
-              <a:gd name="connsiteY9" fmla="*/ 0 h 1754326"/>
+              <a:gd name="connsiteY9" fmla="*/ 0 h 1477328"/>
               <a:gd name="connsiteX10" fmla="*/ 5934611 w 7519488"/>
-              <a:gd name="connsiteY10" fmla="*/ 0 h 1754326"/>
+              <a:gd name="connsiteY10" fmla="*/ 0 h 1477328"/>
               <a:gd name="connsiteX11" fmla="*/ 6362644 w 7519488"/>
-              <a:gd name="connsiteY11" fmla="*/ 0 h 1754326"/>
+              <a:gd name="connsiteY11" fmla="*/ 0 h 1477328"/>
               <a:gd name="connsiteX12" fmla="*/ 6790676 w 7519488"/>
-              <a:gd name="connsiteY12" fmla="*/ 0 h 1754326"/>
+              <a:gd name="connsiteY12" fmla="*/ 0 h 1477328"/>
               <a:gd name="connsiteX13" fmla="*/ 7519488 w 7519488"/>
-              <a:gd name="connsiteY13" fmla="*/ 0 h 1754326"/>
+              <a:gd name="connsiteY13" fmla="*/ 0 h 1477328"/>
               <a:gd name="connsiteX14" fmla="*/ 7519488 w 7519488"/>
-              <a:gd name="connsiteY14" fmla="*/ 567232 h 1754326"/>
+              <a:gd name="connsiteY14" fmla="*/ 477669 h 1477328"/>
               <a:gd name="connsiteX15" fmla="*/ 7519488 w 7519488"/>
-              <a:gd name="connsiteY15" fmla="*/ 1152007 h 1754326"/>
+              <a:gd name="connsiteY15" fmla="*/ 970112 h 1477328"/>
               <a:gd name="connsiteX16" fmla="*/ 7519488 w 7519488"/>
-              <a:gd name="connsiteY16" fmla="*/ 1754326 h 1754326"/>
+              <a:gd name="connsiteY16" fmla="*/ 1477328 h 1477328"/>
               <a:gd name="connsiteX17" fmla="*/ 7016261 w 7519488"/>
-              <a:gd name="connsiteY17" fmla="*/ 1754326 h 1754326"/>
+              <a:gd name="connsiteY17" fmla="*/ 1477328 h 1477328"/>
               <a:gd name="connsiteX18" fmla="*/ 6513033 w 7519488"/>
-              <a:gd name="connsiteY18" fmla="*/ 1754326 h 1754326"/>
+              <a:gd name="connsiteY18" fmla="*/ 1477328 h 1477328"/>
               <a:gd name="connsiteX19" fmla="*/ 6085001 w 7519488"/>
-              <a:gd name="connsiteY19" fmla="*/ 1754326 h 1754326"/>
+              <a:gd name="connsiteY19" fmla="*/ 1477328 h 1477328"/>
               <a:gd name="connsiteX20" fmla="*/ 5732164 w 7519488"/>
-              <a:gd name="connsiteY20" fmla="*/ 1754326 h 1754326"/>
+              <a:gd name="connsiteY20" fmla="*/ 1477328 h 1477328"/>
               <a:gd name="connsiteX21" fmla="*/ 5228936 w 7519488"/>
-              <a:gd name="connsiteY21" fmla="*/ 1754326 h 1754326"/>
+              <a:gd name="connsiteY21" fmla="*/ 1477328 h 1477328"/>
               <a:gd name="connsiteX22" fmla="*/ 4800904 w 7519488"/>
-              <a:gd name="connsiteY22" fmla="*/ 1754326 h 1754326"/>
+              <a:gd name="connsiteY22" fmla="*/ 1477328 h 1477328"/>
               <a:gd name="connsiteX23" fmla="*/ 4072092 w 7519488"/>
-              <a:gd name="connsiteY23" fmla="*/ 1754326 h 1754326"/>
+              <a:gd name="connsiteY23" fmla="*/ 1477328 h 1477328"/>
               <a:gd name="connsiteX24" fmla="*/ 3343280 w 7519488"/>
-              <a:gd name="connsiteY24" fmla="*/ 1754326 h 1754326"/>
+              <a:gd name="connsiteY24" fmla="*/ 1477328 h 1477328"/>
               <a:gd name="connsiteX25" fmla="*/ 2990443 w 7519488"/>
-              <a:gd name="connsiteY25" fmla="*/ 1754326 h 1754326"/>
+              <a:gd name="connsiteY25" fmla="*/ 1477328 h 1477328"/>
               <a:gd name="connsiteX26" fmla="*/ 2412020 w 7519488"/>
-              <a:gd name="connsiteY26" fmla="*/ 1754326 h 1754326"/>
+              <a:gd name="connsiteY26" fmla="*/ 1477328 h 1477328"/>
               <a:gd name="connsiteX27" fmla="*/ 1833598 w 7519488"/>
-              <a:gd name="connsiteY27" fmla="*/ 1754326 h 1754326"/>
+              <a:gd name="connsiteY27" fmla="*/ 1477328 h 1477328"/>
               <a:gd name="connsiteX28" fmla="*/ 1255176 w 7519488"/>
-              <a:gd name="connsiteY28" fmla="*/ 1754326 h 1754326"/>
+              <a:gd name="connsiteY28" fmla="*/ 1477328 h 1477328"/>
               <a:gd name="connsiteX29" fmla="*/ 902339 w 7519488"/>
-              <a:gd name="connsiteY29" fmla="*/ 1754326 h 1754326"/>
+              <a:gd name="connsiteY29" fmla="*/ 1477328 h 1477328"/>
               <a:gd name="connsiteX30" fmla="*/ 0 w 7519488"/>
-              <a:gd name="connsiteY30" fmla="*/ 1754326 h 1754326"/>
+              <a:gd name="connsiteY30" fmla="*/ 1477328 h 1477328"/>
               <a:gd name="connsiteX31" fmla="*/ 0 w 7519488"/>
-              <a:gd name="connsiteY31" fmla="*/ 1169551 h 1754326"/>
+              <a:gd name="connsiteY31" fmla="*/ 984885 h 1477328"/>
               <a:gd name="connsiteX32" fmla="*/ 0 w 7519488"/>
-              <a:gd name="connsiteY32" fmla="*/ 637405 h 1754326"/>
+              <a:gd name="connsiteY32" fmla="*/ 536763 h 1477328"/>
               <a:gd name="connsiteX33" fmla="*/ 0 w 7519488"/>
-              <a:gd name="connsiteY33" fmla="*/ 0 h 1754326"/>
+              <a:gd name="connsiteY33" fmla="*/ 0 h 1477328"/>
             </a:gdLst>
             <a:ahLst/>
             <a:cxnLst>
@@ -39270,7 +39321,7 @@
             </a:cxnLst>
             <a:rect l="l" t="t" r="r" b="b"/>
             <a:pathLst>
-              <a:path w="7519488" h="1754326" fill="none" extrusionOk="0">
+              <a:path w="7519488" h="1477328" fill="none" extrusionOk="0">
                 <a:moveTo>
                   <a:pt x="0" y="0"/>
                 </a:moveTo>
@@ -39340,108 +39391,108 @@
                   <a:pt x="7519488" y="0"/>
                 </a:cubicBezTo>
                 <a:cubicBezTo>
-                  <a:pt x="7527354" y="202657"/>
-                  <a:pt x="7501827" y="380924"/>
-                  <a:pt x="7519488" y="567232"/>
-                </a:cubicBezTo>
-                <a:cubicBezTo>
-                  <a:pt x="7537149" y="753540"/>
-                  <a:pt x="7457713" y="863580"/>
-                  <a:pt x="7519488" y="1152007"/>
-                </a:cubicBezTo>
-                <a:cubicBezTo>
-                  <a:pt x="7581263" y="1440434"/>
-                  <a:pt x="7466697" y="1579885"/>
-                  <a:pt x="7519488" y="1754326"/>
-                </a:cubicBezTo>
-                <a:cubicBezTo>
-                  <a:pt x="7297396" y="1805263"/>
-                  <a:pt x="7215060" y="1713079"/>
-                  <a:pt x="7016261" y="1754326"/>
-                </a:cubicBezTo>
-                <a:cubicBezTo>
-                  <a:pt x="6817462" y="1795573"/>
-                  <a:pt x="6725031" y="1754287"/>
-                  <a:pt x="6513033" y="1754326"/>
-                </a:cubicBezTo>
-                <a:cubicBezTo>
-                  <a:pt x="6301035" y="1754365"/>
-                  <a:pt x="6280180" y="1708956"/>
-                  <a:pt x="6085001" y="1754326"/>
-                </a:cubicBezTo>
-                <a:cubicBezTo>
-                  <a:pt x="5889822" y="1799696"/>
-                  <a:pt x="5902443" y="1716225"/>
-                  <a:pt x="5732164" y="1754326"/>
-                </a:cubicBezTo>
-                <a:cubicBezTo>
-                  <a:pt x="5561885" y="1792427"/>
-                  <a:pt x="5400378" y="1719304"/>
-                  <a:pt x="5228936" y="1754326"/>
-                </a:cubicBezTo>
-                <a:cubicBezTo>
-                  <a:pt x="5057494" y="1789348"/>
-                  <a:pt x="4893334" y="1719601"/>
-                  <a:pt x="4800904" y="1754326"/>
-                </a:cubicBezTo>
-                <a:cubicBezTo>
-                  <a:pt x="4708474" y="1789051"/>
-                  <a:pt x="4259302" y="1701603"/>
-                  <a:pt x="4072092" y="1754326"/>
-                </a:cubicBezTo>
-                <a:cubicBezTo>
-                  <a:pt x="3884882" y="1807049"/>
-                  <a:pt x="3676313" y="1717848"/>
-                  <a:pt x="3343280" y="1754326"/>
-                </a:cubicBezTo>
-                <a:cubicBezTo>
-                  <a:pt x="3010247" y="1790804"/>
-                  <a:pt x="3106915" y="1740747"/>
-                  <a:pt x="2990443" y="1754326"/>
-                </a:cubicBezTo>
-                <a:cubicBezTo>
-                  <a:pt x="2873971" y="1767905"/>
-                  <a:pt x="2622621" y="1723424"/>
-                  <a:pt x="2412020" y="1754326"/>
-                </a:cubicBezTo>
-                <a:cubicBezTo>
-                  <a:pt x="2201419" y="1785228"/>
-                  <a:pt x="2071545" y="1688334"/>
-                  <a:pt x="1833598" y="1754326"/>
-                </a:cubicBezTo>
-                <a:cubicBezTo>
-                  <a:pt x="1595651" y="1820318"/>
-                  <a:pt x="1502773" y="1753948"/>
-                  <a:pt x="1255176" y="1754326"/>
-                </a:cubicBezTo>
-                <a:cubicBezTo>
-                  <a:pt x="1007579" y="1754704"/>
-                  <a:pt x="1006958" y="1717299"/>
-                  <a:pt x="902339" y="1754326"/>
-                </a:cubicBezTo>
-                <a:cubicBezTo>
-                  <a:pt x="797720" y="1791353"/>
-                  <a:pt x="324638" y="1752395"/>
-                  <a:pt x="0" y="1754326"/>
-                </a:cubicBezTo>
-                <a:cubicBezTo>
-                  <a:pt x="-17636" y="1518516"/>
-                  <a:pt x="65677" y="1407033"/>
-                  <a:pt x="0" y="1169551"/>
-                </a:cubicBezTo>
-                <a:cubicBezTo>
-                  <a:pt x="-65677" y="932069"/>
-                  <a:pt x="46224" y="885677"/>
-                  <a:pt x="0" y="637405"/>
-                </a:cubicBezTo>
-                <a:cubicBezTo>
-                  <a:pt x="-46224" y="389133"/>
-                  <a:pt x="31848" y="297915"/>
+                  <a:pt x="7523704" y="129440"/>
+                  <a:pt x="7512304" y="344247"/>
+                  <a:pt x="7519488" y="477669"/>
+                </a:cubicBezTo>
+                <a:cubicBezTo>
+                  <a:pt x="7526672" y="611091"/>
+                  <a:pt x="7476539" y="853972"/>
+                  <a:pt x="7519488" y="970112"/>
+                </a:cubicBezTo>
+                <a:cubicBezTo>
+                  <a:pt x="7562437" y="1086252"/>
+                  <a:pt x="7474305" y="1321131"/>
+                  <a:pt x="7519488" y="1477328"/>
+                </a:cubicBezTo>
+                <a:cubicBezTo>
+                  <a:pt x="7297396" y="1528265"/>
+                  <a:pt x="7215060" y="1436081"/>
+                  <a:pt x="7016261" y="1477328"/>
+                </a:cubicBezTo>
+                <a:cubicBezTo>
+                  <a:pt x="6817462" y="1518575"/>
+                  <a:pt x="6725031" y="1477289"/>
+                  <a:pt x="6513033" y="1477328"/>
+                </a:cubicBezTo>
+                <a:cubicBezTo>
+                  <a:pt x="6301035" y="1477367"/>
+                  <a:pt x="6280180" y="1431958"/>
+                  <a:pt x="6085001" y="1477328"/>
+                </a:cubicBezTo>
+                <a:cubicBezTo>
+                  <a:pt x="5889822" y="1522698"/>
+                  <a:pt x="5902443" y="1439227"/>
+                  <a:pt x="5732164" y="1477328"/>
+                </a:cubicBezTo>
+                <a:cubicBezTo>
+                  <a:pt x="5561885" y="1515429"/>
+                  <a:pt x="5400378" y="1442306"/>
+                  <a:pt x="5228936" y="1477328"/>
+                </a:cubicBezTo>
+                <a:cubicBezTo>
+                  <a:pt x="5057494" y="1512350"/>
+                  <a:pt x="4893334" y="1442603"/>
+                  <a:pt x="4800904" y="1477328"/>
+                </a:cubicBezTo>
+                <a:cubicBezTo>
+                  <a:pt x="4708474" y="1512053"/>
+                  <a:pt x="4259302" y="1424605"/>
+                  <a:pt x="4072092" y="1477328"/>
+                </a:cubicBezTo>
+                <a:cubicBezTo>
+                  <a:pt x="3884882" y="1530051"/>
+                  <a:pt x="3676313" y="1440850"/>
+                  <a:pt x="3343280" y="1477328"/>
+                </a:cubicBezTo>
+                <a:cubicBezTo>
+                  <a:pt x="3010247" y="1513806"/>
+                  <a:pt x="3106915" y="1463749"/>
+                  <a:pt x="2990443" y="1477328"/>
+                </a:cubicBezTo>
+                <a:cubicBezTo>
+                  <a:pt x="2873971" y="1490907"/>
+                  <a:pt x="2622621" y="1446426"/>
+                  <a:pt x="2412020" y="1477328"/>
+                </a:cubicBezTo>
+                <a:cubicBezTo>
+                  <a:pt x="2201419" y="1508230"/>
+                  <a:pt x="2071545" y="1411336"/>
+                  <a:pt x="1833598" y="1477328"/>
+                </a:cubicBezTo>
+                <a:cubicBezTo>
+                  <a:pt x="1595651" y="1543320"/>
+                  <a:pt x="1502773" y="1476950"/>
+                  <a:pt x="1255176" y="1477328"/>
+                </a:cubicBezTo>
+                <a:cubicBezTo>
+                  <a:pt x="1007579" y="1477706"/>
+                  <a:pt x="1006958" y="1440301"/>
+                  <a:pt x="902339" y="1477328"/>
+                </a:cubicBezTo>
+                <a:cubicBezTo>
+                  <a:pt x="797720" y="1514355"/>
+                  <a:pt x="324638" y="1475397"/>
+                  <a:pt x="0" y="1477328"/>
+                </a:cubicBezTo>
+                <a:cubicBezTo>
+                  <a:pt x="-46780" y="1375327"/>
+                  <a:pt x="8487" y="1228366"/>
+                  <a:pt x="0" y="984885"/>
+                </a:cubicBezTo>
+                <a:cubicBezTo>
+                  <a:pt x="-8487" y="741404"/>
+                  <a:pt x="32630" y="689583"/>
+                  <a:pt x="0" y="536763"/>
+                </a:cubicBezTo>
+                <a:cubicBezTo>
+                  <a:pt x="-32630" y="383943"/>
+                  <a:pt x="31184" y="229201"/>
                   <a:pt x="0" y="0"/>
                 </a:cubicBezTo>
                 <a:close/>
               </a:path>
-              <a:path w="7519488" h="1754326" stroke="0" extrusionOk="0">
+              <a:path w="7519488" h="1477328" stroke="0" extrusionOk="0">
                 <a:moveTo>
                   <a:pt x="0" y="0"/>
                 </a:moveTo>
@@ -39516,103 +39567,103 @@
                   <a:pt x="7519488" y="0"/>
                 </a:cubicBezTo>
                 <a:cubicBezTo>
-                  <a:pt x="7549986" y="252749"/>
-                  <a:pt x="7483608" y="402290"/>
-                  <a:pt x="7519488" y="532146"/>
-                </a:cubicBezTo>
-                <a:cubicBezTo>
-                  <a:pt x="7555368" y="662002"/>
-                  <a:pt x="7478217" y="929646"/>
-                  <a:pt x="7519488" y="1099378"/>
-                </a:cubicBezTo>
-                <a:cubicBezTo>
-                  <a:pt x="7560759" y="1269110"/>
-                  <a:pt x="7454461" y="1435192"/>
-                  <a:pt x="7519488" y="1754326"/>
-                </a:cubicBezTo>
-                <a:cubicBezTo>
-                  <a:pt x="7230181" y="1814800"/>
-                  <a:pt x="7032251" y="1704315"/>
-                  <a:pt x="6790676" y="1754326"/>
-                </a:cubicBezTo>
-                <a:cubicBezTo>
-                  <a:pt x="6549101" y="1804337"/>
-                  <a:pt x="6447502" y="1737836"/>
-                  <a:pt x="6287449" y="1754326"/>
-                </a:cubicBezTo>
-                <a:cubicBezTo>
-                  <a:pt x="6127396" y="1770816"/>
-                  <a:pt x="5898300" y="1715289"/>
-                  <a:pt x="5633832" y="1754326"/>
-                </a:cubicBezTo>
-                <a:cubicBezTo>
-                  <a:pt x="5369364" y="1793363"/>
-                  <a:pt x="5355508" y="1738436"/>
-                  <a:pt x="5130605" y="1754326"/>
-                </a:cubicBezTo>
-                <a:cubicBezTo>
-                  <a:pt x="4905702" y="1770216"/>
-                  <a:pt x="4725679" y="1742528"/>
-                  <a:pt x="4552182" y="1754326"/>
-                </a:cubicBezTo>
-                <a:cubicBezTo>
-                  <a:pt x="4378685" y="1766124"/>
-                  <a:pt x="4181759" y="1750023"/>
-                  <a:pt x="3898565" y="1754326"/>
-                </a:cubicBezTo>
-                <a:cubicBezTo>
-                  <a:pt x="3615371" y="1758629"/>
-                  <a:pt x="3627052" y="1715611"/>
-                  <a:pt x="3470533" y="1754326"/>
-                </a:cubicBezTo>
-                <a:cubicBezTo>
-                  <a:pt x="3314014" y="1793041"/>
-                  <a:pt x="3176882" y="1730180"/>
-                  <a:pt x="2967306" y="1754326"/>
-                </a:cubicBezTo>
-                <a:cubicBezTo>
-                  <a:pt x="2757730" y="1778472"/>
-                  <a:pt x="2674708" y="1697515"/>
-                  <a:pt x="2464078" y="1754326"/>
-                </a:cubicBezTo>
-                <a:cubicBezTo>
-                  <a:pt x="2253448" y="1811137"/>
-                  <a:pt x="2237976" y="1720820"/>
-                  <a:pt x="2036046" y="1754326"/>
-                </a:cubicBezTo>
-                <a:cubicBezTo>
-                  <a:pt x="1834116" y="1787832"/>
-                  <a:pt x="1816840" y="1729734"/>
-                  <a:pt x="1608014" y="1754326"/>
-                </a:cubicBezTo>
-                <a:cubicBezTo>
-                  <a:pt x="1399188" y="1778918"/>
-                  <a:pt x="1327258" y="1728019"/>
-                  <a:pt x="1179981" y="1754326"/>
-                </a:cubicBezTo>
-                <a:cubicBezTo>
-                  <a:pt x="1032704" y="1780633"/>
-                  <a:pt x="946677" y="1720317"/>
-                  <a:pt x="751949" y="1754326"/>
-                </a:cubicBezTo>
-                <a:cubicBezTo>
-                  <a:pt x="557221" y="1788335"/>
-                  <a:pt x="178698" y="1676164"/>
-                  <a:pt x="0" y="1754326"/>
-                </a:cubicBezTo>
-                <a:cubicBezTo>
-                  <a:pt x="-52634" y="1473129"/>
-                  <a:pt x="15666" y="1455322"/>
-                  <a:pt x="0" y="1169551"/>
-                </a:cubicBezTo>
-                <a:cubicBezTo>
-                  <a:pt x="-15666" y="883781"/>
-                  <a:pt x="71490" y="777950"/>
-                  <a:pt x="0" y="549689"/>
-                </a:cubicBezTo>
-                <a:cubicBezTo>
-                  <a:pt x="-71490" y="321428"/>
-                  <a:pt x="16903" y="239784"/>
+                  <a:pt x="7530254" y="166763"/>
+                  <a:pt x="7483739" y="338750"/>
+                  <a:pt x="7519488" y="448123"/>
+                </a:cubicBezTo>
+                <a:cubicBezTo>
+                  <a:pt x="7555237" y="557496"/>
+                  <a:pt x="7485364" y="735368"/>
+                  <a:pt x="7519488" y="925792"/>
+                </a:cubicBezTo>
+                <a:cubicBezTo>
+                  <a:pt x="7553612" y="1116216"/>
+                  <a:pt x="7483690" y="1250636"/>
+                  <a:pt x="7519488" y="1477328"/>
+                </a:cubicBezTo>
+                <a:cubicBezTo>
+                  <a:pt x="7230181" y="1537802"/>
+                  <a:pt x="7032251" y="1427317"/>
+                  <a:pt x="6790676" y="1477328"/>
+                </a:cubicBezTo>
+                <a:cubicBezTo>
+                  <a:pt x="6549101" y="1527339"/>
+                  <a:pt x="6447502" y="1460838"/>
+                  <a:pt x="6287449" y="1477328"/>
+                </a:cubicBezTo>
+                <a:cubicBezTo>
+                  <a:pt x="6127396" y="1493818"/>
+                  <a:pt x="5898300" y="1438291"/>
+                  <a:pt x="5633832" y="1477328"/>
+                </a:cubicBezTo>
+                <a:cubicBezTo>
+                  <a:pt x="5369364" y="1516365"/>
+                  <a:pt x="5355508" y="1461438"/>
+                  <a:pt x="5130605" y="1477328"/>
+                </a:cubicBezTo>
+                <a:cubicBezTo>
+                  <a:pt x="4905702" y="1493218"/>
+                  <a:pt x="4725679" y="1465530"/>
+                  <a:pt x="4552182" y="1477328"/>
+                </a:cubicBezTo>
+                <a:cubicBezTo>
+                  <a:pt x="4378685" y="1489126"/>
+                  <a:pt x="4181759" y="1473025"/>
+                  <a:pt x="3898565" y="1477328"/>
+                </a:cubicBezTo>
+                <a:cubicBezTo>
+                  <a:pt x="3615371" y="1481631"/>
+                  <a:pt x="3627052" y="1438613"/>
+                  <a:pt x="3470533" y="1477328"/>
+                </a:cubicBezTo>
+                <a:cubicBezTo>
+                  <a:pt x="3314014" y="1516043"/>
+                  <a:pt x="3176882" y="1453182"/>
+                  <a:pt x="2967306" y="1477328"/>
+                </a:cubicBezTo>
+                <a:cubicBezTo>
+                  <a:pt x="2757730" y="1501474"/>
+                  <a:pt x="2674708" y="1420517"/>
+                  <a:pt x="2464078" y="1477328"/>
+                </a:cubicBezTo>
+                <a:cubicBezTo>
+                  <a:pt x="2253448" y="1534139"/>
+                  <a:pt x="2237976" y="1443822"/>
+                  <a:pt x="2036046" y="1477328"/>
+                </a:cubicBezTo>
+                <a:cubicBezTo>
+                  <a:pt x="1834116" y="1510834"/>
+                  <a:pt x="1816840" y="1452736"/>
+                  <a:pt x="1608014" y="1477328"/>
+                </a:cubicBezTo>
+                <a:cubicBezTo>
+                  <a:pt x="1399188" y="1501920"/>
+                  <a:pt x="1327258" y="1451021"/>
+                  <a:pt x="1179981" y="1477328"/>
+                </a:cubicBezTo>
+                <a:cubicBezTo>
+                  <a:pt x="1032704" y="1503635"/>
+                  <a:pt x="946677" y="1443319"/>
+                  <a:pt x="751949" y="1477328"/>
+                </a:cubicBezTo>
+                <a:cubicBezTo>
+                  <a:pt x="557221" y="1511337"/>
+                  <a:pt x="178698" y="1399166"/>
+                  <a:pt x="0" y="1477328"/>
+                </a:cubicBezTo>
+                <a:cubicBezTo>
+                  <a:pt x="-6922" y="1320396"/>
+                  <a:pt x="52935" y="1229544"/>
+                  <a:pt x="0" y="984885"/>
+                </a:cubicBezTo>
+                <a:cubicBezTo>
+                  <a:pt x="-52935" y="740226"/>
+                  <a:pt x="24714" y="655683"/>
+                  <a:pt x="0" y="462896"/>
+                </a:cubicBezTo>
+                <a:cubicBezTo>
+                  <a:pt x="-24714" y="270109"/>
+                  <a:pt x="48149" y="135847"/>
                   <a:pt x="0" y="0"/>
                 </a:cubicBezTo>
                 <a:close/>
@@ -39682,26 +39733,6 @@
             </a:r>
           </a:p>
           <a:p>
-            <a:pPr marL="285750" indent="-285750">
-              <a:buFont typeface="Arial" panose="020B0604020202020204" pitchFamily="34" charset="0"/>
-              <a:buChar char="•"/>
-            </a:pPr>
-            <a:r>
-              <a:rPr lang="en-US" dirty="0">
-                <a:solidFill>
-                  <a:schemeClr val="bg1">
-                    <a:lumMod val="95000"/>
-                    <a:lumOff val="5000"/>
-                  </a:schemeClr>
-                </a:solidFill>
-                <a:latin typeface="Tahoma" panose="020B0604030504040204" pitchFamily="34" charset="0"/>
-                <a:ea typeface="Tahoma" panose="020B0604030504040204" pitchFamily="34" charset="0"/>
-                <a:cs typeface="Tahoma" panose="020B0604030504040204" pitchFamily="34" charset="0"/>
-              </a:rPr>
-              <a:t>Result of relieving data constraints (Data consistency)</a:t>
-            </a:r>
-          </a:p>
-          <a:p>
             <a:r>
               <a:rPr lang="en-US" dirty="0">
                 <a:solidFill>
@@ -39714,7 +39745,7 @@
                 <a:ea typeface="Tahoma" panose="020B0604030504040204" pitchFamily="34" charset="0"/>
                 <a:cs typeface="Times New Roman" panose="02020603050405020304" pitchFamily="18" charset="0"/>
               </a:rPr>
-              <a:t>→ Weakening the basis for ‘Duality’ as a prerequisite</a:t>
+              <a:t>→ Validity of the algorithm may weaken.</a:t>
             </a:r>
           </a:p>
           <a:p>

</xml_diff>